<commit_message>
Creating a multilayered NN
</commit_message>
<xml_diff>
--- a/Introduction To Neural Networks and AI.pptx
+++ b/Introduction To Neural Networks and AI.pptx
@@ -20,6 +20,16 @@
     <p:sldId id="268" r:id="rId14"/>
     <p:sldId id="271" r:id="rId15"/>
     <p:sldId id="269" r:id="rId16"/>
+    <p:sldId id="272" r:id="rId17"/>
+    <p:sldId id="273" r:id="rId18"/>
+    <p:sldId id="274" r:id="rId19"/>
+    <p:sldId id="275" r:id="rId20"/>
+    <p:sldId id="276" r:id="rId21"/>
+    <p:sldId id="281" r:id="rId22"/>
+    <p:sldId id="277" r:id="rId23"/>
+    <p:sldId id="278" r:id="rId24"/>
+    <p:sldId id="279" r:id="rId25"/>
+    <p:sldId id="280" r:id="rId26"/>
   </p:sldIdLst>
   <p:sldSz cx="12192000" cy="6858000"/>
   <p:notesSz cx="6858000" cy="9144000"/>
@@ -283,7 +293,7 @@
           <a:p>
             <a:fld id="{28E627C4-8EBF-403B-AE19-F9A1CE4B216A}" type="datetimeFigureOut">
               <a:rPr lang="en-CA" smtClean="0"/>
-              <a:t>2024-02-05</a:t>
+              <a:t>2024-02-23</a:t>
             </a:fld>
             <a:endParaRPr lang="en-CA"/>
           </a:p>
@@ -483,7 +493,7 @@
           <a:p>
             <a:fld id="{28E627C4-8EBF-403B-AE19-F9A1CE4B216A}" type="datetimeFigureOut">
               <a:rPr lang="en-CA" smtClean="0"/>
-              <a:t>2024-02-05</a:t>
+              <a:t>2024-02-23</a:t>
             </a:fld>
             <a:endParaRPr lang="en-CA"/>
           </a:p>
@@ -693,7 +703,7 @@
           <a:p>
             <a:fld id="{28E627C4-8EBF-403B-AE19-F9A1CE4B216A}" type="datetimeFigureOut">
               <a:rPr lang="en-CA" smtClean="0"/>
-              <a:t>2024-02-05</a:t>
+              <a:t>2024-02-23</a:t>
             </a:fld>
             <a:endParaRPr lang="en-CA"/>
           </a:p>
@@ -893,7 +903,7 @@
           <a:p>
             <a:fld id="{28E627C4-8EBF-403B-AE19-F9A1CE4B216A}" type="datetimeFigureOut">
               <a:rPr lang="en-CA" smtClean="0"/>
-              <a:t>2024-02-05</a:t>
+              <a:t>2024-02-23</a:t>
             </a:fld>
             <a:endParaRPr lang="en-CA"/>
           </a:p>
@@ -1169,7 +1179,7 @@
           <a:p>
             <a:fld id="{28E627C4-8EBF-403B-AE19-F9A1CE4B216A}" type="datetimeFigureOut">
               <a:rPr lang="en-CA" smtClean="0"/>
-              <a:t>2024-02-05</a:t>
+              <a:t>2024-02-23</a:t>
             </a:fld>
             <a:endParaRPr lang="en-CA"/>
           </a:p>
@@ -1437,7 +1447,7 @@
           <a:p>
             <a:fld id="{28E627C4-8EBF-403B-AE19-F9A1CE4B216A}" type="datetimeFigureOut">
               <a:rPr lang="en-CA" smtClean="0"/>
-              <a:t>2024-02-05</a:t>
+              <a:t>2024-02-23</a:t>
             </a:fld>
             <a:endParaRPr lang="en-CA"/>
           </a:p>
@@ -1852,7 +1862,7 @@
           <a:p>
             <a:fld id="{28E627C4-8EBF-403B-AE19-F9A1CE4B216A}" type="datetimeFigureOut">
               <a:rPr lang="en-CA" smtClean="0"/>
-              <a:t>2024-02-05</a:t>
+              <a:t>2024-02-23</a:t>
             </a:fld>
             <a:endParaRPr lang="en-CA"/>
           </a:p>
@@ -1994,7 +2004,7 @@
           <a:p>
             <a:fld id="{28E627C4-8EBF-403B-AE19-F9A1CE4B216A}" type="datetimeFigureOut">
               <a:rPr lang="en-CA" smtClean="0"/>
-              <a:t>2024-02-05</a:t>
+              <a:t>2024-02-23</a:t>
             </a:fld>
             <a:endParaRPr lang="en-CA"/>
           </a:p>
@@ -2107,7 +2117,7 @@
           <a:p>
             <a:fld id="{28E627C4-8EBF-403B-AE19-F9A1CE4B216A}" type="datetimeFigureOut">
               <a:rPr lang="en-CA" smtClean="0"/>
-              <a:t>2024-02-05</a:t>
+              <a:t>2024-02-23</a:t>
             </a:fld>
             <a:endParaRPr lang="en-CA"/>
           </a:p>
@@ -2420,7 +2430,7 @@
           <a:p>
             <a:fld id="{28E627C4-8EBF-403B-AE19-F9A1CE4B216A}" type="datetimeFigureOut">
               <a:rPr lang="en-CA" smtClean="0"/>
-              <a:t>2024-02-05</a:t>
+              <a:t>2024-02-23</a:t>
             </a:fld>
             <a:endParaRPr lang="en-CA"/>
           </a:p>
@@ -2709,7 +2719,7 @@
           <a:p>
             <a:fld id="{28E627C4-8EBF-403B-AE19-F9A1CE4B216A}" type="datetimeFigureOut">
               <a:rPr lang="en-CA" smtClean="0"/>
-              <a:t>2024-02-05</a:t>
+              <a:t>2024-02-23</a:t>
             </a:fld>
             <a:endParaRPr lang="en-CA"/>
           </a:p>
@@ -2952,7 +2962,7 @@
           <a:p>
             <a:fld id="{28E627C4-8EBF-403B-AE19-F9A1CE4B216A}" type="datetimeFigureOut">
               <a:rPr lang="en-CA" smtClean="0"/>
-              <a:t>2024-02-05</a:t>
+              <a:t>2024-02-23</a:t>
             </a:fld>
             <a:endParaRPr lang="en-CA"/>
           </a:p>
@@ -6884,6 +6894,1334 @@
 </p:sld>
 </file>
 
+<file path=ppt/slides/slide16.xml><?xml version="1.0" encoding="utf-8"?>
+<p:sld xmlns:a="http://schemas.openxmlformats.org/drawingml/2006/main" xmlns:r="http://schemas.openxmlformats.org/officeDocument/2006/relationships" xmlns:p="http://schemas.openxmlformats.org/presentationml/2006/main">
+  <p:cSld>
+    <p:spTree>
+      <p:nvGrpSpPr>
+        <p:cNvPr id="1" name=""/>
+        <p:cNvGrpSpPr/>
+        <p:nvPr/>
+      </p:nvGrpSpPr>
+      <p:grpSpPr>
+        <a:xfrm>
+          <a:off x="0" y="0"/>
+          <a:ext cx="0" cy="0"/>
+          <a:chOff x="0" y="0"/>
+          <a:chExt cx="0" cy="0"/>
+        </a:xfrm>
+      </p:grpSpPr>
+      <p:sp>
+        <p:nvSpPr>
+          <p:cNvPr id="2" name="Title 1">
+            <a:extLst>
+              <a:ext uri="{FF2B5EF4-FFF2-40B4-BE49-F238E27FC236}">
+                <a16:creationId xmlns:a16="http://schemas.microsoft.com/office/drawing/2014/main" id="{3B9BED46-7A94-EA14-4314-B0AC81821011}"/>
+              </a:ext>
+            </a:extLst>
+          </p:cNvPr>
+          <p:cNvSpPr>
+            <a:spLocks noGrp="1"/>
+          </p:cNvSpPr>
+          <p:nvPr>
+            <p:ph type="title"/>
+          </p:nvPr>
+        </p:nvSpPr>
+        <p:spPr/>
+        <p:txBody>
+          <a:bodyPr/>
+          <a:lstStyle/>
+          <a:p>
+            <a:r>
+              <a:rPr lang="en-US" dirty="0"/>
+              <a:t>Building a Complete Multilayered Neural Network</a:t>
+            </a:r>
+          </a:p>
+        </p:txBody>
+      </p:sp>
+      <p:sp>
+        <p:nvSpPr>
+          <p:cNvPr id="3" name="Text Placeholder 2">
+            <a:extLst>
+              <a:ext uri="{FF2B5EF4-FFF2-40B4-BE49-F238E27FC236}">
+                <a16:creationId xmlns:a16="http://schemas.microsoft.com/office/drawing/2014/main" id="{CB4BEB3E-2A50-F92C-9471-42D05B6A3158}"/>
+              </a:ext>
+            </a:extLst>
+          </p:cNvPr>
+          <p:cNvSpPr>
+            <a:spLocks noGrp="1"/>
+          </p:cNvSpPr>
+          <p:nvPr>
+            <p:ph type="body" idx="1"/>
+          </p:nvPr>
+        </p:nvSpPr>
+        <p:spPr/>
+        <p:txBody>
+          <a:bodyPr/>
+          <a:lstStyle/>
+          <a:p>
+            <a:endParaRPr lang="en-US"/>
+          </a:p>
+        </p:txBody>
+      </p:sp>
+    </p:spTree>
+    <p:extLst>
+      <p:ext uri="{BB962C8B-B14F-4D97-AF65-F5344CB8AC3E}">
+        <p14:creationId xmlns:p14="http://schemas.microsoft.com/office/powerpoint/2010/main" val="315432011"/>
+      </p:ext>
+    </p:extLst>
+  </p:cSld>
+  <p:clrMapOvr>
+    <a:masterClrMapping/>
+  </p:clrMapOvr>
+</p:sld>
+</file>
+
+<file path=ppt/slides/slide17.xml><?xml version="1.0" encoding="utf-8"?>
+<p:sld xmlns:a="http://schemas.openxmlformats.org/drawingml/2006/main" xmlns:r="http://schemas.openxmlformats.org/officeDocument/2006/relationships" xmlns:p="http://schemas.openxmlformats.org/presentationml/2006/main">
+  <p:cSld>
+    <p:spTree>
+      <p:nvGrpSpPr>
+        <p:cNvPr id="1" name=""/>
+        <p:cNvGrpSpPr/>
+        <p:nvPr/>
+      </p:nvGrpSpPr>
+      <p:grpSpPr>
+        <a:xfrm>
+          <a:off x="0" y="0"/>
+          <a:ext cx="0" cy="0"/>
+          <a:chOff x="0" y="0"/>
+          <a:chExt cx="0" cy="0"/>
+        </a:xfrm>
+      </p:grpSpPr>
+      <p:sp>
+        <p:nvSpPr>
+          <p:cNvPr id="2" name="Title 1">
+            <a:extLst>
+              <a:ext uri="{FF2B5EF4-FFF2-40B4-BE49-F238E27FC236}">
+                <a16:creationId xmlns:a16="http://schemas.microsoft.com/office/drawing/2014/main" id="{46E6ADAB-801D-6ED0-6D2D-578EE11AEB41}"/>
+              </a:ext>
+            </a:extLst>
+          </p:cNvPr>
+          <p:cNvSpPr>
+            <a:spLocks noGrp="1"/>
+          </p:cNvSpPr>
+          <p:nvPr>
+            <p:ph type="title"/>
+          </p:nvPr>
+        </p:nvSpPr>
+        <p:spPr>
+          <a:xfrm>
+            <a:off x="573280" y="1202963"/>
+            <a:ext cx="4289277" cy="4872182"/>
+          </a:xfrm>
+        </p:spPr>
+        <p:txBody>
+          <a:bodyPr>
+            <a:normAutofit/>
+          </a:bodyPr>
+          <a:lstStyle/>
+          <a:p>
+            <a:r>
+              <a:rPr lang="en-US" dirty="0"/>
+              <a:t>What does a complete fully connected Neural Network Look like?</a:t>
+            </a:r>
+          </a:p>
+        </p:txBody>
+      </p:sp>
+      <p:pic>
+        <p:nvPicPr>
+          <p:cNvPr id="1028" name="Picture 4" descr="Artificial neural network - Wikipedia">
+            <a:extLst>
+              <a:ext uri="{FF2B5EF4-FFF2-40B4-BE49-F238E27FC236}">
+                <a16:creationId xmlns:a16="http://schemas.microsoft.com/office/drawing/2014/main" id="{4273EFE5-859B-438D-8C6D-4FB19051FBE6}"/>
+              </a:ext>
+            </a:extLst>
+          </p:cNvPr>
+          <p:cNvPicPr>
+            <a:picLocks noChangeAspect="1" noChangeArrowheads="1"/>
+          </p:cNvPicPr>
+          <p:nvPr/>
+        </p:nvPicPr>
+        <p:blipFill>
+          <a:blip r:embed="rId2">
+            <a:extLst>
+              <a:ext uri="{28A0092B-C50C-407E-A947-70E740481C1C}">
+                <a14:useLocalDpi xmlns:a14="http://schemas.microsoft.com/office/drawing/2010/main" val="0"/>
+              </a:ext>
+            </a:extLst>
+          </a:blip>
+          <a:srcRect/>
+          <a:stretch>
+            <a:fillRect/>
+          </a:stretch>
+        </p:blipFill>
+        <p:spPr bwMode="auto">
+          <a:xfrm>
+            <a:off x="4936694" y="371958"/>
+            <a:ext cx="6682026" cy="6114084"/>
+          </a:xfrm>
+          <a:prstGeom prst="rect">
+            <a:avLst/>
+          </a:prstGeom>
+          <a:noFill/>
+          <a:extLst>
+            <a:ext uri="{909E8E84-426E-40DD-AFC4-6F175D3DCCD1}">
+              <a14:hiddenFill xmlns:a14="http://schemas.microsoft.com/office/drawing/2010/main">
+                <a:solidFill>
+                  <a:srgbClr val="FFFFFF"/>
+                </a:solidFill>
+              </a14:hiddenFill>
+            </a:ext>
+          </a:extLst>
+        </p:spPr>
+      </p:pic>
+    </p:spTree>
+    <p:extLst>
+      <p:ext uri="{BB962C8B-B14F-4D97-AF65-F5344CB8AC3E}">
+        <p14:creationId xmlns:p14="http://schemas.microsoft.com/office/powerpoint/2010/main" val="2854078752"/>
+      </p:ext>
+    </p:extLst>
+  </p:cSld>
+  <p:clrMapOvr>
+    <a:masterClrMapping/>
+  </p:clrMapOvr>
+</p:sld>
+</file>
+
+<file path=ppt/slides/slide18.xml><?xml version="1.0" encoding="utf-8"?>
+<p:sld xmlns:a="http://schemas.openxmlformats.org/drawingml/2006/main" xmlns:r="http://schemas.openxmlformats.org/officeDocument/2006/relationships" xmlns:p="http://schemas.openxmlformats.org/presentationml/2006/main">
+  <p:cSld>
+    <p:spTree>
+      <p:nvGrpSpPr>
+        <p:cNvPr id="1" name=""/>
+        <p:cNvGrpSpPr/>
+        <p:nvPr/>
+      </p:nvGrpSpPr>
+      <p:grpSpPr>
+        <a:xfrm>
+          <a:off x="0" y="0"/>
+          <a:ext cx="0" cy="0"/>
+          <a:chOff x="0" y="0"/>
+          <a:chExt cx="0" cy="0"/>
+        </a:xfrm>
+      </p:grpSpPr>
+      <p:sp>
+        <p:nvSpPr>
+          <p:cNvPr id="2" name="Title 1">
+            <a:extLst>
+              <a:ext uri="{FF2B5EF4-FFF2-40B4-BE49-F238E27FC236}">
+                <a16:creationId xmlns:a16="http://schemas.microsoft.com/office/drawing/2014/main" id="{E95BC452-551B-F231-4178-EAC053CDD06C}"/>
+              </a:ext>
+            </a:extLst>
+          </p:cNvPr>
+          <p:cNvSpPr>
+            <a:spLocks noGrp="1"/>
+          </p:cNvSpPr>
+          <p:nvPr>
+            <p:ph type="title"/>
+          </p:nvPr>
+        </p:nvSpPr>
+        <p:spPr/>
+        <p:txBody>
+          <a:bodyPr/>
+          <a:lstStyle/>
+          <a:p>
+            <a:r>
+              <a:rPr lang="en-US" dirty="0"/>
+              <a:t>So how do we achieve this?</a:t>
+            </a:r>
+          </a:p>
+        </p:txBody>
+      </p:sp>
+      <p:sp>
+        <p:nvSpPr>
+          <p:cNvPr id="3" name="Content Placeholder 2">
+            <a:extLst>
+              <a:ext uri="{FF2B5EF4-FFF2-40B4-BE49-F238E27FC236}">
+                <a16:creationId xmlns:a16="http://schemas.microsoft.com/office/drawing/2014/main" id="{EB89B20F-FDE2-0E28-637D-6B3FC8070C25}"/>
+              </a:ext>
+            </a:extLst>
+          </p:cNvPr>
+          <p:cNvSpPr>
+            <a:spLocks noGrp="1"/>
+          </p:cNvSpPr>
+          <p:nvPr>
+            <p:ph idx="1"/>
+          </p:nvPr>
+        </p:nvSpPr>
+        <p:spPr>
+          <a:xfrm>
+            <a:off x="838200" y="1825625"/>
+            <a:ext cx="10515600" cy="2418384"/>
+          </a:xfrm>
+        </p:spPr>
+        <p:txBody>
+          <a:bodyPr/>
+          <a:lstStyle/>
+          <a:p>
+            <a:r>
+              <a:rPr lang="en-US" dirty="0"/>
+              <a:t>During the output stage, output of the previous layer becomes the input of the next layer. This will propagate down the chain until the last output layer gives us the answer.</a:t>
+            </a:r>
+          </a:p>
+          <a:p>
+            <a:endParaRPr lang="en-US" dirty="0"/>
+          </a:p>
+          <a:p>
+            <a:r>
+              <a:rPr lang="en-US" dirty="0"/>
+              <a:t>This technique is known as Forward Propagation.</a:t>
+            </a:r>
+          </a:p>
+        </p:txBody>
+      </p:sp>
+      <p:grpSp>
+        <p:nvGrpSpPr>
+          <p:cNvPr id="5" name="Group 4">
+            <a:extLst>
+              <a:ext uri="{FF2B5EF4-FFF2-40B4-BE49-F238E27FC236}">
+                <a16:creationId xmlns:a16="http://schemas.microsoft.com/office/drawing/2014/main" id="{6753EC3A-5D05-08C5-1AF9-C6063B504DA7}"/>
+              </a:ext>
+            </a:extLst>
+          </p:cNvPr>
+          <p:cNvGrpSpPr/>
+          <p:nvPr/>
+        </p:nvGrpSpPr>
+        <p:grpSpPr>
+          <a:xfrm>
+            <a:off x="387626" y="4279558"/>
+            <a:ext cx="7918972" cy="2272952"/>
+            <a:chOff x="387626" y="4279558"/>
+            <a:chExt cx="7918972" cy="2272952"/>
+          </a:xfrm>
+        </p:grpSpPr>
+        <p:grpSp>
+          <p:nvGrpSpPr>
+            <p:cNvPr id="4" name="Group 3">
+              <a:extLst>
+                <a:ext uri="{FF2B5EF4-FFF2-40B4-BE49-F238E27FC236}">
+                  <a16:creationId xmlns:a16="http://schemas.microsoft.com/office/drawing/2014/main" id="{BB9B94BE-5184-76D1-C5F0-544A8DFABCAA}"/>
+                </a:ext>
+              </a:extLst>
+            </p:cNvPr>
+            <p:cNvGrpSpPr/>
+            <p:nvPr/>
+          </p:nvGrpSpPr>
+          <p:grpSpPr>
+            <a:xfrm>
+              <a:off x="387626" y="4676361"/>
+              <a:ext cx="7812156" cy="1876149"/>
+              <a:chOff x="387626" y="4676361"/>
+              <a:chExt cx="7812156" cy="1876149"/>
+            </a:xfrm>
+          </p:grpSpPr>
+          <p:sp>
+            <p:nvSpPr>
+              <p:cNvPr id="7" name="Oval 6">
+                <a:extLst>
+                  <a:ext uri="{FF2B5EF4-FFF2-40B4-BE49-F238E27FC236}">
+                    <a16:creationId xmlns:a16="http://schemas.microsoft.com/office/drawing/2014/main" id="{A1397CC5-B813-93EC-E976-ED6A4CF04680}"/>
+                  </a:ext>
+                </a:extLst>
+              </p:cNvPr>
+              <p:cNvSpPr/>
+              <p:nvPr/>
+            </p:nvSpPr>
+            <p:spPr>
+              <a:xfrm>
+                <a:off x="387626" y="5396948"/>
+                <a:ext cx="1769165" cy="745435"/>
+              </a:xfrm>
+              <a:prstGeom prst="ellipse">
+                <a:avLst/>
+              </a:prstGeom>
+            </p:spPr>
+            <p:style>
+              <a:lnRef idx="2">
+                <a:schemeClr val="accent5">
+                  <a:shade val="15000"/>
+                </a:schemeClr>
+              </a:lnRef>
+              <a:fillRef idx="1">
+                <a:schemeClr val="accent5"/>
+              </a:fillRef>
+              <a:effectRef idx="0">
+                <a:schemeClr val="accent5"/>
+              </a:effectRef>
+              <a:fontRef idx="minor">
+                <a:schemeClr val="lt1"/>
+              </a:fontRef>
+            </p:style>
+            <p:txBody>
+              <a:bodyPr rtlCol="0" anchor="ctr"/>
+              <a:lstStyle/>
+              <a:p>
+                <a:pPr algn="ctr"/>
+                <a:r>
+                  <a:rPr lang="en-US" dirty="0"/>
+                  <a:t>Input</a:t>
+                </a:r>
+              </a:p>
+            </p:txBody>
+          </p:sp>
+          <p:sp>
+            <p:nvSpPr>
+              <p:cNvPr id="8" name="Oval 7">
+                <a:extLst>
+                  <a:ext uri="{FF2B5EF4-FFF2-40B4-BE49-F238E27FC236}">
+                    <a16:creationId xmlns:a16="http://schemas.microsoft.com/office/drawing/2014/main" id="{614A1D50-9646-4767-E8F9-5EB2C7E5B8F0}"/>
+                  </a:ext>
+                </a:extLst>
+              </p:cNvPr>
+              <p:cNvSpPr/>
+              <p:nvPr/>
+            </p:nvSpPr>
+            <p:spPr>
+              <a:xfrm>
+                <a:off x="3379302" y="4735996"/>
+                <a:ext cx="844827" cy="745435"/>
+              </a:xfrm>
+              <a:prstGeom prst="ellipse">
+                <a:avLst/>
+              </a:prstGeom>
+            </p:spPr>
+            <p:style>
+              <a:lnRef idx="2">
+                <a:schemeClr val="accent1">
+                  <a:shade val="15000"/>
+                </a:schemeClr>
+              </a:lnRef>
+              <a:fillRef idx="1">
+                <a:schemeClr val="accent1"/>
+              </a:fillRef>
+              <a:effectRef idx="0">
+                <a:schemeClr val="accent1"/>
+              </a:effectRef>
+              <a:fontRef idx="minor">
+                <a:schemeClr val="lt1"/>
+              </a:fontRef>
+            </p:style>
+            <p:txBody>
+              <a:bodyPr rtlCol="0" anchor="ctr"/>
+              <a:lstStyle/>
+              <a:p>
+                <a:pPr algn="ctr"/>
+                <a:endParaRPr lang="en-US" dirty="0"/>
+              </a:p>
+            </p:txBody>
+          </p:sp>
+          <p:sp>
+            <p:nvSpPr>
+              <p:cNvPr id="10" name="Oval 9">
+                <a:extLst>
+                  <a:ext uri="{FF2B5EF4-FFF2-40B4-BE49-F238E27FC236}">
+                    <a16:creationId xmlns:a16="http://schemas.microsoft.com/office/drawing/2014/main" id="{C0B14D4A-2A25-31EF-CCAF-C901C9AD9E6F}"/>
+                  </a:ext>
+                </a:extLst>
+              </p:cNvPr>
+              <p:cNvSpPr/>
+              <p:nvPr/>
+            </p:nvSpPr>
+            <p:spPr>
+              <a:xfrm>
+                <a:off x="3379302" y="5779604"/>
+                <a:ext cx="844827" cy="745435"/>
+              </a:xfrm>
+              <a:prstGeom prst="ellipse">
+                <a:avLst/>
+              </a:prstGeom>
+            </p:spPr>
+            <p:style>
+              <a:lnRef idx="2">
+                <a:schemeClr val="accent1">
+                  <a:shade val="15000"/>
+                </a:schemeClr>
+              </a:lnRef>
+              <a:fillRef idx="1">
+                <a:schemeClr val="accent1"/>
+              </a:fillRef>
+              <a:effectRef idx="0">
+                <a:schemeClr val="accent1"/>
+              </a:effectRef>
+              <a:fontRef idx="minor">
+                <a:schemeClr val="lt1"/>
+              </a:fontRef>
+            </p:style>
+            <p:txBody>
+              <a:bodyPr rtlCol="0" anchor="ctr"/>
+              <a:lstStyle/>
+              <a:p>
+                <a:pPr algn="ctr"/>
+                <a:endParaRPr lang="en-US" dirty="0"/>
+              </a:p>
+            </p:txBody>
+          </p:sp>
+          <p:sp>
+            <p:nvSpPr>
+              <p:cNvPr id="11" name="Oval 10">
+                <a:extLst>
+                  <a:ext uri="{FF2B5EF4-FFF2-40B4-BE49-F238E27FC236}">
+                    <a16:creationId xmlns:a16="http://schemas.microsoft.com/office/drawing/2014/main" id="{5808D3BB-B153-14FB-9AFF-53135973C139}"/>
+                  </a:ext>
+                </a:extLst>
+              </p:cNvPr>
+              <p:cNvSpPr/>
+              <p:nvPr/>
+            </p:nvSpPr>
+            <p:spPr>
+              <a:xfrm>
+                <a:off x="5251173" y="4686300"/>
+                <a:ext cx="844827" cy="745435"/>
+              </a:xfrm>
+              <a:prstGeom prst="ellipse">
+                <a:avLst/>
+              </a:prstGeom>
+            </p:spPr>
+            <p:style>
+              <a:lnRef idx="2">
+                <a:schemeClr val="accent1">
+                  <a:shade val="15000"/>
+                </a:schemeClr>
+              </a:lnRef>
+              <a:fillRef idx="1">
+                <a:schemeClr val="accent1"/>
+              </a:fillRef>
+              <a:effectRef idx="0">
+                <a:schemeClr val="accent1"/>
+              </a:effectRef>
+              <a:fontRef idx="minor">
+                <a:schemeClr val="lt1"/>
+              </a:fontRef>
+            </p:style>
+            <p:txBody>
+              <a:bodyPr rtlCol="0" anchor="ctr"/>
+              <a:lstStyle/>
+              <a:p>
+                <a:pPr algn="ctr"/>
+                <a:endParaRPr lang="en-US" dirty="0"/>
+              </a:p>
+            </p:txBody>
+          </p:sp>
+          <p:sp>
+            <p:nvSpPr>
+              <p:cNvPr id="12" name="Oval 11">
+                <a:extLst>
+                  <a:ext uri="{FF2B5EF4-FFF2-40B4-BE49-F238E27FC236}">
+                    <a16:creationId xmlns:a16="http://schemas.microsoft.com/office/drawing/2014/main" id="{65D9993F-8ED0-427D-671E-ECC60DE4984D}"/>
+                  </a:ext>
+                </a:extLst>
+              </p:cNvPr>
+              <p:cNvSpPr/>
+              <p:nvPr/>
+            </p:nvSpPr>
+            <p:spPr>
+              <a:xfrm>
+                <a:off x="5251172" y="5769665"/>
+                <a:ext cx="844827" cy="745435"/>
+              </a:xfrm>
+              <a:prstGeom prst="ellipse">
+                <a:avLst/>
+              </a:prstGeom>
+            </p:spPr>
+            <p:style>
+              <a:lnRef idx="2">
+                <a:schemeClr val="accent1">
+                  <a:shade val="15000"/>
+                </a:schemeClr>
+              </a:lnRef>
+              <a:fillRef idx="1">
+                <a:schemeClr val="accent1"/>
+              </a:fillRef>
+              <a:effectRef idx="0">
+                <a:schemeClr val="accent1"/>
+              </a:effectRef>
+              <a:fontRef idx="minor">
+                <a:schemeClr val="lt1"/>
+              </a:fontRef>
+            </p:style>
+            <p:txBody>
+              <a:bodyPr rtlCol="0" anchor="ctr"/>
+              <a:lstStyle/>
+              <a:p>
+                <a:pPr algn="ctr"/>
+                <a:endParaRPr lang="en-US" dirty="0"/>
+              </a:p>
+            </p:txBody>
+          </p:sp>
+          <p:sp>
+            <p:nvSpPr>
+              <p:cNvPr id="13" name="Oval 12">
+                <a:extLst>
+                  <a:ext uri="{FF2B5EF4-FFF2-40B4-BE49-F238E27FC236}">
+                    <a16:creationId xmlns:a16="http://schemas.microsoft.com/office/drawing/2014/main" id="{40466B05-A466-502D-B2F1-869BD6A07D3E}"/>
+                  </a:ext>
+                </a:extLst>
+              </p:cNvPr>
+              <p:cNvSpPr/>
+              <p:nvPr/>
+            </p:nvSpPr>
+            <p:spPr>
+              <a:xfrm>
+                <a:off x="7354955" y="4676361"/>
+                <a:ext cx="844827" cy="745435"/>
+              </a:xfrm>
+              <a:prstGeom prst="ellipse">
+                <a:avLst/>
+              </a:prstGeom>
+            </p:spPr>
+            <p:style>
+              <a:lnRef idx="2">
+                <a:schemeClr val="accent1">
+                  <a:shade val="15000"/>
+                </a:schemeClr>
+              </a:lnRef>
+              <a:fillRef idx="1">
+                <a:schemeClr val="accent1"/>
+              </a:fillRef>
+              <a:effectRef idx="0">
+                <a:schemeClr val="accent1"/>
+              </a:effectRef>
+              <a:fontRef idx="minor">
+                <a:schemeClr val="lt1"/>
+              </a:fontRef>
+            </p:style>
+            <p:txBody>
+              <a:bodyPr rtlCol="0" anchor="ctr"/>
+              <a:lstStyle/>
+              <a:p>
+                <a:pPr algn="ctr"/>
+                <a:endParaRPr lang="en-US" dirty="0"/>
+              </a:p>
+            </p:txBody>
+          </p:sp>
+          <p:sp>
+            <p:nvSpPr>
+              <p:cNvPr id="14" name="Oval 13">
+                <a:extLst>
+                  <a:ext uri="{FF2B5EF4-FFF2-40B4-BE49-F238E27FC236}">
+                    <a16:creationId xmlns:a16="http://schemas.microsoft.com/office/drawing/2014/main" id="{AA68A483-2E7E-D399-E047-3828C417F1E2}"/>
+                  </a:ext>
+                </a:extLst>
+              </p:cNvPr>
+              <p:cNvSpPr/>
+              <p:nvPr/>
+            </p:nvSpPr>
+            <p:spPr>
+              <a:xfrm>
+                <a:off x="7318510" y="5807075"/>
+                <a:ext cx="844827" cy="745435"/>
+              </a:xfrm>
+              <a:prstGeom prst="ellipse">
+                <a:avLst/>
+              </a:prstGeom>
+            </p:spPr>
+            <p:style>
+              <a:lnRef idx="2">
+                <a:schemeClr val="accent1">
+                  <a:shade val="15000"/>
+                </a:schemeClr>
+              </a:lnRef>
+              <a:fillRef idx="1">
+                <a:schemeClr val="accent1"/>
+              </a:fillRef>
+              <a:effectRef idx="0">
+                <a:schemeClr val="accent1"/>
+              </a:effectRef>
+              <a:fontRef idx="minor">
+                <a:schemeClr val="lt1"/>
+              </a:fontRef>
+            </p:style>
+            <p:txBody>
+              <a:bodyPr rtlCol="0" anchor="ctr"/>
+              <a:lstStyle/>
+              <a:p>
+                <a:pPr algn="ctr"/>
+                <a:endParaRPr lang="en-US" dirty="0"/>
+              </a:p>
+            </p:txBody>
+          </p:sp>
+          <p:cxnSp>
+            <p:nvCxnSpPr>
+              <p:cNvPr id="16" name="Straight Arrow Connector 15">
+                <a:extLst>
+                  <a:ext uri="{FF2B5EF4-FFF2-40B4-BE49-F238E27FC236}">
+                    <a16:creationId xmlns:a16="http://schemas.microsoft.com/office/drawing/2014/main" id="{EB7C10D9-C528-433D-D936-B8D1AE939241}"/>
+                  </a:ext>
+                </a:extLst>
+              </p:cNvPr>
+              <p:cNvCxnSpPr>
+                <a:stCxn id="7" idx="6"/>
+                <a:endCxn id="8" idx="2"/>
+              </p:cNvCxnSpPr>
+              <p:nvPr/>
+            </p:nvCxnSpPr>
+            <p:spPr>
+              <a:xfrm flipV="1">
+                <a:off x="2156791" y="5108714"/>
+                <a:ext cx="1222511" cy="660952"/>
+              </a:xfrm>
+              <a:prstGeom prst="straightConnector1">
+                <a:avLst/>
+              </a:prstGeom>
+              <a:ln>
+                <a:tailEnd type="triangle"/>
+              </a:ln>
+            </p:spPr>
+            <p:style>
+              <a:lnRef idx="1">
+                <a:schemeClr val="accent1"/>
+              </a:lnRef>
+              <a:fillRef idx="0">
+                <a:schemeClr val="accent1"/>
+              </a:fillRef>
+              <a:effectRef idx="0">
+                <a:schemeClr val="accent1"/>
+              </a:effectRef>
+              <a:fontRef idx="minor">
+                <a:schemeClr val="tx1"/>
+              </a:fontRef>
+            </p:style>
+          </p:cxnSp>
+          <p:cxnSp>
+            <p:nvCxnSpPr>
+              <p:cNvPr id="18" name="Straight Arrow Connector 17">
+                <a:extLst>
+                  <a:ext uri="{FF2B5EF4-FFF2-40B4-BE49-F238E27FC236}">
+                    <a16:creationId xmlns:a16="http://schemas.microsoft.com/office/drawing/2014/main" id="{14375E0D-A60C-AFD8-2E02-B9CF6AC8C588}"/>
+                  </a:ext>
+                </a:extLst>
+              </p:cNvPr>
+              <p:cNvCxnSpPr>
+                <a:stCxn id="8" idx="6"/>
+                <a:endCxn id="11" idx="2"/>
+              </p:cNvCxnSpPr>
+              <p:nvPr/>
+            </p:nvCxnSpPr>
+            <p:spPr>
+              <a:xfrm flipV="1">
+                <a:off x="4224129" y="5059018"/>
+                <a:ext cx="1027044" cy="49696"/>
+              </a:xfrm>
+              <a:prstGeom prst="straightConnector1">
+                <a:avLst/>
+              </a:prstGeom>
+              <a:ln>
+                <a:tailEnd type="triangle"/>
+              </a:ln>
+            </p:spPr>
+            <p:style>
+              <a:lnRef idx="1">
+                <a:schemeClr val="accent1"/>
+              </a:lnRef>
+              <a:fillRef idx="0">
+                <a:schemeClr val="accent1"/>
+              </a:fillRef>
+              <a:effectRef idx="0">
+                <a:schemeClr val="accent1"/>
+              </a:effectRef>
+              <a:fontRef idx="minor">
+                <a:schemeClr val="tx1"/>
+              </a:fontRef>
+            </p:style>
+          </p:cxnSp>
+          <p:cxnSp>
+            <p:nvCxnSpPr>
+              <p:cNvPr id="20" name="Straight Arrow Connector 19">
+                <a:extLst>
+                  <a:ext uri="{FF2B5EF4-FFF2-40B4-BE49-F238E27FC236}">
+                    <a16:creationId xmlns:a16="http://schemas.microsoft.com/office/drawing/2014/main" id="{F7AAEFB7-95E3-7106-6E13-658A4B60B633}"/>
+                  </a:ext>
+                </a:extLst>
+              </p:cNvPr>
+              <p:cNvCxnSpPr>
+                <a:stCxn id="8" idx="6"/>
+                <a:endCxn id="12" idx="2"/>
+              </p:cNvCxnSpPr>
+              <p:nvPr/>
+            </p:nvCxnSpPr>
+            <p:spPr>
+              <a:xfrm>
+                <a:off x="4224129" y="5108714"/>
+                <a:ext cx="1027043" cy="1033669"/>
+              </a:xfrm>
+              <a:prstGeom prst="straightConnector1">
+                <a:avLst/>
+              </a:prstGeom>
+              <a:ln>
+                <a:tailEnd type="triangle"/>
+              </a:ln>
+            </p:spPr>
+            <p:style>
+              <a:lnRef idx="1">
+                <a:schemeClr val="accent1"/>
+              </a:lnRef>
+              <a:fillRef idx="0">
+                <a:schemeClr val="accent1"/>
+              </a:fillRef>
+              <a:effectRef idx="0">
+                <a:schemeClr val="accent1"/>
+              </a:effectRef>
+              <a:fontRef idx="minor">
+                <a:schemeClr val="tx1"/>
+              </a:fontRef>
+            </p:style>
+          </p:cxnSp>
+          <p:cxnSp>
+            <p:nvCxnSpPr>
+              <p:cNvPr id="22" name="Straight Arrow Connector 21">
+                <a:extLst>
+                  <a:ext uri="{FF2B5EF4-FFF2-40B4-BE49-F238E27FC236}">
+                    <a16:creationId xmlns:a16="http://schemas.microsoft.com/office/drawing/2014/main" id="{C38EB649-B8EF-23D9-DAAC-78907C62F63C}"/>
+                  </a:ext>
+                </a:extLst>
+              </p:cNvPr>
+              <p:cNvCxnSpPr>
+                <a:stCxn id="11" idx="6"/>
+                <a:endCxn id="13" idx="2"/>
+              </p:cNvCxnSpPr>
+              <p:nvPr/>
+            </p:nvCxnSpPr>
+            <p:spPr>
+              <a:xfrm flipV="1">
+                <a:off x="6096000" y="5049079"/>
+                <a:ext cx="1258955" cy="9939"/>
+              </a:xfrm>
+              <a:prstGeom prst="straightConnector1">
+                <a:avLst/>
+              </a:prstGeom>
+              <a:ln>
+                <a:tailEnd type="triangle"/>
+              </a:ln>
+            </p:spPr>
+            <p:style>
+              <a:lnRef idx="1">
+                <a:schemeClr val="accent1"/>
+              </a:lnRef>
+              <a:fillRef idx="0">
+                <a:schemeClr val="accent1"/>
+              </a:fillRef>
+              <a:effectRef idx="0">
+                <a:schemeClr val="accent1"/>
+              </a:effectRef>
+              <a:fontRef idx="minor">
+                <a:schemeClr val="tx1"/>
+              </a:fontRef>
+            </p:style>
+          </p:cxnSp>
+          <p:cxnSp>
+            <p:nvCxnSpPr>
+              <p:cNvPr id="24" name="Straight Arrow Connector 23">
+                <a:extLst>
+                  <a:ext uri="{FF2B5EF4-FFF2-40B4-BE49-F238E27FC236}">
+                    <a16:creationId xmlns:a16="http://schemas.microsoft.com/office/drawing/2014/main" id="{C402B7E5-17CD-FFA7-2A53-46EAD4CDE99C}"/>
+                  </a:ext>
+                </a:extLst>
+              </p:cNvPr>
+              <p:cNvCxnSpPr>
+                <a:stCxn id="11" idx="6"/>
+                <a:endCxn id="14" idx="2"/>
+              </p:cNvCxnSpPr>
+              <p:nvPr/>
+            </p:nvCxnSpPr>
+            <p:spPr>
+              <a:xfrm>
+                <a:off x="6096000" y="5059018"/>
+                <a:ext cx="1222510" cy="1120775"/>
+              </a:xfrm>
+              <a:prstGeom prst="straightConnector1">
+                <a:avLst/>
+              </a:prstGeom>
+              <a:ln>
+                <a:tailEnd type="triangle"/>
+              </a:ln>
+            </p:spPr>
+            <p:style>
+              <a:lnRef idx="1">
+                <a:schemeClr val="accent1"/>
+              </a:lnRef>
+              <a:fillRef idx="0">
+                <a:schemeClr val="accent1"/>
+              </a:fillRef>
+              <a:effectRef idx="0">
+                <a:schemeClr val="accent1"/>
+              </a:effectRef>
+              <a:fontRef idx="minor">
+                <a:schemeClr val="tx1"/>
+              </a:fontRef>
+            </p:style>
+          </p:cxnSp>
+          <p:cxnSp>
+            <p:nvCxnSpPr>
+              <p:cNvPr id="26" name="Straight Arrow Connector 25">
+                <a:extLst>
+                  <a:ext uri="{FF2B5EF4-FFF2-40B4-BE49-F238E27FC236}">
+                    <a16:creationId xmlns:a16="http://schemas.microsoft.com/office/drawing/2014/main" id="{10A66AB5-A6E1-19C1-C9D4-B1EC44EFD9C8}"/>
+                  </a:ext>
+                </a:extLst>
+              </p:cNvPr>
+              <p:cNvCxnSpPr>
+                <a:stCxn id="12" idx="6"/>
+                <a:endCxn id="13" idx="2"/>
+              </p:cNvCxnSpPr>
+              <p:nvPr/>
+            </p:nvCxnSpPr>
+            <p:spPr>
+              <a:xfrm flipV="1">
+                <a:off x="6095999" y="5049079"/>
+                <a:ext cx="1258956" cy="1093304"/>
+              </a:xfrm>
+              <a:prstGeom prst="straightConnector1">
+                <a:avLst/>
+              </a:prstGeom>
+              <a:ln>
+                <a:tailEnd type="triangle"/>
+              </a:ln>
+            </p:spPr>
+            <p:style>
+              <a:lnRef idx="1">
+                <a:schemeClr val="accent1"/>
+              </a:lnRef>
+              <a:fillRef idx="0">
+                <a:schemeClr val="accent1"/>
+              </a:fillRef>
+              <a:effectRef idx="0">
+                <a:schemeClr val="accent1"/>
+              </a:effectRef>
+              <a:fontRef idx="minor">
+                <a:schemeClr val="tx1"/>
+              </a:fontRef>
+            </p:style>
+          </p:cxnSp>
+          <p:cxnSp>
+            <p:nvCxnSpPr>
+              <p:cNvPr id="28" name="Straight Arrow Connector 27">
+                <a:extLst>
+                  <a:ext uri="{FF2B5EF4-FFF2-40B4-BE49-F238E27FC236}">
+                    <a16:creationId xmlns:a16="http://schemas.microsoft.com/office/drawing/2014/main" id="{A0D80D18-D3CD-F5E9-A2C1-CE3A2AE273B1}"/>
+                  </a:ext>
+                </a:extLst>
+              </p:cNvPr>
+              <p:cNvCxnSpPr>
+                <a:stCxn id="12" idx="6"/>
+                <a:endCxn id="14" idx="2"/>
+              </p:cNvCxnSpPr>
+              <p:nvPr/>
+            </p:nvCxnSpPr>
+            <p:spPr>
+              <a:xfrm>
+                <a:off x="6095999" y="6142383"/>
+                <a:ext cx="1222511" cy="37410"/>
+              </a:xfrm>
+              <a:prstGeom prst="straightConnector1">
+                <a:avLst/>
+              </a:prstGeom>
+              <a:ln>
+                <a:tailEnd type="triangle"/>
+              </a:ln>
+            </p:spPr>
+            <p:style>
+              <a:lnRef idx="1">
+                <a:schemeClr val="accent1"/>
+              </a:lnRef>
+              <a:fillRef idx="0">
+                <a:schemeClr val="accent1"/>
+              </a:fillRef>
+              <a:effectRef idx="0">
+                <a:schemeClr val="accent1"/>
+              </a:effectRef>
+              <a:fontRef idx="minor">
+                <a:schemeClr val="tx1"/>
+              </a:fontRef>
+            </p:style>
+          </p:cxnSp>
+          <p:cxnSp>
+            <p:nvCxnSpPr>
+              <p:cNvPr id="30" name="Straight Arrow Connector 29">
+                <a:extLst>
+                  <a:ext uri="{FF2B5EF4-FFF2-40B4-BE49-F238E27FC236}">
+                    <a16:creationId xmlns:a16="http://schemas.microsoft.com/office/drawing/2014/main" id="{752FF3BE-35E7-0524-822C-9B82AC26F613}"/>
+                  </a:ext>
+                </a:extLst>
+              </p:cNvPr>
+              <p:cNvCxnSpPr>
+                <a:stCxn id="10" idx="6"/>
+                <a:endCxn id="12" idx="2"/>
+              </p:cNvCxnSpPr>
+              <p:nvPr/>
+            </p:nvCxnSpPr>
+            <p:spPr>
+              <a:xfrm flipV="1">
+                <a:off x="4224129" y="6142383"/>
+                <a:ext cx="1027043" cy="9939"/>
+              </a:xfrm>
+              <a:prstGeom prst="straightConnector1">
+                <a:avLst/>
+              </a:prstGeom>
+              <a:ln>
+                <a:tailEnd type="triangle"/>
+              </a:ln>
+            </p:spPr>
+            <p:style>
+              <a:lnRef idx="1">
+                <a:schemeClr val="accent1"/>
+              </a:lnRef>
+              <a:fillRef idx="0">
+                <a:schemeClr val="accent1"/>
+              </a:fillRef>
+              <a:effectRef idx="0">
+                <a:schemeClr val="accent1"/>
+              </a:effectRef>
+              <a:fontRef idx="minor">
+                <a:schemeClr val="tx1"/>
+              </a:fontRef>
+            </p:style>
+          </p:cxnSp>
+          <p:cxnSp>
+            <p:nvCxnSpPr>
+              <p:cNvPr id="32" name="Straight Arrow Connector 31">
+                <a:extLst>
+                  <a:ext uri="{FF2B5EF4-FFF2-40B4-BE49-F238E27FC236}">
+                    <a16:creationId xmlns:a16="http://schemas.microsoft.com/office/drawing/2014/main" id="{1A6DFF43-E3CF-4B62-F383-92CCAFF85534}"/>
+                  </a:ext>
+                </a:extLst>
+              </p:cNvPr>
+              <p:cNvCxnSpPr>
+                <a:stCxn id="10" idx="6"/>
+                <a:endCxn id="11" idx="2"/>
+              </p:cNvCxnSpPr>
+              <p:nvPr/>
+            </p:nvCxnSpPr>
+            <p:spPr>
+              <a:xfrm flipV="1">
+                <a:off x="4224129" y="5059018"/>
+                <a:ext cx="1027044" cy="1093304"/>
+              </a:xfrm>
+              <a:prstGeom prst="straightConnector1">
+                <a:avLst/>
+              </a:prstGeom>
+              <a:ln>
+                <a:tailEnd type="triangle"/>
+              </a:ln>
+            </p:spPr>
+            <p:style>
+              <a:lnRef idx="1">
+                <a:schemeClr val="accent1"/>
+              </a:lnRef>
+              <a:fillRef idx="0">
+                <a:schemeClr val="accent1"/>
+              </a:fillRef>
+              <a:effectRef idx="0">
+                <a:schemeClr val="accent1"/>
+              </a:effectRef>
+              <a:fontRef idx="minor">
+                <a:schemeClr val="tx1"/>
+              </a:fontRef>
+            </p:style>
+          </p:cxnSp>
+          <p:cxnSp>
+            <p:nvCxnSpPr>
+              <p:cNvPr id="34" name="Straight Arrow Connector 33">
+                <a:extLst>
+                  <a:ext uri="{FF2B5EF4-FFF2-40B4-BE49-F238E27FC236}">
+                    <a16:creationId xmlns:a16="http://schemas.microsoft.com/office/drawing/2014/main" id="{87F31B1F-10F0-5548-A589-6E94002AF370}"/>
+                  </a:ext>
+                </a:extLst>
+              </p:cNvPr>
+              <p:cNvCxnSpPr>
+                <a:stCxn id="7" idx="6"/>
+                <a:endCxn id="10" idx="2"/>
+              </p:cNvCxnSpPr>
+              <p:nvPr/>
+            </p:nvCxnSpPr>
+            <p:spPr>
+              <a:xfrm>
+                <a:off x="2156791" y="5769666"/>
+                <a:ext cx="1222511" cy="382656"/>
+              </a:xfrm>
+              <a:prstGeom prst="straightConnector1">
+                <a:avLst/>
+              </a:prstGeom>
+              <a:ln>
+                <a:tailEnd type="triangle"/>
+              </a:ln>
+            </p:spPr>
+            <p:style>
+              <a:lnRef idx="1">
+                <a:schemeClr val="accent1"/>
+              </a:lnRef>
+              <a:fillRef idx="0">
+                <a:schemeClr val="accent1"/>
+              </a:fillRef>
+              <a:effectRef idx="0">
+                <a:schemeClr val="accent1"/>
+              </a:effectRef>
+              <a:fontRef idx="minor">
+                <a:schemeClr val="tx1"/>
+              </a:fontRef>
+            </p:style>
+          </p:cxnSp>
+        </p:grpSp>
+        <p:sp>
+          <p:nvSpPr>
+            <p:cNvPr id="35" name="TextBox 34">
+              <a:extLst>
+                <a:ext uri="{FF2B5EF4-FFF2-40B4-BE49-F238E27FC236}">
+                  <a16:creationId xmlns:a16="http://schemas.microsoft.com/office/drawing/2014/main" id="{4B8760DC-4CC1-D57A-E929-67B23ADBAF5B}"/>
+                </a:ext>
+              </a:extLst>
+            </p:cNvPr>
+            <p:cNvSpPr txBox="1"/>
+            <p:nvPr/>
+          </p:nvSpPr>
+          <p:spPr>
+            <a:xfrm>
+              <a:off x="3349482" y="4326908"/>
+              <a:ext cx="988088" cy="369332"/>
+            </a:xfrm>
+            <a:prstGeom prst="rect">
+              <a:avLst/>
+            </a:prstGeom>
+            <a:noFill/>
+          </p:spPr>
+          <p:txBody>
+            <a:bodyPr wrap="square" rtlCol="0">
+              <a:spAutoFit/>
+            </a:bodyPr>
+            <a:lstStyle/>
+            <a:p>
+              <a:r>
+                <a:rPr lang="en-US" dirty="0"/>
+                <a:t>Layer 1</a:t>
+              </a:r>
+            </a:p>
+          </p:txBody>
+        </p:sp>
+        <p:sp>
+          <p:nvSpPr>
+            <p:cNvPr id="36" name="TextBox 35">
+              <a:extLst>
+                <a:ext uri="{FF2B5EF4-FFF2-40B4-BE49-F238E27FC236}">
+                  <a16:creationId xmlns:a16="http://schemas.microsoft.com/office/drawing/2014/main" id="{483999C1-5ED4-8954-250E-213F5BACAC96}"/>
+                </a:ext>
+              </a:extLst>
+            </p:cNvPr>
+            <p:cNvSpPr txBox="1"/>
+            <p:nvPr/>
+          </p:nvSpPr>
+          <p:spPr>
+            <a:xfrm>
+              <a:off x="5179541" y="4279558"/>
+              <a:ext cx="988088" cy="369332"/>
+            </a:xfrm>
+            <a:prstGeom prst="rect">
+              <a:avLst/>
+            </a:prstGeom>
+            <a:noFill/>
+          </p:spPr>
+          <p:txBody>
+            <a:bodyPr wrap="square" rtlCol="0">
+              <a:spAutoFit/>
+            </a:bodyPr>
+            <a:lstStyle/>
+            <a:p>
+              <a:r>
+                <a:rPr lang="en-US" dirty="0"/>
+                <a:t>Layer 2</a:t>
+              </a:r>
+            </a:p>
+          </p:txBody>
+        </p:sp>
+        <p:sp>
+          <p:nvSpPr>
+            <p:cNvPr id="37" name="TextBox 36">
+              <a:extLst>
+                <a:ext uri="{FF2B5EF4-FFF2-40B4-BE49-F238E27FC236}">
+                  <a16:creationId xmlns:a16="http://schemas.microsoft.com/office/drawing/2014/main" id="{40552030-795B-8707-5178-58562853E277}"/>
+                </a:ext>
+              </a:extLst>
+            </p:cNvPr>
+            <p:cNvSpPr txBox="1"/>
+            <p:nvPr/>
+          </p:nvSpPr>
+          <p:spPr>
+            <a:xfrm>
+              <a:off x="7318510" y="4321939"/>
+              <a:ext cx="988088" cy="369332"/>
+            </a:xfrm>
+            <a:prstGeom prst="rect">
+              <a:avLst/>
+            </a:prstGeom>
+            <a:noFill/>
+          </p:spPr>
+          <p:txBody>
+            <a:bodyPr wrap="square" rtlCol="0">
+              <a:spAutoFit/>
+            </a:bodyPr>
+            <a:lstStyle/>
+            <a:p>
+              <a:r>
+                <a:rPr lang="en-US" dirty="0"/>
+                <a:t>Output</a:t>
+              </a:r>
+            </a:p>
+          </p:txBody>
+        </p:sp>
+      </p:grpSp>
+    </p:spTree>
+    <p:extLst>
+      <p:ext uri="{BB962C8B-B14F-4D97-AF65-F5344CB8AC3E}">
+        <p14:creationId xmlns:p14="http://schemas.microsoft.com/office/powerpoint/2010/main" val="1906058420"/>
+      </p:ext>
+    </p:extLst>
+  </p:cSld>
+  <p:clrMapOvr>
+    <a:masterClrMapping/>
+  </p:clrMapOvr>
+</p:sld>
+</file>
+
+<file path=ppt/slides/slide19.xml><?xml version="1.0" encoding="utf-8"?>
+<p:sld xmlns:a="http://schemas.openxmlformats.org/drawingml/2006/main" xmlns:r="http://schemas.openxmlformats.org/officeDocument/2006/relationships" xmlns:p="http://schemas.openxmlformats.org/presentationml/2006/main">
+  <p:cSld>
+    <p:spTree>
+      <p:nvGrpSpPr>
+        <p:cNvPr id="1" name=""/>
+        <p:cNvGrpSpPr/>
+        <p:nvPr/>
+      </p:nvGrpSpPr>
+      <p:grpSpPr>
+        <a:xfrm>
+          <a:off x="0" y="0"/>
+          <a:ext cx="0" cy="0"/>
+          <a:chOff x="0" y="0"/>
+          <a:chExt cx="0" cy="0"/>
+        </a:xfrm>
+      </p:grpSpPr>
+      <p:sp>
+        <p:nvSpPr>
+          <p:cNvPr id="2" name="Title 1">
+            <a:extLst>
+              <a:ext uri="{FF2B5EF4-FFF2-40B4-BE49-F238E27FC236}">
+                <a16:creationId xmlns:a16="http://schemas.microsoft.com/office/drawing/2014/main" id="{CE53AD67-4782-AB90-71F3-9AC7402A4276}"/>
+              </a:ext>
+            </a:extLst>
+          </p:cNvPr>
+          <p:cNvSpPr>
+            <a:spLocks noGrp="1"/>
+          </p:cNvSpPr>
+          <p:nvPr>
+            <p:ph type="title"/>
+          </p:nvPr>
+        </p:nvSpPr>
+        <p:spPr/>
+        <p:txBody>
+          <a:bodyPr/>
+          <a:lstStyle/>
+          <a:p>
+            <a:r>
+              <a:rPr lang="en-US" dirty="0"/>
+              <a:t>Training a Multi layered NN</a:t>
+            </a:r>
+          </a:p>
+        </p:txBody>
+      </p:sp>
+      <p:sp>
+        <p:nvSpPr>
+          <p:cNvPr id="3" name="Content Placeholder 2">
+            <a:extLst>
+              <a:ext uri="{FF2B5EF4-FFF2-40B4-BE49-F238E27FC236}">
+                <a16:creationId xmlns:a16="http://schemas.microsoft.com/office/drawing/2014/main" id="{DDDC21ED-65B0-9CAE-60DC-353AC760B6B3}"/>
+              </a:ext>
+            </a:extLst>
+          </p:cNvPr>
+          <p:cNvSpPr>
+            <a:spLocks noGrp="1"/>
+          </p:cNvSpPr>
+          <p:nvPr>
+            <p:ph idx="1"/>
+          </p:nvPr>
+        </p:nvSpPr>
+        <p:spPr/>
+        <p:txBody>
+          <a:bodyPr/>
+          <a:lstStyle/>
+          <a:p>
+            <a:r>
+              <a:rPr lang="en-US" dirty="0"/>
+              <a:t>Training a multi layered NN is also known as Backpropagation.</a:t>
+            </a:r>
+          </a:p>
+          <a:p>
+            <a:r>
+              <a:rPr lang="en-US" dirty="0"/>
+              <a:t>To train the current layer we calculate the error (i.e. how much the output was off the expected value) and then based on that we can calculate the cost</a:t>
+            </a:r>
+          </a:p>
+          <a:p>
+            <a:r>
+              <a:rPr lang="en-US" dirty="0"/>
+              <a:t>Error = Output - Expected</a:t>
+            </a:r>
+          </a:p>
+          <a:p>
+            <a:r>
+              <a:rPr lang="en-US" dirty="0"/>
+              <a:t>Cost = error * </a:t>
+            </a:r>
+            <a:r>
+              <a:rPr lang="en-US" dirty="0" err="1"/>
+              <a:t>dActivation</a:t>
+            </a:r>
+            <a:r>
+              <a:rPr lang="en-US" dirty="0"/>
+              <a:t>(output) * input</a:t>
+            </a:r>
+          </a:p>
+          <a:p>
+            <a:r>
+              <a:rPr lang="en-US" dirty="0"/>
+              <a:t>New Weight = Current Weight - Cost</a:t>
+            </a:r>
+          </a:p>
+          <a:p>
+            <a:r>
+              <a:rPr lang="en-US" dirty="0"/>
+              <a:t>To calculate the error to be passed to the previous layer we have</a:t>
+            </a:r>
+          </a:p>
+          <a:p>
+            <a:r>
+              <a:rPr lang="en-US" dirty="0"/>
+              <a:t>Prev Layer Error = sum(error*</a:t>
+            </a:r>
+            <a:r>
+              <a:rPr lang="en-US" dirty="0" err="1"/>
+              <a:t>dActivation</a:t>
+            </a:r>
+            <a:r>
+              <a:rPr lang="en-US" dirty="0"/>
+              <a:t>(output) * weights)</a:t>
+            </a:r>
+          </a:p>
+          <a:p>
+            <a:endParaRPr lang="en-US" dirty="0"/>
+          </a:p>
+        </p:txBody>
+      </p:sp>
+    </p:spTree>
+    <p:extLst>
+      <p:ext uri="{BB962C8B-B14F-4D97-AF65-F5344CB8AC3E}">
+        <p14:creationId xmlns:p14="http://schemas.microsoft.com/office/powerpoint/2010/main" val="3136085095"/>
+      </p:ext>
+    </p:extLst>
+  </p:cSld>
+  <p:clrMapOvr>
+    <a:masterClrMapping/>
+  </p:clrMapOvr>
+</p:sld>
+</file>
+
 <file path=ppt/slides/slide2.xml><?xml version="1.0" encoding="utf-8"?>
 <p:sld xmlns:a="http://schemas.openxmlformats.org/drawingml/2006/main" xmlns:r="http://schemas.openxmlformats.org/officeDocument/2006/relationships" xmlns:p="http://schemas.openxmlformats.org/presentationml/2006/main">
   <p:cSld>
@@ -7207,6 +8545,3373 @@
     <p:extLst>
       <p:ext uri="{BB962C8B-B14F-4D97-AF65-F5344CB8AC3E}">
         <p14:creationId xmlns:p14="http://schemas.microsoft.com/office/powerpoint/2010/main" val="3343030036"/>
+      </p:ext>
+    </p:extLst>
+  </p:cSld>
+  <p:clrMapOvr>
+    <a:masterClrMapping/>
+  </p:clrMapOvr>
+</p:sld>
+</file>
+
+<file path=ppt/slides/slide20.xml><?xml version="1.0" encoding="utf-8"?>
+<p:sld xmlns:a="http://schemas.openxmlformats.org/drawingml/2006/main" xmlns:r="http://schemas.openxmlformats.org/officeDocument/2006/relationships" xmlns:p="http://schemas.openxmlformats.org/presentationml/2006/main">
+  <p:cSld>
+    <p:spTree>
+      <p:nvGrpSpPr>
+        <p:cNvPr id="1" name=""/>
+        <p:cNvGrpSpPr/>
+        <p:nvPr/>
+      </p:nvGrpSpPr>
+      <p:grpSpPr>
+        <a:xfrm>
+          <a:off x="0" y="0"/>
+          <a:ext cx="0" cy="0"/>
+          <a:chOff x="0" y="0"/>
+          <a:chExt cx="0" cy="0"/>
+        </a:xfrm>
+      </p:grpSpPr>
+      <p:sp>
+        <p:nvSpPr>
+          <p:cNvPr id="2" name="Title 1">
+            <a:extLst>
+              <a:ext uri="{FF2B5EF4-FFF2-40B4-BE49-F238E27FC236}">
+                <a16:creationId xmlns:a16="http://schemas.microsoft.com/office/drawing/2014/main" id="{361FF4CC-C8CA-5789-D6A4-65A43D05467A}"/>
+              </a:ext>
+            </a:extLst>
+          </p:cNvPr>
+          <p:cNvSpPr>
+            <a:spLocks noGrp="1"/>
+          </p:cNvSpPr>
+          <p:nvPr>
+            <p:ph type="title"/>
+          </p:nvPr>
+        </p:nvSpPr>
+        <p:spPr/>
+        <p:txBody>
+          <a:bodyPr/>
+          <a:lstStyle/>
+          <a:p>
+            <a:r>
+              <a:rPr lang="en-US" dirty="0"/>
+              <a:t>Backpropagation in a Multilayered NN</a:t>
+            </a:r>
+          </a:p>
+        </p:txBody>
+      </p:sp>
+      <p:sp>
+        <p:nvSpPr>
+          <p:cNvPr id="4" name="Oval 3">
+            <a:extLst>
+              <a:ext uri="{FF2B5EF4-FFF2-40B4-BE49-F238E27FC236}">
+                <a16:creationId xmlns:a16="http://schemas.microsoft.com/office/drawing/2014/main" id="{43622D40-C63C-AAD2-F483-5A77009786DA}"/>
+              </a:ext>
+            </a:extLst>
+          </p:cNvPr>
+          <p:cNvSpPr/>
+          <p:nvPr/>
+        </p:nvSpPr>
+        <p:spPr>
+          <a:xfrm>
+            <a:off x="598208" y="3734515"/>
+            <a:ext cx="1572426" cy="640935"/>
+          </a:xfrm>
+          <a:prstGeom prst="ellipse">
+            <a:avLst/>
+          </a:prstGeom>
+        </p:spPr>
+        <p:style>
+          <a:lnRef idx="2">
+            <a:schemeClr val="accent1">
+              <a:shade val="15000"/>
+            </a:schemeClr>
+          </a:lnRef>
+          <a:fillRef idx="1">
+            <a:schemeClr val="accent1"/>
+          </a:fillRef>
+          <a:effectRef idx="0">
+            <a:schemeClr val="accent1"/>
+          </a:effectRef>
+          <a:fontRef idx="minor">
+            <a:schemeClr val="lt1"/>
+          </a:fontRef>
+        </p:style>
+        <p:txBody>
+          <a:bodyPr rtlCol="0" anchor="ctr"/>
+          <a:lstStyle/>
+          <a:p>
+            <a:pPr algn="ctr"/>
+            <a:r>
+              <a:rPr lang="en-US" dirty="0"/>
+              <a:t>Input</a:t>
+            </a:r>
+          </a:p>
+        </p:txBody>
+      </p:sp>
+      <p:sp>
+        <p:nvSpPr>
+          <p:cNvPr id="5" name="Oval 4">
+            <a:extLst>
+              <a:ext uri="{FF2B5EF4-FFF2-40B4-BE49-F238E27FC236}">
+                <a16:creationId xmlns:a16="http://schemas.microsoft.com/office/drawing/2014/main" id="{0246B22F-BE95-3817-4965-3EE6F40B480C}"/>
+              </a:ext>
+            </a:extLst>
+          </p:cNvPr>
+          <p:cNvSpPr/>
+          <p:nvPr/>
+        </p:nvSpPr>
+        <p:spPr>
+          <a:xfrm>
+            <a:off x="4512182" y="3034146"/>
+            <a:ext cx="2016806" cy="2008259"/>
+          </a:xfrm>
+          <a:prstGeom prst="ellipse">
+            <a:avLst/>
+          </a:prstGeom>
+        </p:spPr>
+        <p:style>
+          <a:lnRef idx="2">
+            <a:schemeClr val="accent1">
+              <a:shade val="15000"/>
+            </a:schemeClr>
+          </a:lnRef>
+          <a:fillRef idx="1">
+            <a:schemeClr val="accent1"/>
+          </a:fillRef>
+          <a:effectRef idx="0">
+            <a:schemeClr val="accent1"/>
+          </a:effectRef>
+          <a:fontRef idx="minor">
+            <a:schemeClr val="lt1"/>
+          </a:fontRef>
+        </p:style>
+        <p:txBody>
+          <a:bodyPr rtlCol="0" anchor="ctr"/>
+          <a:lstStyle/>
+          <a:p>
+            <a:pPr algn="ctr"/>
+            <a:r>
+              <a:rPr lang="en-US" dirty="0"/>
+              <a:t>Layer 1</a:t>
+            </a:r>
+          </a:p>
+          <a:p>
+            <a:pPr algn="ctr"/>
+            <a:r>
+              <a:rPr lang="en-US" dirty="0" err="1"/>
+              <a:t>newWeights</a:t>
+            </a:r>
+            <a:r>
+              <a:rPr lang="en-US" dirty="0"/>
+              <a:t> = </a:t>
+            </a:r>
+            <a:r>
+              <a:rPr lang="en-US" dirty="0" err="1"/>
+              <a:t>curWeights</a:t>
+            </a:r>
+            <a:r>
+              <a:rPr lang="en-US" dirty="0"/>
+              <a:t> - cost</a:t>
+            </a:r>
+          </a:p>
+        </p:txBody>
+      </p:sp>
+      <p:sp>
+        <p:nvSpPr>
+          <p:cNvPr id="6" name="Oval 5">
+            <a:extLst>
+              <a:ext uri="{FF2B5EF4-FFF2-40B4-BE49-F238E27FC236}">
+                <a16:creationId xmlns:a16="http://schemas.microsoft.com/office/drawing/2014/main" id="{92A4002A-11F1-E65C-B8F4-F65FE571E71C}"/>
+              </a:ext>
+            </a:extLst>
+          </p:cNvPr>
+          <p:cNvSpPr/>
+          <p:nvPr/>
+        </p:nvSpPr>
+        <p:spPr>
+          <a:xfrm>
+            <a:off x="8819261" y="4631822"/>
+            <a:ext cx="1333144" cy="589659"/>
+          </a:xfrm>
+          <a:prstGeom prst="ellipse">
+            <a:avLst/>
+          </a:prstGeom>
+        </p:spPr>
+        <p:style>
+          <a:lnRef idx="2">
+            <a:schemeClr val="accent1">
+              <a:shade val="15000"/>
+            </a:schemeClr>
+          </a:lnRef>
+          <a:fillRef idx="1">
+            <a:schemeClr val="accent1"/>
+          </a:fillRef>
+          <a:effectRef idx="0">
+            <a:schemeClr val="accent1"/>
+          </a:effectRef>
+          <a:fontRef idx="minor">
+            <a:schemeClr val="lt1"/>
+          </a:fontRef>
+        </p:style>
+        <p:txBody>
+          <a:bodyPr rtlCol="0" anchor="ctr"/>
+          <a:lstStyle/>
+          <a:p>
+            <a:pPr algn="ctr"/>
+            <a:r>
+              <a:rPr lang="en-US" dirty="0"/>
+              <a:t>Output</a:t>
+            </a:r>
+          </a:p>
+        </p:txBody>
+      </p:sp>
+      <p:sp>
+        <p:nvSpPr>
+          <p:cNvPr id="7" name="Rectangle: Rounded Corners 6">
+            <a:extLst>
+              <a:ext uri="{FF2B5EF4-FFF2-40B4-BE49-F238E27FC236}">
+                <a16:creationId xmlns:a16="http://schemas.microsoft.com/office/drawing/2014/main" id="{C8C7699C-EF45-CD1B-C966-2F96E87A5730}"/>
+              </a:ext>
+            </a:extLst>
+          </p:cNvPr>
+          <p:cNvSpPr/>
+          <p:nvPr/>
+        </p:nvSpPr>
+        <p:spPr>
+          <a:xfrm>
+            <a:off x="8870536" y="3184376"/>
+            <a:ext cx="1230594" cy="489247"/>
+          </a:xfrm>
+          <a:prstGeom prst="roundRect">
+            <a:avLst/>
+          </a:prstGeom>
+        </p:spPr>
+        <p:style>
+          <a:lnRef idx="2">
+            <a:schemeClr val="accent1">
+              <a:shade val="15000"/>
+            </a:schemeClr>
+          </a:lnRef>
+          <a:fillRef idx="1">
+            <a:schemeClr val="accent1"/>
+          </a:fillRef>
+          <a:effectRef idx="0">
+            <a:schemeClr val="accent1"/>
+          </a:effectRef>
+          <a:fontRef idx="minor">
+            <a:schemeClr val="lt1"/>
+          </a:fontRef>
+        </p:style>
+        <p:txBody>
+          <a:bodyPr rtlCol="0" anchor="ctr"/>
+          <a:lstStyle/>
+          <a:p>
+            <a:pPr algn="ctr"/>
+            <a:r>
+              <a:rPr lang="en-US" dirty="0"/>
+              <a:t>Expected</a:t>
+            </a:r>
+          </a:p>
+        </p:txBody>
+      </p:sp>
+      <p:cxnSp>
+        <p:nvCxnSpPr>
+          <p:cNvPr id="9" name="Straight Arrow Connector 8">
+            <a:extLst>
+              <a:ext uri="{FF2B5EF4-FFF2-40B4-BE49-F238E27FC236}">
+                <a16:creationId xmlns:a16="http://schemas.microsoft.com/office/drawing/2014/main" id="{133A5F7A-6FE7-D439-B965-0F7E16BC9E98}"/>
+              </a:ext>
+            </a:extLst>
+          </p:cNvPr>
+          <p:cNvCxnSpPr>
+            <a:stCxn id="7" idx="2"/>
+            <a:endCxn id="6" idx="0"/>
+          </p:cNvCxnSpPr>
+          <p:nvPr/>
+        </p:nvCxnSpPr>
+        <p:spPr>
+          <a:xfrm>
+            <a:off x="9485833" y="3673623"/>
+            <a:ext cx="0" cy="958199"/>
+          </a:xfrm>
+          <a:prstGeom prst="straightConnector1">
+            <a:avLst/>
+          </a:prstGeom>
+          <a:ln>
+            <a:headEnd type="triangle"/>
+            <a:tailEnd type="triangle"/>
+          </a:ln>
+        </p:spPr>
+        <p:style>
+          <a:lnRef idx="1">
+            <a:schemeClr val="accent1"/>
+          </a:lnRef>
+          <a:fillRef idx="0">
+            <a:schemeClr val="accent1"/>
+          </a:fillRef>
+          <a:effectRef idx="0">
+            <a:schemeClr val="accent1"/>
+          </a:effectRef>
+          <a:fontRef idx="minor">
+            <a:schemeClr val="tx1"/>
+          </a:fontRef>
+        </p:style>
+      </p:cxnSp>
+      <p:cxnSp>
+        <p:nvCxnSpPr>
+          <p:cNvPr id="12" name="Straight Arrow Connector 11">
+            <a:extLst>
+              <a:ext uri="{FF2B5EF4-FFF2-40B4-BE49-F238E27FC236}">
+                <a16:creationId xmlns:a16="http://schemas.microsoft.com/office/drawing/2014/main" id="{B2A8C4C2-1087-61F8-EF1F-0BC64A131CF5}"/>
+              </a:ext>
+            </a:extLst>
+          </p:cNvPr>
+          <p:cNvCxnSpPr>
+            <a:cxnSpLocks/>
+            <a:endCxn id="5" idx="6"/>
+          </p:cNvCxnSpPr>
+          <p:nvPr/>
+        </p:nvCxnSpPr>
+        <p:spPr>
+          <a:xfrm flipH="1" flipV="1">
+            <a:off x="6528988" y="4038276"/>
+            <a:ext cx="2956845" cy="16707"/>
+          </a:xfrm>
+          <a:prstGeom prst="straightConnector1">
+            <a:avLst/>
+          </a:prstGeom>
+          <a:ln>
+            <a:tailEnd type="triangle"/>
+          </a:ln>
+        </p:spPr>
+        <p:style>
+          <a:lnRef idx="1">
+            <a:schemeClr val="accent1"/>
+          </a:lnRef>
+          <a:fillRef idx="0">
+            <a:schemeClr val="accent1"/>
+          </a:fillRef>
+          <a:effectRef idx="0">
+            <a:schemeClr val="accent1"/>
+          </a:effectRef>
+          <a:fontRef idx="minor">
+            <a:schemeClr val="tx1"/>
+          </a:fontRef>
+        </p:style>
+      </p:cxnSp>
+      <p:cxnSp>
+        <p:nvCxnSpPr>
+          <p:cNvPr id="16" name="Straight Arrow Connector 15">
+            <a:extLst>
+              <a:ext uri="{FF2B5EF4-FFF2-40B4-BE49-F238E27FC236}">
+                <a16:creationId xmlns:a16="http://schemas.microsoft.com/office/drawing/2014/main" id="{98D9C405-D251-785C-BA53-4D410927A01A}"/>
+              </a:ext>
+            </a:extLst>
+          </p:cNvPr>
+          <p:cNvCxnSpPr>
+            <a:cxnSpLocks/>
+            <a:stCxn id="5" idx="2"/>
+            <a:endCxn id="4" idx="6"/>
+          </p:cNvCxnSpPr>
+          <p:nvPr/>
+        </p:nvCxnSpPr>
+        <p:spPr>
+          <a:xfrm flipH="1">
+            <a:off x="2170634" y="4038276"/>
+            <a:ext cx="2341548" cy="16707"/>
+          </a:xfrm>
+          <a:prstGeom prst="straightConnector1">
+            <a:avLst/>
+          </a:prstGeom>
+          <a:ln>
+            <a:tailEnd type="triangle"/>
+          </a:ln>
+        </p:spPr>
+        <p:style>
+          <a:lnRef idx="1">
+            <a:schemeClr val="accent1"/>
+          </a:lnRef>
+          <a:fillRef idx="0">
+            <a:schemeClr val="accent1"/>
+          </a:fillRef>
+          <a:effectRef idx="0">
+            <a:schemeClr val="accent1"/>
+          </a:effectRef>
+          <a:fontRef idx="minor">
+            <a:schemeClr val="tx1"/>
+          </a:fontRef>
+        </p:style>
+      </p:cxnSp>
+      <p:sp>
+        <p:nvSpPr>
+          <p:cNvPr id="18" name="TextBox 17">
+            <a:extLst>
+              <a:ext uri="{FF2B5EF4-FFF2-40B4-BE49-F238E27FC236}">
+                <a16:creationId xmlns:a16="http://schemas.microsoft.com/office/drawing/2014/main" id="{69189CAF-FC49-FE09-4C8B-695FDB1FF887}"/>
+              </a:ext>
+            </a:extLst>
+          </p:cNvPr>
+          <p:cNvSpPr txBox="1"/>
+          <p:nvPr/>
+        </p:nvSpPr>
+        <p:spPr>
+          <a:xfrm>
+            <a:off x="7204108" y="4054982"/>
+            <a:ext cx="1632246" cy="646331"/>
+          </a:xfrm>
+          <a:prstGeom prst="rect">
+            <a:avLst/>
+          </a:prstGeom>
+          <a:noFill/>
+        </p:spPr>
+        <p:txBody>
+          <a:bodyPr wrap="square" rtlCol="0">
+            <a:spAutoFit/>
+          </a:bodyPr>
+          <a:lstStyle/>
+          <a:p>
+            <a:r>
+              <a:rPr lang="en-US" dirty="0"/>
+              <a:t>Error = Output - Expected</a:t>
+            </a:r>
+          </a:p>
+        </p:txBody>
+      </p:sp>
+      <p:sp>
+        <p:nvSpPr>
+          <p:cNvPr id="19" name="TextBox 18">
+            <a:extLst>
+              <a:ext uri="{FF2B5EF4-FFF2-40B4-BE49-F238E27FC236}">
+                <a16:creationId xmlns:a16="http://schemas.microsoft.com/office/drawing/2014/main" id="{C21C0EE4-1D78-A27B-933B-83BB966A96A9}"/>
+              </a:ext>
+            </a:extLst>
+          </p:cNvPr>
+          <p:cNvSpPr txBox="1"/>
+          <p:nvPr/>
+        </p:nvSpPr>
+        <p:spPr>
+          <a:xfrm>
+            <a:off x="4724829" y="5059113"/>
+            <a:ext cx="2141719" cy="923330"/>
+          </a:xfrm>
+          <a:prstGeom prst="rect">
+            <a:avLst/>
+          </a:prstGeom>
+          <a:noFill/>
+        </p:spPr>
+        <p:txBody>
+          <a:bodyPr wrap="square" rtlCol="0">
+            <a:spAutoFit/>
+          </a:bodyPr>
+          <a:lstStyle/>
+          <a:p>
+            <a:r>
+              <a:rPr lang="en-US" dirty="0"/>
+              <a:t>Cost = error * </a:t>
+            </a:r>
+            <a:r>
+              <a:rPr lang="en-US" dirty="0" err="1"/>
+              <a:t>dActivation</a:t>
+            </a:r>
+            <a:r>
+              <a:rPr lang="en-US" dirty="0"/>
+              <a:t>(output) * input</a:t>
+            </a:r>
+          </a:p>
+        </p:txBody>
+      </p:sp>
+      <p:sp>
+        <p:nvSpPr>
+          <p:cNvPr id="28" name="TextBox 27">
+            <a:extLst>
+              <a:ext uri="{FF2B5EF4-FFF2-40B4-BE49-F238E27FC236}">
+                <a16:creationId xmlns:a16="http://schemas.microsoft.com/office/drawing/2014/main" id="{0F8E1A76-6676-9275-BC00-B553E65C1462}"/>
+              </a:ext>
+            </a:extLst>
+          </p:cNvPr>
+          <p:cNvSpPr txBox="1"/>
+          <p:nvPr/>
+        </p:nvSpPr>
+        <p:spPr>
+          <a:xfrm>
+            <a:off x="2411555" y="4190784"/>
+            <a:ext cx="2016806" cy="1477328"/>
+          </a:xfrm>
+          <a:prstGeom prst="rect">
+            <a:avLst/>
+          </a:prstGeom>
+          <a:noFill/>
+        </p:spPr>
+        <p:txBody>
+          <a:bodyPr wrap="square" rtlCol="0">
+            <a:spAutoFit/>
+          </a:bodyPr>
+          <a:lstStyle/>
+          <a:p>
+            <a:r>
+              <a:rPr lang="en-US" dirty="0"/>
+              <a:t>Error(</a:t>
+            </a:r>
+            <a:r>
+              <a:rPr lang="en-US" dirty="0" err="1"/>
+              <a:t>prev</a:t>
+            </a:r>
+            <a:r>
+              <a:rPr lang="en-US" dirty="0"/>
+              <a:t> layer) = sum(error * </a:t>
+            </a:r>
+            <a:r>
+              <a:rPr lang="en-US" dirty="0" err="1"/>
+              <a:t>dActivation</a:t>
+            </a:r>
+            <a:r>
+              <a:rPr lang="en-US" dirty="0"/>
+              <a:t>(output) * weights for this output.</a:t>
+            </a:r>
+          </a:p>
+        </p:txBody>
+      </p:sp>
+    </p:spTree>
+    <p:extLst>
+      <p:ext uri="{BB962C8B-B14F-4D97-AF65-F5344CB8AC3E}">
+        <p14:creationId xmlns:p14="http://schemas.microsoft.com/office/powerpoint/2010/main" val="4282885526"/>
+      </p:ext>
+    </p:extLst>
+  </p:cSld>
+  <p:clrMapOvr>
+    <a:masterClrMapping/>
+  </p:clrMapOvr>
+</p:sld>
+</file>
+
+<file path=ppt/slides/slide21.xml><?xml version="1.0" encoding="utf-8"?>
+<p:sld xmlns:a="http://schemas.openxmlformats.org/drawingml/2006/main" xmlns:r="http://schemas.openxmlformats.org/officeDocument/2006/relationships" xmlns:p="http://schemas.openxmlformats.org/presentationml/2006/main">
+  <p:cSld>
+    <p:spTree>
+      <p:nvGrpSpPr>
+        <p:cNvPr id="1" name=""/>
+        <p:cNvGrpSpPr/>
+        <p:nvPr/>
+      </p:nvGrpSpPr>
+      <p:grpSpPr>
+        <a:xfrm>
+          <a:off x="0" y="0"/>
+          <a:ext cx="0" cy="0"/>
+          <a:chOff x="0" y="0"/>
+          <a:chExt cx="0" cy="0"/>
+        </a:xfrm>
+      </p:grpSpPr>
+      <p:sp>
+        <p:nvSpPr>
+          <p:cNvPr id="2" name="Title 1">
+            <a:extLst>
+              <a:ext uri="{FF2B5EF4-FFF2-40B4-BE49-F238E27FC236}">
+                <a16:creationId xmlns:a16="http://schemas.microsoft.com/office/drawing/2014/main" id="{ACC050AB-9517-7E9C-30A4-3A66BE834962}"/>
+              </a:ext>
+            </a:extLst>
+          </p:cNvPr>
+          <p:cNvSpPr>
+            <a:spLocks noGrp="1"/>
+          </p:cNvSpPr>
+          <p:nvPr>
+            <p:ph type="title"/>
+          </p:nvPr>
+        </p:nvSpPr>
+        <p:spPr/>
+        <p:txBody>
+          <a:bodyPr/>
+          <a:lstStyle/>
+          <a:p>
+            <a:r>
+              <a:rPr lang="en-US" b="0" i="0" dirty="0">
+                <a:solidFill>
+                  <a:srgbClr val="212121"/>
+                </a:solidFill>
+                <a:effectLst/>
+                <a:latin typeface="__myFont_3ea10a"/>
+              </a:rPr>
+              <a:t>What is bias in a neural network?</a:t>
+            </a:r>
+            <a:endParaRPr lang="en-US" dirty="0"/>
+          </a:p>
+        </p:txBody>
+      </p:sp>
+      <p:sp>
+        <p:nvSpPr>
+          <p:cNvPr id="3" name="Content Placeholder 2">
+            <a:extLst>
+              <a:ext uri="{FF2B5EF4-FFF2-40B4-BE49-F238E27FC236}">
+                <a16:creationId xmlns:a16="http://schemas.microsoft.com/office/drawing/2014/main" id="{6C597719-E822-BACB-A83D-F28E7A9C82F6}"/>
+              </a:ext>
+            </a:extLst>
+          </p:cNvPr>
+          <p:cNvSpPr>
+            <a:spLocks noGrp="1"/>
+          </p:cNvSpPr>
+          <p:nvPr>
+            <p:ph idx="1"/>
+          </p:nvPr>
+        </p:nvSpPr>
+        <p:spPr/>
+        <p:txBody>
+          <a:bodyPr>
+            <a:normAutofit fontScale="92500" lnSpcReduction="20000"/>
+          </a:bodyPr>
+          <a:lstStyle/>
+          <a:p>
+            <a:r>
+              <a:rPr lang="en-US" dirty="0"/>
+              <a:t>We need to introduce a bias into the system to handle scenarios when weights become 0 or the input is 0</a:t>
+            </a:r>
+          </a:p>
+          <a:p>
+            <a:r>
+              <a:rPr lang="en-US" dirty="0"/>
+              <a:t>We also need to introduce a bias when we need to deal with absolute outputs like in logic gates.</a:t>
+            </a:r>
+          </a:p>
+          <a:p>
+            <a:r>
+              <a:rPr lang="en-US" dirty="0"/>
+              <a:t>Bias is introduced by adding or subtracting a very small value from the output (e.g. 0.01)</a:t>
+            </a:r>
+          </a:p>
+          <a:p>
+            <a:r>
+              <a:rPr lang="en-US" dirty="0"/>
+              <a:t>Bias prevents the neural network from getting stuck during training.</a:t>
+            </a:r>
+          </a:p>
+          <a:p>
+            <a:endParaRPr lang="en-US" dirty="0"/>
+          </a:p>
+          <a:p>
+            <a:r>
+              <a:rPr lang="en-US" dirty="0"/>
+              <a:t>Output = (input*weights) – 0.01</a:t>
+            </a:r>
+          </a:p>
+          <a:p>
+            <a:endParaRPr lang="en-US" dirty="0">
+              <a:hlinkClick r:id="rId2"/>
+            </a:endParaRPr>
+          </a:p>
+          <a:p>
+            <a:r>
+              <a:rPr lang="en-US" dirty="0">
+                <a:hlinkClick r:id="rId2"/>
+              </a:rPr>
+              <a:t>https://www.turing.com/kb/necessity-of-bias-in-neural-networks#why-is-bias-added-in-neural-networks?</a:t>
+            </a:r>
+            <a:endParaRPr lang="en-US" dirty="0"/>
+          </a:p>
+        </p:txBody>
+      </p:sp>
+    </p:spTree>
+    <p:extLst>
+      <p:ext uri="{BB962C8B-B14F-4D97-AF65-F5344CB8AC3E}">
+        <p14:creationId xmlns:p14="http://schemas.microsoft.com/office/powerpoint/2010/main" val="1620100083"/>
+      </p:ext>
+    </p:extLst>
+  </p:cSld>
+  <p:clrMapOvr>
+    <a:masterClrMapping/>
+  </p:clrMapOvr>
+</p:sld>
+</file>
+
+<file path=ppt/slides/slide22.xml><?xml version="1.0" encoding="utf-8"?>
+<p:sld xmlns:a="http://schemas.openxmlformats.org/drawingml/2006/main" xmlns:r="http://schemas.openxmlformats.org/officeDocument/2006/relationships" xmlns:p="http://schemas.openxmlformats.org/presentationml/2006/main">
+  <p:cSld>
+    <p:spTree>
+      <p:nvGrpSpPr>
+        <p:cNvPr id="1" name=""/>
+        <p:cNvGrpSpPr/>
+        <p:nvPr/>
+      </p:nvGrpSpPr>
+      <p:grpSpPr>
+        <a:xfrm>
+          <a:off x="0" y="0"/>
+          <a:ext cx="0" cy="0"/>
+          <a:chOff x="0" y="0"/>
+          <a:chExt cx="0" cy="0"/>
+        </a:xfrm>
+      </p:grpSpPr>
+      <p:sp>
+        <p:nvSpPr>
+          <p:cNvPr id="2" name="Title 1">
+            <a:extLst>
+              <a:ext uri="{FF2B5EF4-FFF2-40B4-BE49-F238E27FC236}">
+                <a16:creationId xmlns:a16="http://schemas.microsoft.com/office/drawing/2014/main" id="{34F4CC3B-86F9-AF62-5294-2E2515575A5A}"/>
+              </a:ext>
+            </a:extLst>
+          </p:cNvPr>
+          <p:cNvSpPr>
+            <a:spLocks noGrp="1"/>
+          </p:cNvSpPr>
+          <p:nvPr>
+            <p:ph type="title"/>
+          </p:nvPr>
+        </p:nvSpPr>
+        <p:spPr/>
+        <p:txBody>
+          <a:bodyPr/>
+          <a:lstStyle/>
+          <a:p>
+            <a:r>
+              <a:rPr lang="en-US" dirty="0"/>
+              <a:t>Designing the Network Topology</a:t>
+            </a:r>
+          </a:p>
+        </p:txBody>
+      </p:sp>
+      <p:sp>
+        <p:nvSpPr>
+          <p:cNvPr id="3" name="Content Placeholder 2">
+            <a:extLst>
+              <a:ext uri="{FF2B5EF4-FFF2-40B4-BE49-F238E27FC236}">
+                <a16:creationId xmlns:a16="http://schemas.microsoft.com/office/drawing/2014/main" id="{791C5C41-19C7-6ED0-F414-600407724FBA}"/>
+              </a:ext>
+            </a:extLst>
+          </p:cNvPr>
+          <p:cNvSpPr>
+            <a:spLocks noGrp="1"/>
+          </p:cNvSpPr>
+          <p:nvPr>
+            <p:ph idx="1"/>
+          </p:nvPr>
+        </p:nvSpPr>
+        <p:spPr/>
+        <p:txBody>
+          <a:bodyPr/>
+          <a:lstStyle/>
+          <a:p>
+            <a:r>
+              <a:rPr lang="en-US" dirty="0"/>
+              <a:t>When creating a NN we must design the network topology and decide as to how many hidden layers we need.</a:t>
+            </a:r>
+          </a:p>
+          <a:p>
+            <a:r>
+              <a:rPr lang="en-US" dirty="0"/>
+              <a:t>We also need to decide on how wide a given hidden layer will need to be.</a:t>
+            </a:r>
+          </a:p>
+        </p:txBody>
+      </p:sp>
+    </p:spTree>
+    <p:extLst>
+      <p:ext uri="{BB962C8B-B14F-4D97-AF65-F5344CB8AC3E}">
+        <p14:creationId xmlns:p14="http://schemas.microsoft.com/office/powerpoint/2010/main" val="4158992404"/>
+      </p:ext>
+    </p:extLst>
+  </p:cSld>
+  <p:clrMapOvr>
+    <a:masterClrMapping/>
+  </p:clrMapOvr>
+</p:sld>
+</file>
+
+<file path=ppt/slides/slide23.xml><?xml version="1.0" encoding="utf-8"?>
+<p:sld xmlns:a="http://schemas.openxmlformats.org/drawingml/2006/main" xmlns:r="http://schemas.openxmlformats.org/officeDocument/2006/relationships" xmlns:p="http://schemas.openxmlformats.org/presentationml/2006/main">
+  <p:cSld>
+    <p:spTree>
+      <p:nvGrpSpPr>
+        <p:cNvPr id="1" name=""/>
+        <p:cNvGrpSpPr/>
+        <p:nvPr/>
+      </p:nvGrpSpPr>
+      <p:grpSpPr>
+        <a:xfrm>
+          <a:off x="0" y="0"/>
+          <a:ext cx="0" cy="0"/>
+          <a:chOff x="0" y="0"/>
+          <a:chExt cx="0" cy="0"/>
+        </a:xfrm>
+      </p:grpSpPr>
+      <p:sp>
+        <p:nvSpPr>
+          <p:cNvPr id="2" name="Title 1">
+            <a:extLst>
+              <a:ext uri="{FF2B5EF4-FFF2-40B4-BE49-F238E27FC236}">
+                <a16:creationId xmlns:a16="http://schemas.microsoft.com/office/drawing/2014/main" id="{84EC1A39-7015-28C1-54D0-88FA902DBCFA}"/>
+              </a:ext>
+            </a:extLst>
+          </p:cNvPr>
+          <p:cNvSpPr>
+            <a:spLocks noGrp="1"/>
+          </p:cNvSpPr>
+          <p:nvPr>
+            <p:ph type="title"/>
+          </p:nvPr>
+        </p:nvSpPr>
+        <p:spPr/>
+        <p:txBody>
+          <a:bodyPr/>
+          <a:lstStyle/>
+          <a:p>
+            <a:r>
+              <a:rPr lang="en-US" dirty="0"/>
+              <a:t>Creating the AND gate</a:t>
+            </a:r>
+          </a:p>
+        </p:txBody>
+      </p:sp>
+      <p:sp>
+        <p:nvSpPr>
+          <p:cNvPr id="3" name="Content Placeholder 2">
+            <a:extLst>
+              <a:ext uri="{FF2B5EF4-FFF2-40B4-BE49-F238E27FC236}">
+                <a16:creationId xmlns:a16="http://schemas.microsoft.com/office/drawing/2014/main" id="{8EB6D601-8922-1DE2-E86B-FB6ECFC8FDF3}"/>
+              </a:ext>
+            </a:extLst>
+          </p:cNvPr>
+          <p:cNvSpPr>
+            <a:spLocks noGrp="1"/>
+          </p:cNvSpPr>
+          <p:nvPr>
+            <p:ph idx="1"/>
+          </p:nvPr>
+        </p:nvSpPr>
+        <p:spPr/>
+        <p:txBody>
+          <a:bodyPr/>
+          <a:lstStyle/>
+          <a:p>
+            <a:r>
+              <a:rPr lang="en-US" dirty="0"/>
+              <a:t>For the AND </a:t>
+            </a:r>
+            <a:r>
+              <a:rPr lang="en-US" dirty="0" err="1"/>
+              <a:t>and</a:t>
+            </a:r>
+            <a:r>
+              <a:rPr lang="en-US" dirty="0"/>
+              <a:t> an XOR gate we need to segment our neural network to distinguish between</a:t>
+            </a:r>
+          </a:p>
+          <a:p>
+            <a:r>
+              <a:rPr lang="en-US" dirty="0"/>
+              <a:t>(1,1) </a:t>
+            </a:r>
+          </a:p>
+          <a:p>
+            <a:r>
+              <a:rPr lang="en-US" dirty="0"/>
+              <a:t>(0,1) (1,0)</a:t>
+            </a:r>
+          </a:p>
+          <a:p>
+            <a:r>
+              <a:rPr lang="en-US" dirty="0"/>
+              <a:t>(0,0)</a:t>
+            </a:r>
+          </a:p>
+          <a:p>
+            <a:r>
+              <a:rPr lang="en-US" dirty="0"/>
+              <a:t>For a simple AND or XOR gate we only need to worry about 1 level segmentation, so we will have 1 hidden layer</a:t>
+            </a:r>
+          </a:p>
+          <a:p>
+            <a:r>
+              <a:rPr lang="en-US" dirty="0"/>
+              <a:t>The hidden layer only needs to handle 3 segments of data </a:t>
+            </a:r>
+          </a:p>
+        </p:txBody>
+      </p:sp>
+    </p:spTree>
+    <p:extLst>
+      <p:ext uri="{BB962C8B-B14F-4D97-AF65-F5344CB8AC3E}">
+        <p14:creationId xmlns:p14="http://schemas.microsoft.com/office/powerpoint/2010/main" val="3390138153"/>
+      </p:ext>
+    </p:extLst>
+  </p:cSld>
+  <p:clrMapOvr>
+    <a:masterClrMapping/>
+  </p:clrMapOvr>
+</p:sld>
+</file>
+
+<file path=ppt/slides/slide24.xml><?xml version="1.0" encoding="utf-8"?>
+<p:sld xmlns:a="http://schemas.openxmlformats.org/drawingml/2006/main" xmlns:r="http://schemas.openxmlformats.org/officeDocument/2006/relationships" xmlns:p="http://schemas.openxmlformats.org/presentationml/2006/main">
+  <p:cSld>
+    <p:spTree>
+      <p:nvGrpSpPr>
+        <p:cNvPr id="1" name=""/>
+        <p:cNvGrpSpPr/>
+        <p:nvPr/>
+      </p:nvGrpSpPr>
+      <p:grpSpPr>
+        <a:xfrm>
+          <a:off x="0" y="0"/>
+          <a:ext cx="0" cy="0"/>
+          <a:chOff x="0" y="0"/>
+          <a:chExt cx="0" cy="0"/>
+        </a:xfrm>
+      </p:grpSpPr>
+      <p:sp>
+        <p:nvSpPr>
+          <p:cNvPr id="2" name="Title 1">
+            <a:extLst>
+              <a:ext uri="{FF2B5EF4-FFF2-40B4-BE49-F238E27FC236}">
+                <a16:creationId xmlns:a16="http://schemas.microsoft.com/office/drawing/2014/main" id="{7CFBE61F-3A76-3F6E-853C-31F61154EC8C}"/>
+              </a:ext>
+            </a:extLst>
+          </p:cNvPr>
+          <p:cNvSpPr>
+            <a:spLocks noGrp="1"/>
+          </p:cNvSpPr>
+          <p:nvPr>
+            <p:ph type="title"/>
+          </p:nvPr>
+        </p:nvSpPr>
+        <p:spPr/>
+        <p:txBody>
+          <a:bodyPr/>
+          <a:lstStyle/>
+          <a:p>
+            <a:r>
+              <a:rPr lang="en-US" dirty="0"/>
+              <a:t>AND/XOR gate topology</a:t>
+            </a:r>
+          </a:p>
+        </p:txBody>
+      </p:sp>
+      <p:grpSp>
+        <p:nvGrpSpPr>
+          <p:cNvPr id="57" name="Group 56">
+            <a:extLst>
+              <a:ext uri="{FF2B5EF4-FFF2-40B4-BE49-F238E27FC236}">
+                <a16:creationId xmlns:a16="http://schemas.microsoft.com/office/drawing/2014/main" id="{D402E032-F415-E654-5FED-3B26148090CB}"/>
+              </a:ext>
+            </a:extLst>
+          </p:cNvPr>
+          <p:cNvGrpSpPr/>
+          <p:nvPr/>
+        </p:nvGrpSpPr>
+        <p:grpSpPr>
+          <a:xfrm>
+            <a:off x="1432850" y="2123698"/>
+            <a:ext cx="7371558" cy="3768898"/>
+            <a:chOff x="1432850" y="2123698"/>
+            <a:chExt cx="7371558" cy="3768898"/>
+          </a:xfrm>
+        </p:grpSpPr>
+        <p:sp>
+          <p:nvSpPr>
+            <p:cNvPr id="9" name="Oval 8">
+              <a:extLst>
+                <a:ext uri="{FF2B5EF4-FFF2-40B4-BE49-F238E27FC236}">
+                  <a16:creationId xmlns:a16="http://schemas.microsoft.com/office/drawing/2014/main" id="{54FEFEE7-8F94-9F96-D69D-DB4964FBF6E3}"/>
+                </a:ext>
+              </a:extLst>
+            </p:cNvPr>
+            <p:cNvSpPr/>
+            <p:nvPr/>
+          </p:nvSpPr>
+          <p:spPr>
+            <a:xfrm>
+              <a:off x="1514059" y="3120888"/>
+              <a:ext cx="1769165" cy="745435"/>
+            </a:xfrm>
+            <a:prstGeom prst="ellipse">
+              <a:avLst/>
+            </a:prstGeom>
+          </p:spPr>
+          <p:style>
+            <a:lnRef idx="2">
+              <a:schemeClr val="accent5">
+                <a:shade val="15000"/>
+              </a:schemeClr>
+            </a:lnRef>
+            <a:fillRef idx="1">
+              <a:schemeClr val="accent5"/>
+            </a:fillRef>
+            <a:effectRef idx="0">
+              <a:schemeClr val="accent5"/>
+            </a:effectRef>
+            <a:fontRef idx="minor">
+              <a:schemeClr val="lt1"/>
+            </a:fontRef>
+          </p:style>
+          <p:txBody>
+            <a:bodyPr rtlCol="0" anchor="ctr"/>
+            <a:lstStyle/>
+            <a:p>
+              <a:pPr algn="ctr"/>
+              <a:r>
+                <a:rPr lang="en-US" dirty="0"/>
+                <a:t>Input 1</a:t>
+              </a:r>
+            </a:p>
+          </p:txBody>
+        </p:sp>
+        <p:sp>
+          <p:nvSpPr>
+            <p:cNvPr id="10" name="Oval 9">
+              <a:extLst>
+                <a:ext uri="{FF2B5EF4-FFF2-40B4-BE49-F238E27FC236}">
+                  <a16:creationId xmlns:a16="http://schemas.microsoft.com/office/drawing/2014/main" id="{35ADC907-F351-4C2C-1D61-1D84CCCA34CB}"/>
+                </a:ext>
+              </a:extLst>
+            </p:cNvPr>
+            <p:cNvSpPr/>
+            <p:nvPr/>
+          </p:nvSpPr>
+          <p:spPr>
+            <a:xfrm>
+              <a:off x="4702862" y="2581034"/>
+              <a:ext cx="844827" cy="745435"/>
+            </a:xfrm>
+            <a:prstGeom prst="ellipse">
+              <a:avLst/>
+            </a:prstGeom>
+          </p:spPr>
+          <p:style>
+            <a:lnRef idx="2">
+              <a:schemeClr val="accent1">
+                <a:shade val="15000"/>
+              </a:schemeClr>
+            </a:lnRef>
+            <a:fillRef idx="1">
+              <a:schemeClr val="accent1"/>
+            </a:fillRef>
+            <a:effectRef idx="0">
+              <a:schemeClr val="accent1"/>
+            </a:effectRef>
+            <a:fontRef idx="minor">
+              <a:schemeClr val="lt1"/>
+            </a:fontRef>
+          </p:style>
+          <p:txBody>
+            <a:bodyPr rtlCol="0" anchor="ctr"/>
+            <a:lstStyle/>
+            <a:p>
+              <a:pPr algn="ctr"/>
+              <a:endParaRPr lang="en-US" dirty="0"/>
+            </a:p>
+          </p:txBody>
+        </p:sp>
+        <p:sp>
+          <p:nvSpPr>
+            <p:cNvPr id="11" name="Oval 10">
+              <a:extLst>
+                <a:ext uri="{FF2B5EF4-FFF2-40B4-BE49-F238E27FC236}">
+                  <a16:creationId xmlns:a16="http://schemas.microsoft.com/office/drawing/2014/main" id="{BEE507C1-50F8-8100-5516-BC5CC1A1A6F1}"/>
+                </a:ext>
+              </a:extLst>
+            </p:cNvPr>
+            <p:cNvSpPr/>
+            <p:nvPr/>
+          </p:nvSpPr>
+          <p:spPr>
+            <a:xfrm>
+              <a:off x="4709884" y="3866323"/>
+              <a:ext cx="844827" cy="745435"/>
+            </a:xfrm>
+            <a:prstGeom prst="ellipse">
+              <a:avLst/>
+            </a:prstGeom>
+          </p:spPr>
+          <p:style>
+            <a:lnRef idx="2">
+              <a:schemeClr val="accent1">
+                <a:shade val="15000"/>
+              </a:schemeClr>
+            </a:lnRef>
+            <a:fillRef idx="1">
+              <a:schemeClr val="accent1"/>
+            </a:fillRef>
+            <a:effectRef idx="0">
+              <a:schemeClr val="accent1"/>
+            </a:effectRef>
+            <a:fontRef idx="minor">
+              <a:schemeClr val="lt1"/>
+            </a:fontRef>
+          </p:style>
+          <p:txBody>
+            <a:bodyPr rtlCol="0" anchor="ctr"/>
+            <a:lstStyle/>
+            <a:p>
+              <a:pPr algn="ctr"/>
+              <a:endParaRPr lang="en-US" dirty="0"/>
+            </a:p>
+          </p:txBody>
+        </p:sp>
+        <p:sp>
+          <p:nvSpPr>
+            <p:cNvPr id="14" name="Oval 13">
+              <a:extLst>
+                <a:ext uri="{FF2B5EF4-FFF2-40B4-BE49-F238E27FC236}">
+                  <a16:creationId xmlns:a16="http://schemas.microsoft.com/office/drawing/2014/main" id="{2AA17A07-EAD0-0C4D-3F7F-DD3AC95DC21B}"/>
+                </a:ext>
+              </a:extLst>
+            </p:cNvPr>
+            <p:cNvSpPr/>
+            <p:nvPr/>
+          </p:nvSpPr>
+          <p:spPr>
+            <a:xfrm>
+              <a:off x="7951302" y="3109776"/>
+              <a:ext cx="844827" cy="745435"/>
+            </a:xfrm>
+            <a:prstGeom prst="ellipse">
+              <a:avLst/>
+            </a:prstGeom>
+          </p:spPr>
+          <p:style>
+            <a:lnRef idx="2">
+              <a:schemeClr val="accent1">
+                <a:shade val="15000"/>
+              </a:schemeClr>
+            </a:lnRef>
+            <a:fillRef idx="1">
+              <a:schemeClr val="accent1"/>
+            </a:fillRef>
+            <a:effectRef idx="0">
+              <a:schemeClr val="accent1"/>
+            </a:effectRef>
+            <a:fontRef idx="minor">
+              <a:schemeClr val="lt1"/>
+            </a:fontRef>
+          </p:style>
+          <p:txBody>
+            <a:bodyPr rtlCol="0" anchor="ctr"/>
+            <a:lstStyle/>
+            <a:p>
+              <a:pPr algn="ctr"/>
+              <a:endParaRPr lang="en-US" dirty="0"/>
+            </a:p>
+          </p:txBody>
+        </p:sp>
+        <p:sp>
+          <p:nvSpPr>
+            <p:cNvPr id="15" name="Oval 14">
+              <a:extLst>
+                <a:ext uri="{FF2B5EF4-FFF2-40B4-BE49-F238E27FC236}">
+                  <a16:creationId xmlns:a16="http://schemas.microsoft.com/office/drawing/2014/main" id="{C836F97F-B688-5882-82A4-478B3D8FFA70}"/>
+                </a:ext>
+              </a:extLst>
+            </p:cNvPr>
+            <p:cNvSpPr/>
+            <p:nvPr/>
+          </p:nvSpPr>
+          <p:spPr>
+            <a:xfrm>
+              <a:off x="7959581" y="4299333"/>
+              <a:ext cx="844827" cy="745435"/>
+            </a:xfrm>
+            <a:prstGeom prst="ellipse">
+              <a:avLst/>
+            </a:prstGeom>
+          </p:spPr>
+          <p:style>
+            <a:lnRef idx="2">
+              <a:schemeClr val="accent1">
+                <a:shade val="15000"/>
+              </a:schemeClr>
+            </a:lnRef>
+            <a:fillRef idx="1">
+              <a:schemeClr val="accent1"/>
+            </a:fillRef>
+            <a:effectRef idx="0">
+              <a:schemeClr val="accent1"/>
+            </a:effectRef>
+            <a:fontRef idx="minor">
+              <a:schemeClr val="lt1"/>
+            </a:fontRef>
+          </p:style>
+          <p:txBody>
+            <a:bodyPr rtlCol="0" anchor="ctr"/>
+            <a:lstStyle/>
+            <a:p>
+              <a:pPr algn="ctr"/>
+              <a:endParaRPr lang="en-US" dirty="0"/>
+            </a:p>
+          </p:txBody>
+        </p:sp>
+        <p:cxnSp>
+          <p:nvCxnSpPr>
+            <p:cNvPr id="16" name="Straight Arrow Connector 15">
+              <a:extLst>
+                <a:ext uri="{FF2B5EF4-FFF2-40B4-BE49-F238E27FC236}">
+                  <a16:creationId xmlns:a16="http://schemas.microsoft.com/office/drawing/2014/main" id="{B098FDF8-8F8E-113E-4746-7977F00A405E}"/>
+                </a:ext>
+              </a:extLst>
+            </p:cNvPr>
+            <p:cNvCxnSpPr>
+              <a:stCxn id="9" idx="6"/>
+              <a:endCxn id="10" idx="2"/>
+            </p:cNvCxnSpPr>
+            <p:nvPr/>
+          </p:nvCxnSpPr>
+          <p:spPr>
+            <a:xfrm flipV="1">
+              <a:off x="3283224" y="2953752"/>
+              <a:ext cx="1419638" cy="539854"/>
+            </a:xfrm>
+            <a:prstGeom prst="straightConnector1">
+              <a:avLst/>
+            </a:prstGeom>
+            <a:ln>
+              <a:tailEnd type="triangle"/>
+            </a:ln>
+          </p:spPr>
+          <p:style>
+            <a:lnRef idx="1">
+              <a:schemeClr val="accent1"/>
+            </a:lnRef>
+            <a:fillRef idx="0">
+              <a:schemeClr val="accent1"/>
+            </a:fillRef>
+            <a:effectRef idx="0">
+              <a:schemeClr val="accent1"/>
+            </a:effectRef>
+            <a:fontRef idx="minor">
+              <a:schemeClr val="tx1"/>
+            </a:fontRef>
+          </p:style>
+        </p:cxnSp>
+        <p:cxnSp>
+          <p:nvCxnSpPr>
+            <p:cNvPr id="19" name="Straight Arrow Connector 18">
+              <a:extLst>
+                <a:ext uri="{FF2B5EF4-FFF2-40B4-BE49-F238E27FC236}">
+                  <a16:creationId xmlns:a16="http://schemas.microsoft.com/office/drawing/2014/main" id="{C503BF13-A534-DFD1-8704-EF7DFCDC70EF}"/>
+                </a:ext>
+              </a:extLst>
+            </p:cNvPr>
+            <p:cNvCxnSpPr>
+              <a:cxnSpLocks/>
+              <a:stCxn id="10" idx="6"/>
+              <a:endCxn id="14" idx="2"/>
+            </p:cNvCxnSpPr>
+            <p:nvPr/>
+          </p:nvCxnSpPr>
+          <p:spPr>
+            <a:xfrm>
+              <a:off x="5547689" y="2953752"/>
+              <a:ext cx="2403613" cy="528742"/>
+            </a:xfrm>
+            <a:prstGeom prst="straightConnector1">
+              <a:avLst/>
+            </a:prstGeom>
+            <a:ln>
+              <a:tailEnd type="triangle"/>
+            </a:ln>
+          </p:spPr>
+          <p:style>
+            <a:lnRef idx="1">
+              <a:schemeClr val="accent1"/>
+            </a:lnRef>
+            <a:fillRef idx="0">
+              <a:schemeClr val="accent1"/>
+            </a:fillRef>
+            <a:effectRef idx="0">
+              <a:schemeClr val="accent1"/>
+            </a:effectRef>
+            <a:fontRef idx="minor">
+              <a:schemeClr val="tx1"/>
+            </a:fontRef>
+          </p:style>
+        </p:cxnSp>
+        <p:cxnSp>
+          <p:nvCxnSpPr>
+            <p:cNvPr id="20" name="Straight Arrow Connector 19">
+              <a:extLst>
+                <a:ext uri="{FF2B5EF4-FFF2-40B4-BE49-F238E27FC236}">
+                  <a16:creationId xmlns:a16="http://schemas.microsoft.com/office/drawing/2014/main" id="{7DD3A8D9-EBB4-4D01-3B17-A80F2711A755}"/>
+                </a:ext>
+              </a:extLst>
+            </p:cNvPr>
+            <p:cNvCxnSpPr>
+              <a:cxnSpLocks/>
+              <a:stCxn id="10" idx="6"/>
+              <a:endCxn id="15" idx="2"/>
+            </p:cNvCxnSpPr>
+            <p:nvPr/>
+          </p:nvCxnSpPr>
+          <p:spPr>
+            <a:xfrm>
+              <a:off x="5547689" y="2953752"/>
+              <a:ext cx="2411892" cy="1718299"/>
+            </a:xfrm>
+            <a:prstGeom prst="straightConnector1">
+              <a:avLst/>
+            </a:prstGeom>
+            <a:ln>
+              <a:tailEnd type="triangle"/>
+            </a:ln>
+          </p:spPr>
+          <p:style>
+            <a:lnRef idx="1">
+              <a:schemeClr val="accent1"/>
+            </a:lnRef>
+            <a:fillRef idx="0">
+              <a:schemeClr val="accent1"/>
+            </a:fillRef>
+            <a:effectRef idx="0">
+              <a:schemeClr val="accent1"/>
+            </a:effectRef>
+            <a:fontRef idx="minor">
+              <a:schemeClr val="tx1"/>
+            </a:fontRef>
+          </p:style>
+        </p:cxnSp>
+        <p:cxnSp>
+          <p:nvCxnSpPr>
+            <p:cNvPr id="21" name="Straight Arrow Connector 20">
+              <a:extLst>
+                <a:ext uri="{FF2B5EF4-FFF2-40B4-BE49-F238E27FC236}">
+                  <a16:creationId xmlns:a16="http://schemas.microsoft.com/office/drawing/2014/main" id="{52DD1B7D-69B3-D4AC-50EB-0A3610A920EC}"/>
+                </a:ext>
+              </a:extLst>
+            </p:cNvPr>
+            <p:cNvCxnSpPr>
+              <a:cxnSpLocks/>
+              <a:stCxn id="31" idx="6"/>
+              <a:endCxn id="14" idx="2"/>
+            </p:cNvCxnSpPr>
+            <p:nvPr/>
+          </p:nvCxnSpPr>
+          <p:spPr>
+            <a:xfrm flipV="1">
+              <a:off x="5558851" y="3482494"/>
+              <a:ext cx="2392451" cy="2037385"/>
+            </a:xfrm>
+            <a:prstGeom prst="straightConnector1">
+              <a:avLst/>
+            </a:prstGeom>
+            <a:ln>
+              <a:tailEnd type="triangle"/>
+            </a:ln>
+          </p:spPr>
+          <p:style>
+            <a:lnRef idx="1">
+              <a:schemeClr val="accent1"/>
+            </a:lnRef>
+            <a:fillRef idx="0">
+              <a:schemeClr val="accent1"/>
+            </a:fillRef>
+            <a:effectRef idx="0">
+              <a:schemeClr val="accent1"/>
+            </a:effectRef>
+            <a:fontRef idx="minor">
+              <a:schemeClr val="tx1"/>
+            </a:fontRef>
+          </p:style>
+        </p:cxnSp>
+        <p:cxnSp>
+          <p:nvCxnSpPr>
+            <p:cNvPr id="22" name="Straight Arrow Connector 21">
+              <a:extLst>
+                <a:ext uri="{FF2B5EF4-FFF2-40B4-BE49-F238E27FC236}">
+                  <a16:creationId xmlns:a16="http://schemas.microsoft.com/office/drawing/2014/main" id="{FC245F71-11A9-CB39-4384-97BD3C2775A1}"/>
+                </a:ext>
+              </a:extLst>
+            </p:cNvPr>
+            <p:cNvCxnSpPr>
+              <a:cxnSpLocks/>
+              <a:stCxn id="31" idx="6"/>
+              <a:endCxn id="15" idx="2"/>
+            </p:cNvCxnSpPr>
+            <p:nvPr/>
+          </p:nvCxnSpPr>
+          <p:spPr>
+            <a:xfrm flipV="1">
+              <a:off x="5558851" y="4672051"/>
+              <a:ext cx="2400730" cy="847828"/>
+            </a:xfrm>
+            <a:prstGeom prst="straightConnector1">
+              <a:avLst/>
+            </a:prstGeom>
+            <a:ln>
+              <a:tailEnd type="triangle"/>
+            </a:ln>
+          </p:spPr>
+          <p:style>
+            <a:lnRef idx="1">
+              <a:schemeClr val="accent1"/>
+            </a:lnRef>
+            <a:fillRef idx="0">
+              <a:schemeClr val="accent1"/>
+            </a:fillRef>
+            <a:effectRef idx="0">
+              <a:schemeClr val="accent1"/>
+            </a:effectRef>
+            <a:fontRef idx="minor">
+              <a:schemeClr val="tx1"/>
+            </a:fontRef>
+          </p:style>
+        </p:cxnSp>
+        <p:cxnSp>
+          <p:nvCxnSpPr>
+            <p:cNvPr id="25" name="Straight Arrow Connector 24">
+              <a:extLst>
+                <a:ext uri="{FF2B5EF4-FFF2-40B4-BE49-F238E27FC236}">
+                  <a16:creationId xmlns:a16="http://schemas.microsoft.com/office/drawing/2014/main" id="{B61CC135-2BE8-7666-0BBC-2890A226EA21}"/>
+                </a:ext>
+              </a:extLst>
+            </p:cNvPr>
+            <p:cNvCxnSpPr>
+              <a:stCxn id="9" idx="6"/>
+              <a:endCxn id="11" idx="2"/>
+            </p:cNvCxnSpPr>
+            <p:nvPr/>
+          </p:nvCxnSpPr>
+          <p:spPr>
+            <a:xfrm>
+              <a:off x="3283224" y="3493606"/>
+              <a:ext cx="1426660" cy="745435"/>
+            </a:xfrm>
+            <a:prstGeom prst="straightConnector1">
+              <a:avLst/>
+            </a:prstGeom>
+            <a:ln>
+              <a:tailEnd type="triangle"/>
+            </a:ln>
+          </p:spPr>
+          <p:style>
+            <a:lnRef idx="1">
+              <a:schemeClr val="accent1"/>
+            </a:lnRef>
+            <a:fillRef idx="0">
+              <a:schemeClr val="accent1"/>
+            </a:fillRef>
+            <a:effectRef idx="0">
+              <a:schemeClr val="accent1"/>
+            </a:effectRef>
+            <a:fontRef idx="minor">
+              <a:schemeClr val="tx1"/>
+            </a:fontRef>
+          </p:style>
+        </p:cxnSp>
+        <p:sp>
+          <p:nvSpPr>
+            <p:cNvPr id="6" name="TextBox 5">
+              <a:extLst>
+                <a:ext uri="{FF2B5EF4-FFF2-40B4-BE49-F238E27FC236}">
+                  <a16:creationId xmlns:a16="http://schemas.microsoft.com/office/drawing/2014/main" id="{563F226B-ACB8-C788-4988-26A08C26C2B7}"/>
+                </a:ext>
+              </a:extLst>
+            </p:cNvPr>
+            <p:cNvSpPr txBox="1"/>
+            <p:nvPr/>
+          </p:nvSpPr>
+          <p:spPr>
+            <a:xfrm>
+              <a:off x="4372476" y="2129827"/>
+              <a:ext cx="1519642" cy="369332"/>
+            </a:xfrm>
+            <a:prstGeom prst="rect">
+              <a:avLst/>
+            </a:prstGeom>
+            <a:noFill/>
+          </p:spPr>
+          <p:txBody>
+            <a:bodyPr wrap="square" rtlCol="0">
+              <a:spAutoFit/>
+            </a:bodyPr>
+            <a:lstStyle/>
+            <a:p>
+              <a:r>
+                <a:rPr lang="en-US" dirty="0"/>
+                <a:t>Hidden Layer</a:t>
+              </a:r>
+            </a:p>
+          </p:txBody>
+        </p:sp>
+        <p:sp>
+          <p:nvSpPr>
+            <p:cNvPr id="8" name="TextBox 7">
+              <a:extLst>
+                <a:ext uri="{FF2B5EF4-FFF2-40B4-BE49-F238E27FC236}">
+                  <a16:creationId xmlns:a16="http://schemas.microsoft.com/office/drawing/2014/main" id="{039423F2-A2F0-FE8B-9854-7BC3CCA0A1F4}"/>
+                </a:ext>
+              </a:extLst>
+            </p:cNvPr>
+            <p:cNvSpPr txBox="1"/>
+            <p:nvPr/>
+          </p:nvSpPr>
+          <p:spPr>
+            <a:xfrm>
+              <a:off x="7808041" y="2123698"/>
+              <a:ext cx="988088" cy="369332"/>
+            </a:xfrm>
+            <a:prstGeom prst="rect">
+              <a:avLst/>
+            </a:prstGeom>
+            <a:noFill/>
+          </p:spPr>
+          <p:txBody>
+            <a:bodyPr wrap="square" rtlCol="0">
+              <a:spAutoFit/>
+            </a:bodyPr>
+            <a:lstStyle/>
+            <a:p>
+              <a:r>
+                <a:rPr lang="en-US" dirty="0"/>
+                <a:t>Output</a:t>
+              </a:r>
+            </a:p>
+          </p:txBody>
+        </p:sp>
+        <p:sp>
+          <p:nvSpPr>
+            <p:cNvPr id="28" name="Oval 27">
+              <a:extLst>
+                <a:ext uri="{FF2B5EF4-FFF2-40B4-BE49-F238E27FC236}">
+                  <a16:creationId xmlns:a16="http://schemas.microsoft.com/office/drawing/2014/main" id="{D9182C2B-4132-CF98-E79F-C4E877FE78DF}"/>
+                </a:ext>
+              </a:extLst>
+            </p:cNvPr>
+            <p:cNvSpPr/>
+            <p:nvPr/>
+          </p:nvSpPr>
+          <p:spPr>
+            <a:xfrm>
+              <a:off x="1432850" y="4611758"/>
+              <a:ext cx="1769165" cy="745435"/>
+            </a:xfrm>
+            <a:prstGeom prst="ellipse">
+              <a:avLst/>
+            </a:prstGeom>
+          </p:spPr>
+          <p:style>
+            <a:lnRef idx="2">
+              <a:schemeClr val="accent5">
+                <a:shade val="15000"/>
+              </a:schemeClr>
+            </a:lnRef>
+            <a:fillRef idx="1">
+              <a:schemeClr val="accent5"/>
+            </a:fillRef>
+            <a:effectRef idx="0">
+              <a:schemeClr val="accent5"/>
+            </a:effectRef>
+            <a:fontRef idx="minor">
+              <a:schemeClr val="lt1"/>
+            </a:fontRef>
+          </p:style>
+          <p:txBody>
+            <a:bodyPr rtlCol="0" anchor="ctr"/>
+            <a:lstStyle/>
+            <a:p>
+              <a:pPr algn="ctr"/>
+              <a:r>
+                <a:rPr lang="en-US" dirty="0"/>
+                <a:t>Input 2</a:t>
+              </a:r>
+            </a:p>
+          </p:txBody>
+        </p:sp>
+        <p:sp>
+          <p:nvSpPr>
+            <p:cNvPr id="31" name="Oval 30">
+              <a:extLst>
+                <a:ext uri="{FF2B5EF4-FFF2-40B4-BE49-F238E27FC236}">
+                  <a16:creationId xmlns:a16="http://schemas.microsoft.com/office/drawing/2014/main" id="{BC6F0AB5-2D06-1542-E4E8-474A990ABA84}"/>
+                </a:ext>
+              </a:extLst>
+            </p:cNvPr>
+            <p:cNvSpPr/>
+            <p:nvPr/>
+          </p:nvSpPr>
+          <p:spPr>
+            <a:xfrm>
+              <a:off x="4714024" y="5147161"/>
+              <a:ext cx="844827" cy="745435"/>
+            </a:xfrm>
+            <a:prstGeom prst="ellipse">
+              <a:avLst/>
+            </a:prstGeom>
+          </p:spPr>
+          <p:style>
+            <a:lnRef idx="2">
+              <a:schemeClr val="accent1">
+                <a:shade val="15000"/>
+              </a:schemeClr>
+            </a:lnRef>
+            <a:fillRef idx="1">
+              <a:schemeClr val="accent1"/>
+            </a:fillRef>
+            <a:effectRef idx="0">
+              <a:schemeClr val="accent1"/>
+            </a:effectRef>
+            <a:fontRef idx="minor">
+              <a:schemeClr val="lt1"/>
+            </a:fontRef>
+          </p:style>
+          <p:txBody>
+            <a:bodyPr rtlCol="0" anchor="ctr"/>
+            <a:lstStyle/>
+            <a:p>
+              <a:pPr algn="ctr"/>
+              <a:endParaRPr lang="en-US" dirty="0"/>
+            </a:p>
+          </p:txBody>
+        </p:sp>
+        <p:cxnSp>
+          <p:nvCxnSpPr>
+            <p:cNvPr id="33" name="Straight Arrow Connector 32">
+              <a:extLst>
+                <a:ext uri="{FF2B5EF4-FFF2-40B4-BE49-F238E27FC236}">
+                  <a16:creationId xmlns:a16="http://schemas.microsoft.com/office/drawing/2014/main" id="{AA3271C1-2385-FEDB-48EA-A61AA27150E0}"/>
+                </a:ext>
+              </a:extLst>
+            </p:cNvPr>
+            <p:cNvCxnSpPr>
+              <a:stCxn id="28" idx="6"/>
+              <a:endCxn id="31" idx="2"/>
+            </p:cNvCxnSpPr>
+            <p:nvPr/>
+          </p:nvCxnSpPr>
+          <p:spPr>
+            <a:xfrm>
+              <a:off x="3202015" y="4984476"/>
+              <a:ext cx="1512009" cy="535403"/>
+            </a:xfrm>
+            <a:prstGeom prst="straightConnector1">
+              <a:avLst/>
+            </a:prstGeom>
+            <a:ln>
+              <a:tailEnd type="triangle"/>
+            </a:ln>
+          </p:spPr>
+          <p:style>
+            <a:lnRef idx="1">
+              <a:schemeClr val="accent1"/>
+            </a:lnRef>
+            <a:fillRef idx="0">
+              <a:schemeClr val="accent1"/>
+            </a:fillRef>
+            <a:effectRef idx="0">
+              <a:schemeClr val="accent1"/>
+            </a:effectRef>
+            <a:fontRef idx="minor">
+              <a:schemeClr val="tx1"/>
+            </a:fontRef>
+          </p:style>
+        </p:cxnSp>
+        <p:cxnSp>
+          <p:nvCxnSpPr>
+            <p:cNvPr id="39" name="Straight Arrow Connector 38">
+              <a:extLst>
+                <a:ext uri="{FF2B5EF4-FFF2-40B4-BE49-F238E27FC236}">
+                  <a16:creationId xmlns:a16="http://schemas.microsoft.com/office/drawing/2014/main" id="{5624B63C-27C3-7624-20C1-EF5A929CBC35}"/>
+                </a:ext>
+              </a:extLst>
+            </p:cNvPr>
+            <p:cNvCxnSpPr>
+              <a:stCxn id="11" idx="6"/>
+              <a:endCxn id="14" idx="2"/>
+            </p:cNvCxnSpPr>
+            <p:nvPr/>
+          </p:nvCxnSpPr>
+          <p:spPr>
+            <a:xfrm flipV="1">
+              <a:off x="5554711" y="3482494"/>
+              <a:ext cx="2396591" cy="756547"/>
+            </a:xfrm>
+            <a:prstGeom prst="straightConnector1">
+              <a:avLst/>
+            </a:prstGeom>
+            <a:ln>
+              <a:tailEnd type="triangle"/>
+            </a:ln>
+          </p:spPr>
+          <p:style>
+            <a:lnRef idx="1">
+              <a:schemeClr val="accent1"/>
+            </a:lnRef>
+            <a:fillRef idx="0">
+              <a:schemeClr val="accent1"/>
+            </a:fillRef>
+            <a:effectRef idx="0">
+              <a:schemeClr val="accent1"/>
+            </a:effectRef>
+            <a:fontRef idx="minor">
+              <a:schemeClr val="tx1"/>
+            </a:fontRef>
+          </p:style>
+        </p:cxnSp>
+        <p:cxnSp>
+          <p:nvCxnSpPr>
+            <p:cNvPr id="41" name="Straight Arrow Connector 40">
+              <a:extLst>
+                <a:ext uri="{FF2B5EF4-FFF2-40B4-BE49-F238E27FC236}">
+                  <a16:creationId xmlns:a16="http://schemas.microsoft.com/office/drawing/2014/main" id="{44127386-B343-EE36-A5B2-ABBE2B5B72B5}"/>
+                </a:ext>
+              </a:extLst>
+            </p:cNvPr>
+            <p:cNvCxnSpPr>
+              <a:stCxn id="11" idx="6"/>
+              <a:endCxn id="15" idx="2"/>
+            </p:cNvCxnSpPr>
+            <p:nvPr/>
+          </p:nvCxnSpPr>
+          <p:spPr>
+            <a:xfrm>
+              <a:off x="5554711" y="4239041"/>
+              <a:ext cx="2404870" cy="433010"/>
+            </a:xfrm>
+            <a:prstGeom prst="straightConnector1">
+              <a:avLst/>
+            </a:prstGeom>
+            <a:ln>
+              <a:tailEnd type="triangle"/>
+            </a:ln>
+          </p:spPr>
+          <p:style>
+            <a:lnRef idx="1">
+              <a:schemeClr val="accent1"/>
+            </a:lnRef>
+            <a:fillRef idx="0">
+              <a:schemeClr val="accent1"/>
+            </a:fillRef>
+            <a:effectRef idx="0">
+              <a:schemeClr val="accent1"/>
+            </a:effectRef>
+            <a:fontRef idx="minor">
+              <a:schemeClr val="tx1"/>
+            </a:fontRef>
+          </p:style>
+        </p:cxnSp>
+        <p:cxnSp>
+          <p:nvCxnSpPr>
+            <p:cNvPr id="43" name="Straight Arrow Connector 42">
+              <a:extLst>
+                <a:ext uri="{FF2B5EF4-FFF2-40B4-BE49-F238E27FC236}">
+                  <a16:creationId xmlns:a16="http://schemas.microsoft.com/office/drawing/2014/main" id="{2E6888C0-EB4A-5AFE-8F27-E4BD56B283F0}"/>
+                </a:ext>
+              </a:extLst>
+            </p:cNvPr>
+            <p:cNvCxnSpPr>
+              <a:stCxn id="28" idx="6"/>
+              <a:endCxn id="10" idx="2"/>
+            </p:cNvCxnSpPr>
+            <p:nvPr/>
+          </p:nvCxnSpPr>
+          <p:spPr>
+            <a:xfrm flipV="1">
+              <a:off x="3202015" y="2953752"/>
+              <a:ext cx="1500847" cy="2030724"/>
+            </a:xfrm>
+            <a:prstGeom prst="straightConnector1">
+              <a:avLst/>
+            </a:prstGeom>
+            <a:ln>
+              <a:tailEnd type="triangle"/>
+            </a:ln>
+          </p:spPr>
+          <p:style>
+            <a:lnRef idx="1">
+              <a:schemeClr val="accent1"/>
+            </a:lnRef>
+            <a:fillRef idx="0">
+              <a:schemeClr val="accent1"/>
+            </a:fillRef>
+            <a:effectRef idx="0">
+              <a:schemeClr val="accent1"/>
+            </a:effectRef>
+            <a:fontRef idx="minor">
+              <a:schemeClr val="tx1"/>
+            </a:fontRef>
+          </p:style>
+        </p:cxnSp>
+        <p:cxnSp>
+          <p:nvCxnSpPr>
+            <p:cNvPr id="45" name="Straight Arrow Connector 44">
+              <a:extLst>
+                <a:ext uri="{FF2B5EF4-FFF2-40B4-BE49-F238E27FC236}">
+                  <a16:creationId xmlns:a16="http://schemas.microsoft.com/office/drawing/2014/main" id="{E5ADB07E-F415-616B-B3A6-C3BAE8B8AB88}"/>
+                </a:ext>
+              </a:extLst>
+            </p:cNvPr>
+            <p:cNvCxnSpPr>
+              <a:stCxn id="9" idx="6"/>
+              <a:endCxn id="31" idx="2"/>
+            </p:cNvCxnSpPr>
+            <p:nvPr/>
+          </p:nvCxnSpPr>
+          <p:spPr>
+            <a:xfrm>
+              <a:off x="3283224" y="3493606"/>
+              <a:ext cx="1430800" cy="2026273"/>
+            </a:xfrm>
+            <a:prstGeom prst="straightConnector1">
+              <a:avLst/>
+            </a:prstGeom>
+            <a:ln>
+              <a:tailEnd type="triangle"/>
+            </a:ln>
+          </p:spPr>
+          <p:style>
+            <a:lnRef idx="1">
+              <a:schemeClr val="accent1"/>
+            </a:lnRef>
+            <a:fillRef idx="0">
+              <a:schemeClr val="accent1"/>
+            </a:fillRef>
+            <a:effectRef idx="0">
+              <a:schemeClr val="accent1"/>
+            </a:effectRef>
+            <a:fontRef idx="minor">
+              <a:schemeClr val="tx1"/>
+            </a:fontRef>
+          </p:style>
+        </p:cxnSp>
+        <p:cxnSp>
+          <p:nvCxnSpPr>
+            <p:cNvPr id="47" name="Straight Arrow Connector 46">
+              <a:extLst>
+                <a:ext uri="{FF2B5EF4-FFF2-40B4-BE49-F238E27FC236}">
+                  <a16:creationId xmlns:a16="http://schemas.microsoft.com/office/drawing/2014/main" id="{5E86ED29-FF5E-C63B-F8BC-710F468BF740}"/>
+                </a:ext>
+              </a:extLst>
+            </p:cNvPr>
+            <p:cNvCxnSpPr>
+              <a:stCxn id="28" idx="6"/>
+              <a:endCxn id="11" idx="2"/>
+            </p:cNvCxnSpPr>
+            <p:nvPr/>
+          </p:nvCxnSpPr>
+          <p:spPr>
+            <a:xfrm flipV="1">
+              <a:off x="3202015" y="4239041"/>
+              <a:ext cx="1507869" cy="745435"/>
+            </a:xfrm>
+            <a:prstGeom prst="straightConnector1">
+              <a:avLst/>
+            </a:prstGeom>
+            <a:ln>
+              <a:tailEnd type="triangle"/>
+            </a:ln>
+          </p:spPr>
+          <p:style>
+            <a:lnRef idx="1">
+              <a:schemeClr val="accent1"/>
+            </a:lnRef>
+            <a:fillRef idx="0">
+              <a:schemeClr val="accent1"/>
+            </a:fillRef>
+            <a:effectRef idx="0">
+              <a:schemeClr val="accent1"/>
+            </a:effectRef>
+            <a:fontRef idx="minor">
+              <a:schemeClr val="tx1"/>
+            </a:fontRef>
+          </p:style>
+        </p:cxnSp>
+      </p:grpSp>
+    </p:spTree>
+    <p:extLst>
+      <p:ext uri="{BB962C8B-B14F-4D97-AF65-F5344CB8AC3E}">
+        <p14:creationId xmlns:p14="http://schemas.microsoft.com/office/powerpoint/2010/main" val="274204584"/>
+      </p:ext>
+    </p:extLst>
+  </p:cSld>
+  <p:clrMapOvr>
+    <a:masterClrMapping/>
+  </p:clrMapOvr>
+</p:sld>
+</file>
+
+<file path=ppt/slides/slide25.xml><?xml version="1.0" encoding="utf-8"?>
+<p:sld xmlns:a="http://schemas.openxmlformats.org/drawingml/2006/main" xmlns:r="http://schemas.openxmlformats.org/officeDocument/2006/relationships" xmlns:p="http://schemas.openxmlformats.org/presentationml/2006/main">
+  <p:cSld>
+    <p:spTree>
+      <p:nvGrpSpPr>
+        <p:cNvPr id="1" name=""/>
+        <p:cNvGrpSpPr/>
+        <p:nvPr/>
+      </p:nvGrpSpPr>
+      <p:grpSpPr>
+        <a:xfrm>
+          <a:off x="0" y="0"/>
+          <a:ext cx="0" cy="0"/>
+          <a:chOff x="0" y="0"/>
+          <a:chExt cx="0" cy="0"/>
+        </a:xfrm>
+      </p:grpSpPr>
+      <p:sp>
+        <p:nvSpPr>
+          <p:cNvPr id="2" name="Title 1">
+            <a:extLst>
+              <a:ext uri="{FF2B5EF4-FFF2-40B4-BE49-F238E27FC236}">
+                <a16:creationId xmlns:a16="http://schemas.microsoft.com/office/drawing/2014/main" id="{A28EF932-EB0E-DE97-D25F-B3FABD13B344}"/>
+              </a:ext>
+            </a:extLst>
+          </p:cNvPr>
+          <p:cNvSpPr>
+            <a:spLocks noGrp="1"/>
+          </p:cNvSpPr>
+          <p:nvPr>
+            <p:ph type="title"/>
+          </p:nvPr>
+        </p:nvSpPr>
+        <p:spPr/>
+        <p:txBody>
+          <a:bodyPr/>
+          <a:lstStyle/>
+          <a:p>
+            <a:r>
+              <a:rPr lang="en-US" dirty="0"/>
+              <a:t>Categorizing Age groups</a:t>
+            </a:r>
+          </a:p>
+        </p:txBody>
+      </p:sp>
+      <p:sp>
+        <p:nvSpPr>
+          <p:cNvPr id="5" name="Oval 4">
+            <a:extLst>
+              <a:ext uri="{FF2B5EF4-FFF2-40B4-BE49-F238E27FC236}">
+                <a16:creationId xmlns:a16="http://schemas.microsoft.com/office/drawing/2014/main" id="{A6CA453F-66A9-3A54-E573-81751D62EFE0}"/>
+              </a:ext>
+            </a:extLst>
+          </p:cNvPr>
+          <p:cNvSpPr/>
+          <p:nvPr/>
+        </p:nvSpPr>
+        <p:spPr>
+          <a:xfrm>
+            <a:off x="1298691" y="2689779"/>
+            <a:ext cx="1769165" cy="745435"/>
+          </a:xfrm>
+          <a:prstGeom prst="ellipse">
+            <a:avLst/>
+          </a:prstGeom>
+        </p:spPr>
+        <p:style>
+          <a:lnRef idx="2">
+            <a:schemeClr val="accent5">
+              <a:shade val="15000"/>
+            </a:schemeClr>
+          </a:lnRef>
+          <a:fillRef idx="1">
+            <a:schemeClr val="accent5"/>
+          </a:fillRef>
+          <a:effectRef idx="0">
+            <a:schemeClr val="accent5"/>
+          </a:effectRef>
+          <a:fontRef idx="minor">
+            <a:schemeClr val="lt1"/>
+          </a:fontRef>
+        </p:style>
+        <p:txBody>
+          <a:bodyPr rtlCol="0" anchor="ctr"/>
+          <a:lstStyle/>
+          <a:p>
+            <a:pPr algn="ctr"/>
+            <a:r>
+              <a:rPr lang="en-US" dirty="0"/>
+              <a:t>Weight</a:t>
+            </a:r>
+          </a:p>
+        </p:txBody>
+      </p:sp>
+      <p:sp>
+        <p:nvSpPr>
+          <p:cNvPr id="6" name="Oval 5">
+            <a:extLst>
+              <a:ext uri="{FF2B5EF4-FFF2-40B4-BE49-F238E27FC236}">
+                <a16:creationId xmlns:a16="http://schemas.microsoft.com/office/drawing/2014/main" id="{AD03C6AF-2EAB-C5E0-A8EB-AA64B75964C4}"/>
+              </a:ext>
+            </a:extLst>
+          </p:cNvPr>
+          <p:cNvSpPr/>
+          <p:nvPr/>
+        </p:nvSpPr>
+        <p:spPr>
+          <a:xfrm>
+            <a:off x="4702862" y="2581034"/>
+            <a:ext cx="844827" cy="745435"/>
+          </a:xfrm>
+          <a:prstGeom prst="ellipse">
+            <a:avLst/>
+          </a:prstGeom>
+        </p:spPr>
+        <p:style>
+          <a:lnRef idx="2">
+            <a:schemeClr val="accent1">
+              <a:shade val="15000"/>
+            </a:schemeClr>
+          </a:lnRef>
+          <a:fillRef idx="1">
+            <a:schemeClr val="accent1"/>
+          </a:fillRef>
+          <a:effectRef idx="0">
+            <a:schemeClr val="accent1"/>
+          </a:effectRef>
+          <a:fontRef idx="minor">
+            <a:schemeClr val="lt1"/>
+          </a:fontRef>
+        </p:style>
+        <p:txBody>
+          <a:bodyPr rtlCol="0" anchor="ctr"/>
+          <a:lstStyle/>
+          <a:p>
+            <a:pPr algn="ctr"/>
+            <a:endParaRPr lang="en-US" dirty="0"/>
+          </a:p>
+        </p:txBody>
+      </p:sp>
+      <p:sp>
+        <p:nvSpPr>
+          <p:cNvPr id="7" name="Oval 6">
+            <a:extLst>
+              <a:ext uri="{FF2B5EF4-FFF2-40B4-BE49-F238E27FC236}">
+                <a16:creationId xmlns:a16="http://schemas.microsoft.com/office/drawing/2014/main" id="{23180C21-BE91-86E8-61A3-6F8815FEB178}"/>
+              </a:ext>
+            </a:extLst>
+          </p:cNvPr>
+          <p:cNvSpPr/>
+          <p:nvPr/>
+        </p:nvSpPr>
+        <p:spPr>
+          <a:xfrm>
+            <a:off x="4709884" y="3866323"/>
+            <a:ext cx="844827" cy="745435"/>
+          </a:xfrm>
+          <a:prstGeom prst="ellipse">
+            <a:avLst/>
+          </a:prstGeom>
+        </p:spPr>
+        <p:style>
+          <a:lnRef idx="2">
+            <a:schemeClr val="accent1">
+              <a:shade val="15000"/>
+            </a:schemeClr>
+          </a:lnRef>
+          <a:fillRef idx="1">
+            <a:schemeClr val="accent1"/>
+          </a:fillRef>
+          <a:effectRef idx="0">
+            <a:schemeClr val="accent1"/>
+          </a:effectRef>
+          <a:fontRef idx="minor">
+            <a:schemeClr val="lt1"/>
+          </a:fontRef>
+        </p:style>
+        <p:txBody>
+          <a:bodyPr rtlCol="0" anchor="ctr"/>
+          <a:lstStyle/>
+          <a:p>
+            <a:pPr algn="ctr"/>
+            <a:endParaRPr lang="en-US" dirty="0"/>
+          </a:p>
+        </p:txBody>
+      </p:sp>
+      <p:sp>
+        <p:nvSpPr>
+          <p:cNvPr id="8" name="Oval 7">
+            <a:extLst>
+              <a:ext uri="{FF2B5EF4-FFF2-40B4-BE49-F238E27FC236}">
+                <a16:creationId xmlns:a16="http://schemas.microsoft.com/office/drawing/2014/main" id="{E7F55B46-2259-AABB-D4BF-FBEF07D780E8}"/>
+              </a:ext>
+            </a:extLst>
+          </p:cNvPr>
+          <p:cNvSpPr/>
+          <p:nvPr/>
+        </p:nvSpPr>
+        <p:spPr>
+          <a:xfrm>
+            <a:off x="8189840" y="2751556"/>
+            <a:ext cx="1620081" cy="745435"/>
+          </a:xfrm>
+          <a:prstGeom prst="ellipse">
+            <a:avLst/>
+          </a:prstGeom>
+        </p:spPr>
+        <p:style>
+          <a:lnRef idx="2">
+            <a:schemeClr val="accent1">
+              <a:shade val="15000"/>
+            </a:schemeClr>
+          </a:lnRef>
+          <a:fillRef idx="1">
+            <a:schemeClr val="accent1"/>
+          </a:fillRef>
+          <a:effectRef idx="0">
+            <a:schemeClr val="accent1"/>
+          </a:effectRef>
+          <a:fontRef idx="minor">
+            <a:schemeClr val="lt1"/>
+          </a:fontRef>
+        </p:style>
+        <p:txBody>
+          <a:bodyPr rtlCol="0" anchor="ctr"/>
+          <a:lstStyle/>
+          <a:p>
+            <a:pPr algn="ctr"/>
+            <a:r>
+              <a:rPr lang="en-US" dirty="0"/>
+              <a:t>Age Grp1</a:t>
+            </a:r>
+          </a:p>
+        </p:txBody>
+      </p:sp>
+      <p:sp>
+        <p:nvSpPr>
+          <p:cNvPr id="9" name="Oval 8">
+            <a:extLst>
+              <a:ext uri="{FF2B5EF4-FFF2-40B4-BE49-F238E27FC236}">
+                <a16:creationId xmlns:a16="http://schemas.microsoft.com/office/drawing/2014/main" id="{F4F90FC8-14A8-ECFE-D9A9-66B17D7EA547}"/>
+              </a:ext>
+            </a:extLst>
+          </p:cNvPr>
+          <p:cNvSpPr/>
+          <p:nvPr/>
+        </p:nvSpPr>
+        <p:spPr>
+          <a:xfrm>
+            <a:off x="8220486" y="3762999"/>
+            <a:ext cx="1620081" cy="745435"/>
+          </a:xfrm>
+          <a:prstGeom prst="ellipse">
+            <a:avLst/>
+          </a:prstGeom>
+        </p:spPr>
+        <p:style>
+          <a:lnRef idx="2">
+            <a:schemeClr val="accent1">
+              <a:shade val="15000"/>
+            </a:schemeClr>
+          </a:lnRef>
+          <a:fillRef idx="1">
+            <a:schemeClr val="accent1"/>
+          </a:fillRef>
+          <a:effectRef idx="0">
+            <a:schemeClr val="accent1"/>
+          </a:effectRef>
+          <a:fontRef idx="minor">
+            <a:schemeClr val="lt1"/>
+          </a:fontRef>
+        </p:style>
+        <p:txBody>
+          <a:bodyPr rtlCol="0" anchor="ctr"/>
+          <a:lstStyle/>
+          <a:p>
+            <a:pPr algn="ctr"/>
+            <a:r>
+              <a:rPr lang="en-US" dirty="0"/>
+              <a:t>Age Grp2</a:t>
+            </a:r>
+          </a:p>
+        </p:txBody>
+      </p:sp>
+      <p:cxnSp>
+        <p:nvCxnSpPr>
+          <p:cNvPr id="10" name="Straight Arrow Connector 9">
+            <a:extLst>
+              <a:ext uri="{FF2B5EF4-FFF2-40B4-BE49-F238E27FC236}">
+                <a16:creationId xmlns:a16="http://schemas.microsoft.com/office/drawing/2014/main" id="{F9883ED4-AB35-B560-F863-98904CA6A7F9}"/>
+              </a:ext>
+            </a:extLst>
+          </p:cNvPr>
+          <p:cNvCxnSpPr>
+            <a:stCxn id="5" idx="6"/>
+            <a:endCxn id="6" idx="2"/>
+          </p:cNvCxnSpPr>
+          <p:nvPr/>
+        </p:nvCxnSpPr>
+        <p:spPr>
+          <a:xfrm flipV="1">
+            <a:off x="3067856" y="2953752"/>
+            <a:ext cx="1635006" cy="108745"/>
+          </a:xfrm>
+          <a:prstGeom prst="straightConnector1">
+            <a:avLst/>
+          </a:prstGeom>
+          <a:ln>
+            <a:tailEnd type="triangle"/>
+          </a:ln>
+        </p:spPr>
+        <p:style>
+          <a:lnRef idx="1">
+            <a:schemeClr val="accent1"/>
+          </a:lnRef>
+          <a:fillRef idx="0">
+            <a:schemeClr val="accent1"/>
+          </a:fillRef>
+          <a:effectRef idx="0">
+            <a:schemeClr val="accent1"/>
+          </a:effectRef>
+          <a:fontRef idx="minor">
+            <a:schemeClr val="tx1"/>
+          </a:fontRef>
+        </p:style>
+      </p:cxnSp>
+      <p:cxnSp>
+        <p:nvCxnSpPr>
+          <p:cNvPr id="11" name="Straight Arrow Connector 10">
+            <a:extLst>
+              <a:ext uri="{FF2B5EF4-FFF2-40B4-BE49-F238E27FC236}">
+                <a16:creationId xmlns:a16="http://schemas.microsoft.com/office/drawing/2014/main" id="{FCC874CA-EA9A-9311-AC1D-0FF1EA4A9BFD}"/>
+              </a:ext>
+            </a:extLst>
+          </p:cNvPr>
+          <p:cNvCxnSpPr>
+            <a:cxnSpLocks/>
+            <a:stCxn id="6" idx="6"/>
+            <a:endCxn id="8" idx="2"/>
+          </p:cNvCxnSpPr>
+          <p:nvPr/>
+        </p:nvCxnSpPr>
+        <p:spPr>
+          <a:xfrm>
+            <a:off x="5547689" y="2953752"/>
+            <a:ext cx="2642151" cy="170522"/>
+          </a:xfrm>
+          <a:prstGeom prst="straightConnector1">
+            <a:avLst/>
+          </a:prstGeom>
+          <a:ln>
+            <a:tailEnd type="triangle"/>
+          </a:ln>
+        </p:spPr>
+        <p:style>
+          <a:lnRef idx="1">
+            <a:schemeClr val="accent1"/>
+          </a:lnRef>
+          <a:fillRef idx="0">
+            <a:schemeClr val="accent1"/>
+          </a:fillRef>
+          <a:effectRef idx="0">
+            <a:schemeClr val="accent1"/>
+          </a:effectRef>
+          <a:fontRef idx="minor">
+            <a:schemeClr val="tx1"/>
+          </a:fontRef>
+        </p:style>
+      </p:cxnSp>
+      <p:cxnSp>
+        <p:nvCxnSpPr>
+          <p:cNvPr id="12" name="Straight Arrow Connector 11">
+            <a:extLst>
+              <a:ext uri="{FF2B5EF4-FFF2-40B4-BE49-F238E27FC236}">
+                <a16:creationId xmlns:a16="http://schemas.microsoft.com/office/drawing/2014/main" id="{B693DD0B-24E3-938F-6B2B-878DB608C0D3}"/>
+              </a:ext>
+            </a:extLst>
+          </p:cNvPr>
+          <p:cNvCxnSpPr>
+            <a:cxnSpLocks/>
+            <a:stCxn id="6" idx="6"/>
+            <a:endCxn id="9" idx="2"/>
+          </p:cNvCxnSpPr>
+          <p:nvPr/>
+        </p:nvCxnSpPr>
+        <p:spPr>
+          <a:xfrm>
+            <a:off x="5547689" y="2953752"/>
+            <a:ext cx="2672797" cy="1181965"/>
+          </a:xfrm>
+          <a:prstGeom prst="straightConnector1">
+            <a:avLst/>
+          </a:prstGeom>
+          <a:ln>
+            <a:tailEnd type="triangle"/>
+          </a:ln>
+        </p:spPr>
+        <p:style>
+          <a:lnRef idx="1">
+            <a:schemeClr val="accent1"/>
+          </a:lnRef>
+          <a:fillRef idx="0">
+            <a:schemeClr val="accent1"/>
+          </a:fillRef>
+          <a:effectRef idx="0">
+            <a:schemeClr val="accent1"/>
+          </a:effectRef>
+          <a:fontRef idx="minor">
+            <a:schemeClr val="tx1"/>
+          </a:fontRef>
+        </p:style>
+      </p:cxnSp>
+      <p:cxnSp>
+        <p:nvCxnSpPr>
+          <p:cNvPr id="13" name="Straight Arrow Connector 12">
+            <a:extLst>
+              <a:ext uri="{FF2B5EF4-FFF2-40B4-BE49-F238E27FC236}">
+                <a16:creationId xmlns:a16="http://schemas.microsoft.com/office/drawing/2014/main" id="{2A878B0A-A4BE-A1C6-9114-2F6A4DF47A5F}"/>
+              </a:ext>
+            </a:extLst>
+          </p:cNvPr>
+          <p:cNvCxnSpPr>
+            <a:cxnSpLocks/>
+            <a:stCxn id="19" idx="6"/>
+            <a:endCxn id="8" idx="2"/>
+          </p:cNvCxnSpPr>
+          <p:nvPr/>
+        </p:nvCxnSpPr>
+        <p:spPr>
+          <a:xfrm flipV="1">
+            <a:off x="5558851" y="3124274"/>
+            <a:ext cx="2630989" cy="2395605"/>
+          </a:xfrm>
+          <a:prstGeom prst="straightConnector1">
+            <a:avLst/>
+          </a:prstGeom>
+          <a:ln>
+            <a:tailEnd type="triangle"/>
+          </a:ln>
+        </p:spPr>
+        <p:style>
+          <a:lnRef idx="1">
+            <a:schemeClr val="accent1"/>
+          </a:lnRef>
+          <a:fillRef idx="0">
+            <a:schemeClr val="accent1"/>
+          </a:fillRef>
+          <a:effectRef idx="0">
+            <a:schemeClr val="accent1"/>
+          </a:effectRef>
+          <a:fontRef idx="minor">
+            <a:schemeClr val="tx1"/>
+          </a:fontRef>
+        </p:style>
+      </p:cxnSp>
+      <p:cxnSp>
+        <p:nvCxnSpPr>
+          <p:cNvPr id="14" name="Straight Arrow Connector 13">
+            <a:extLst>
+              <a:ext uri="{FF2B5EF4-FFF2-40B4-BE49-F238E27FC236}">
+                <a16:creationId xmlns:a16="http://schemas.microsoft.com/office/drawing/2014/main" id="{C4A1893F-0AA3-CE5E-184D-C3CDF39C580C}"/>
+              </a:ext>
+            </a:extLst>
+          </p:cNvPr>
+          <p:cNvCxnSpPr>
+            <a:cxnSpLocks/>
+            <a:stCxn id="19" idx="6"/>
+            <a:endCxn id="9" idx="2"/>
+          </p:cNvCxnSpPr>
+          <p:nvPr/>
+        </p:nvCxnSpPr>
+        <p:spPr>
+          <a:xfrm flipV="1">
+            <a:off x="5558851" y="4135717"/>
+            <a:ext cx="2661635" cy="1384162"/>
+          </a:xfrm>
+          <a:prstGeom prst="straightConnector1">
+            <a:avLst/>
+          </a:prstGeom>
+          <a:ln>
+            <a:tailEnd type="triangle"/>
+          </a:ln>
+        </p:spPr>
+        <p:style>
+          <a:lnRef idx="1">
+            <a:schemeClr val="accent1"/>
+          </a:lnRef>
+          <a:fillRef idx="0">
+            <a:schemeClr val="accent1"/>
+          </a:fillRef>
+          <a:effectRef idx="0">
+            <a:schemeClr val="accent1"/>
+          </a:effectRef>
+          <a:fontRef idx="minor">
+            <a:schemeClr val="tx1"/>
+          </a:fontRef>
+        </p:style>
+      </p:cxnSp>
+      <p:cxnSp>
+        <p:nvCxnSpPr>
+          <p:cNvPr id="15" name="Straight Arrow Connector 14">
+            <a:extLst>
+              <a:ext uri="{FF2B5EF4-FFF2-40B4-BE49-F238E27FC236}">
+                <a16:creationId xmlns:a16="http://schemas.microsoft.com/office/drawing/2014/main" id="{34D8749B-AD87-FDFB-40F7-7FB6D6CD47C3}"/>
+              </a:ext>
+            </a:extLst>
+          </p:cNvPr>
+          <p:cNvCxnSpPr>
+            <a:stCxn id="5" idx="6"/>
+            <a:endCxn id="7" idx="2"/>
+          </p:cNvCxnSpPr>
+          <p:nvPr/>
+        </p:nvCxnSpPr>
+        <p:spPr>
+          <a:xfrm>
+            <a:off x="3067856" y="3062497"/>
+            <a:ext cx="1642028" cy="1176544"/>
+          </a:xfrm>
+          <a:prstGeom prst="straightConnector1">
+            <a:avLst/>
+          </a:prstGeom>
+          <a:ln>
+            <a:tailEnd type="triangle"/>
+          </a:ln>
+        </p:spPr>
+        <p:style>
+          <a:lnRef idx="1">
+            <a:schemeClr val="accent1"/>
+          </a:lnRef>
+          <a:fillRef idx="0">
+            <a:schemeClr val="accent1"/>
+          </a:fillRef>
+          <a:effectRef idx="0">
+            <a:schemeClr val="accent1"/>
+          </a:effectRef>
+          <a:fontRef idx="minor">
+            <a:schemeClr val="tx1"/>
+          </a:fontRef>
+        </p:style>
+      </p:cxnSp>
+      <p:sp>
+        <p:nvSpPr>
+          <p:cNvPr id="16" name="TextBox 15">
+            <a:extLst>
+              <a:ext uri="{FF2B5EF4-FFF2-40B4-BE49-F238E27FC236}">
+                <a16:creationId xmlns:a16="http://schemas.microsoft.com/office/drawing/2014/main" id="{5BA8DAB8-35D8-3FCF-8E67-C052F64563ED}"/>
+              </a:ext>
+            </a:extLst>
+          </p:cNvPr>
+          <p:cNvSpPr txBox="1"/>
+          <p:nvPr/>
+        </p:nvSpPr>
+        <p:spPr>
+          <a:xfrm>
+            <a:off x="4263145" y="1911234"/>
+            <a:ext cx="1441916" cy="646331"/>
+          </a:xfrm>
+          <a:prstGeom prst="rect">
+            <a:avLst/>
+          </a:prstGeom>
+          <a:noFill/>
+        </p:spPr>
+        <p:txBody>
+          <a:bodyPr wrap="square" rtlCol="0">
+            <a:spAutoFit/>
+          </a:bodyPr>
+          <a:lstStyle/>
+          <a:p>
+            <a:r>
+              <a:rPr lang="en-US" dirty="0"/>
+              <a:t>Hidden Layer (how Wide?)</a:t>
+            </a:r>
+          </a:p>
+        </p:txBody>
+      </p:sp>
+      <p:sp>
+        <p:nvSpPr>
+          <p:cNvPr id="17" name="TextBox 16">
+            <a:extLst>
+              <a:ext uri="{FF2B5EF4-FFF2-40B4-BE49-F238E27FC236}">
+                <a16:creationId xmlns:a16="http://schemas.microsoft.com/office/drawing/2014/main" id="{E305F6E4-48B0-AA57-03E4-7D7BD35826A5}"/>
+              </a:ext>
+            </a:extLst>
+          </p:cNvPr>
+          <p:cNvSpPr txBox="1"/>
+          <p:nvPr/>
+        </p:nvSpPr>
+        <p:spPr>
+          <a:xfrm>
+            <a:off x="8189841" y="2091779"/>
+            <a:ext cx="988088" cy="369332"/>
+          </a:xfrm>
+          <a:prstGeom prst="rect">
+            <a:avLst/>
+          </a:prstGeom>
+          <a:noFill/>
+        </p:spPr>
+        <p:txBody>
+          <a:bodyPr wrap="square" rtlCol="0">
+            <a:spAutoFit/>
+          </a:bodyPr>
+          <a:lstStyle/>
+          <a:p>
+            <a:r>
+              <a:rPr lang="en-US" dirty="0"/>
+              <a:t>Output</a:t>
+            </a:r>
+          </a:p>
+        </p:txBody>
+      </p:sp>
+      <p:sp>
+        <p:nvSpPr>
+          <p:cNvPr id="18" name="Oval 17">
+            <a:extLst>
+              <a:ext uri="{FF2B5EF4-FFF2-40B4-BE49-F238E27FC236}">
+                <a16:creationId xmlns:a16="http://schemas.microsoft.com/office/drawing/2014/main" id="{A3C84104-BF1C-A9B6-5F79-1C86806B25AC}"/>
+              </a:ext>
+            </a:extLst>
+          </p:cNvPr>
+          <p:cNvSpPr/>
+          <p:nvPr/>
+        </p:nvSpPr>
+        <p:spPr>
+          <a:xfrm>
+            <a:off x="1321462" y="4024632"/>
+            <a:ext cx="1769165" cy="745435"/>
+          </a:xfrm>
+          <a:prstGeom prst="ellipse">
+            <a:avLst/>
+          </a:prstGeom>
+        </p:spPr>
+        <p:style>
+          <a:lnRef idx="2">
+            <a:schemeClr val="accent5">
+              <a:shade val="15000"/>
+            </a:schemeClr>
+          </a:lnRef>
+          <a:fillRef idx="1">
+            <a:schemeClr val="accent5"/>
+          </a:fillRef>
+          <a:effectRef idx="0">
+            <a:schemeClr val="accent5"/>
+          </a:effectRef>
+          <a:fontRef idx="minor">
+            <a:schemeClr val="lt1"/>
+          </a:fontRef>
+        </p:style>
+        <p:txBody>
+          <a:bodyPr rtlCol="0" anchor="ctr"/>
+          <a:lstStyle/>
+          <a:p>
+            <a:pPr algn="ctr"/>
+            <a:r>
+              <a:rPr lang="en-US" dirty="0"/>
+              <a:t>Height</a:t>
+            </a:r>
+          </a:p>
+        </p:txBody>
+      </p:sp>
+      <p:sp>
+        <p:nvSpPr>
+          <p:cNvPr id="19" name="Oval 18">
+            <a:extLst>
+              <a:ext uri="{FF2B5EF4-FFF2-40B4-BE49-F238E27FC236}">
+                <a16:creationId xmlns:a16="http://schemas.microsoft.com/office/drawing/2014/main" id="{F6EA78A9-3F75-6027-97D3-E242919D6F7F}"/>
+              </a:ext>
+            </a:extLst>
+          </p:cNvPr>
+          <p:cNvSpPr/>
+          <p:nvPr/>
+        </p:nvSpPr>
+        <p:spPr>
+          <a:xfrm>
+            <a:off x="4714024" y="5147161"/>
+            <a:ext cx="844827" cy="745435"/>
+          </a:xfrm>
+          <a:prstGeom prst="ellipse">
+            <a:avLst/>
+          </a:prstGeom>
+        </p:spPr>
+        <p:style>
+          <a:lnRef idx="2">
+            <a:schemeClr val="accent1">
+              <a:shade val="15000"/>
+            </a:schemeClr>
+          </a:lnRef>
+          <a:fillRef idx="1">
+            <a:schemeClr val="accent1"/>
+          </a:fillRef>
+          <a:effectRef idx="0">
+            <a:schemeClr val="accent1"/>
+          </a:effectRef>
+          <a:fontRef idx="minor">
+            <a:schemeClr val="lt1"/>
+          </a:fontRef>
+        </p:style>
+        <p:txBody>
+          <a:bodyPr rtlCol="0" anchor="ctr"/>
+          <a:lstStyle/>
+          <a:p>
+            <a:pPr algn="ctr"/>
+            <a:endParaRPr lang="en-US" dirty="0"/>
+          </a:p>
+        </p:txBody>
+      </p:sp>
+      <p:cxnSp>
+        <p:nvCxnSpPr>
+          <p:cNvPr id="20" name="Straight Arrow Connector 19">
+            <a:extLst>
+              <a:ext uri="{FF2B5EF4-FFF2-40B4-BE49-F238E27FC236}">
+                <a16:creationId xmlns:a16="http://schemas.microsoft.com/office/drawing/2014/main" id="{1256EF03-2A83-571B-A411-DA5DE72C9049}"/>
+              </a:ext>
+            </a:extLst>
+          </p:cNvPr>
+          <p:cNvCxnSpPr>
+            <a:stCxn id="18" idx="6"/>
+            <a:endCxn id="19" idx="2"/>
+          </p:cNvCxnSpPr>
+          <p:nvPr/>
+        </p:nvCxnSpPr>
+        <p:spPr>
+          <a:xfrm>
+            <a:off x="3090627" y="4397350"/>
+            <a:ext cx="1623397" cy="1122529"/>
+          </a:xfrm>
+          <a:prstGeom prst="straightConnector1">
+            <a:avLst/>
+          </a:prstGeom>
+          <a:ln>
+            <a:tailEnd type="triangle"/>
+          </a:ln>
+        </p:spPr>
+        <p:style>
+          <a:lnRef idx="1">
+            <a:schemeClr val="accent1"/>
+          </a:lnRef>
+          <a:fillRef idx="0">
+            <a:schemeClr val="accent1"/>
+          </a:fillRef>
+          <a:effectRef idx="0">
+            <a:schemeClr val="accent1"/>
+          </a:effectRef>
+          <a:fontRef idx="minor">
+            <a:schemeClr val="tx1"/>
+          </a:fontRef>
+        </p:style>
+      </p:cxnSp>
+      <p:cxnSp>
+        <p:nvCxnSpPr>
+          <p:cNvPr id="21" name="Straight Arrow Connector 20">
+            <a:extLst>
+              <a:ext uri="{FF2B5EF4-FFF2-40B4-BE49-F238E27FC236}">
+                <a16:creationId xmlns:a16="http://schemas.microsoft.com/office/drawing/2014/main" id="{0B7CE338-4AA1-8003-DF1E-620ED5E3889A}"/>
+              </a:ext>
+            </a:extLst>
+          </p:cNvPr>
+          <p:cNvCxnSpPr>
+            <a:cxnSpLocks/>
+            <a:stCxn id="7" idx="6"/>
+            <a:endCxn id="8" idx="2"/>
+          </p:cNvCxnSpPr>
+          <p:nvPr/>
+        </p:nvCxnSpPr>
+        <p:spPr>
+          <a:xfrm flipV="1">
+            <a:off x="5554711" y="3124274"/>
+            <a:ext cx="2635129" cy="1114767"/>
+          </a:xfrm>
+          <a:prstGeom prst="straightConnector1">
+            <a:avLst/>
+          </a:prstGeom>
+          <a:ln>
+            <a:tailEnd type="triangle"/>
+          </a:ln>
+        </p:spPr>
+        <p:style>
+          <a:lnRef idx="1">
+            <a:schemeClr val="accent1"/>
+          </a:lnRef>
+          <a:fillRef idx="0">
+            <a:schemeClr val="accent1"/>
+          </a:fillRef>
+          <a:effectRef idx="0">
+            <a:schemeClr val="accent1"/>
+          </a:effectRef>
+          <a:fontRef idx="minor">
+            <a:schemeClr val="tx1"/>
+          </a:fontRef>
+        </p:style>
+      </p:cxnSp>
+      <p:cxnSp>
+        <p:nvCxnSpPr>
+          <p:cNvPr id="22" name="Straight Arrow Connector 21">
+            <a:extLst>
+              <a:ext uri="{FF2B5EF4-FFF2-40B4-BE49-F238E27FC236}">
+                <a16:creationId xmlns:a16="http://schemas.microsoft.com/office/drawing/2014/main" id="{71FF53A2-80DE-F70E-8A33-3867CF9F47EF}"/>
+              </a:ext>
+            </a:extLst>
+          </p:cNvPr>
+          <p:cNvCxnSpPr>
+            <a:cxnSpLocks/>
+            <a:stCxn id="7" idx="6"/>
+            <a:endCxn id="9" idx="2"/>
+          </p:cNvCxnSpPr>
+          <p:nvPr/>
+        </p:nvCxnSpPr>
+        <p:spPr>
+          <a:xfrm flipV="1">
+            <a:off x="5554711" y="4135717"/>
+            <a:ext cx="2665775" cy="103324"/>
+          </a:xfrm>
+          <a:prstGeom prst="straightConnector1">
+            <a:avLst/>
+          </a:prstGeom>
+          <a:ln>
+            <a:tailEnd type="triangle"/>
+          </a:ln>
+        </p:spPr>
+        <p:style>
+          <a:lnRef idx="1">
+            <a:schemeClr val="accent1"/>
+          </a:lnRef>
+          <a:fillRef idx="0">
+            <a:schemeClr val="accent1"/>
+          </a:fillRef>
+          <a:effectRef idx="0">
+            <a:schemeClr val="accent1"/>
+          </a:effectRef>
+          <a:fontRef idx="minor">
+            <a:schemeClr val="tx1"/>
+          </a:fontRef>
+        </p:style>
+      </p:cxnSp>
+      <p:cxnSp>
+        <p:nvCxnSpPr>
+          <p:cNvPr id="23" name="Straight Arrow Connector 22">
+            <a:extLst>
+              <a:ext uri="{FF2B5EF4-FFF2-40B4-BE49-F238E27FC236}">
+                <a16:creationId xmlns:a16="http://schemas.microsoft.com/office/drawing/2014/main" id="{B0A7232E-6E33-2922-941A-B4FCA023CAAC}"/>
+              </a:ext>
+            </a:extLst>
+          </p:cNvPr>
+          <p:cNvCxnSpPr>
+            <a:stCxn id="18" idx="6"/>
+            <a:endCxn id="6" idx="2"/>
+          </p:cNvCxnSpPr>
+          <p:nvPr/>
+        </p:nvCxnSpPr>
+        <p:spPr>
+          <a:xfrm flipV="1">
+            <a:off x="3090627" y="2953752"/>
+            <a:ext cx="1612235" cy="1443598"/>
+          </a:xfrm>
+          <a:prstGeom prst="straightConnector1">
+            <a:avLst/>
+          </a:prstGeom>
+          <a:ln>
+            <a:tailEnd type="triangle"/>
+          </a:ln>
+        </p:spPr>
+        <p:style>
+          <a:lnRef idx="1">
+            <a:schemeClr val="accent1"/>
+          </a:lnRef>
+          <a:fillRef idx="0">
+            <a:schemeClr val="accent1"/>
+          </a:fillRef>
+          <a:effectRef idx="0">
+            <a:schemeClr val="accent1"/>
+          </a:effectRef>
+          <a:fontRef idx="minor">
+            <a:schemeClr val="tx1"/>
+          </a:fontRef>
+        </p:style>
+      </p:cxnSp>
+      <p:cxnSp>
+        <p:nvCxnSpPr>
+          <p:cNvPr id="24" name="Straight Arrow Connector 23">
+            <a:extLst>
+              <a:ext uri="{FF2B5EF4-FFF2-40B4-BE49-F238E27FC236}">
+                <a16:creationId xmlns:a16="http://schemas.microsoft.com/office/drawing/2014/main" id="{181867C6-C1C1-E83F-7B9C-B98861490C4E}"/>
+              </a:ext>
+            </a:extLst>
+          </p:cNvPr>
+          <p:cNvCxnSpPr>
+            <a:stCxn id="5" idx="6"/>
+            <a:endCxn id="19" idx="2"/>
+          </p:cNvCxnSpPr>
+          <p:nvPr/>
+        </p:nvCxnSpPr>
+        <p:spPr>
+          <a:xfrm>
+            <a:off x="3067856" y="3062497"/>
+            <a:ext cx="1646168" cy="2457382"/>
+          </a:xfrm>
+          <a:prstGeom prst="straightConnector1">
+            <a:avLst/>
+          </a:prstGeom>
+          <a:ln>
+            <a:tailEnd type="triangle"/>
+          </a:ln>
+        </p:spPr>
+        <p:style>
+          <a:lnRef idx="1">
+            <a:schemeClr val="accent1"/>
+          </a:lnRef>
+          <a:fillRef idx="0">
+            <a:schemeClr val="accent1"/>
+          </a:fillRef>
+          <a:effectRef idx="0">
+            <a:schemeClr val="accent1"/>
+          </a:effectRef>
+          <a:fontRef idx="minor">
+            <a:schemeClr val="tx1"/>
+          </a:fontRef>
+        </p:style>
+      </p:cxnSp>
+      <p:cxnSp>
+        <p:nvCxnSpPr>
+          <p:cNvPr id="25" name="Straight Arrow Connector 24">
+            <a:extLst>
+              <a:ext uri="{FF2B5EF4-FFF2-40B4-BE49-F238E27FC236}">
+                <a16:creationId xmlns:a16="http://schemas.microsoft.com/office/drawing/2014/main" id="{CD6B4A31-3C82-2878-25C2-2DB8C2AEE967}"/>
+              </a:ext>
+            </a:extLst>
+          </p:cNvPr>
+          <p:cNvCxnSpPr>
+            <a:stCxn id="18" idx="6"/>
+            <a:endCxn id="7" idx="2"/>
+          </p:cNvCxnSpPr>
+          <p:nvPr/>
+        </p:nvCxnSpPr>
+        <p:spPr>
+          <a:xfrm flipV="1">
+            <a:off x="3090627" y="4239041"/>
+            <a:ext cx="1619257" cy="158309"/>
+          </a:xfrm>
+          <a:prstGeom prst="straightConnector1">
+            <a:avLst/>
+          </a:prstGeom>
+          <a:ln>
+            <a:tailEnd type="triangle"/>
+          </a:ln>
+        </p:spPr>
+        <p:style>
+          <a:lnRef idx="1">
+            <a:schemeClr val="accent1"/>
+          </a:lnRef>
+          <a:fillRef idx="0">
+            <a:schemeClr val="accent1"/>
+          </a:fillRef>
+          <a:effectRef idx="0">
+            <a:schemeClr val="accent1"/>
+          </a:effectRef>
+          <a:fontRef idx="minor">
+            <a:schemeClr val="tx1"/>
+          </a:fontRef>
+        </p:style>
+      </p:cxnSp>
+      <p:sp>
+        <p:nvSpPr>
+          <p:cNvPr id="29" name="Oval 28">
+            <a:extLst>
+              <a:ext uri="{FF2B5EF4-FFF2-40B4-BE49-F238E27FC236}">
+                <a16:creationId xmlns:a16="http://schemas.microsoft.com/office/drawing/2014/main" id="{C9083F45-7DF7-62E6-675C-0A52B595E707}"/>
+              </a:ext>
+            </a:extLst>
+          </p:cNvPr>
+          <p:cNvSpPr/>
+          <p:nvPr/>
+        </p:nvSpPr>
+        <p:spPr>
+          <a:xfrm>
+            <a:off x="1330979" y="5201176"/>
+            <a:ext cx="1769165" cy="745435"/>
+          </a:xfrm>
+          <a:prstGeom prst="ellipse">
+            <a:avLst/>
+          </a:prstGeom>
+        </p:spPr>
+        <p:style>
+          <a:lnRef idx="2">
+            <a:schemeClr val="accent5">
+              <a:shade val="15000"/>
+            </a:schemeClr>
+          </a:lnRef>
+          <a:fillRef idx="1">
+            <a:schemeClr val="accent5"/>
+          </a:fillRef>
+          <a:effectRef idx="0">
+            <a:schemeClr val="accent5"/>
+          </a:effectRef>
+          <a:fontRef idx="minor">
+            <a:schemeClr val="lt1"/>
+          </a:fontRef>
+        </p:style>
+        <p:txBody>
+          <a:bodyPr rtlCol="0" anchor="ctr"/>
+          <a:lstStyle/>
+          <a:p>
+            <a:pPr algn="ctr"/>
+            <a:r>
+              <a:rPr lang="en-US" dirty="0"/>
+              <a:t>Gender</a:t>
+            </a:r>
+          </a:p>
+        </p:txBody>
+      </p:sp>
+      <p:cxnSp>
+        <p:nvCxnSpPr>
+          <p:cNvPr id="58" name="Straight Arrow Connector 57">
+            <a:extLst>
+              <a:ext uri="{FF2B5EF4-FFF2-40B4-BE49-F238E27FC236}">
+                <a16:creationId xmlns:a16="http://schemas.microsoft.com/office/drawing/2014/main" id="{57D4B414-6F2B-21C8-B3E5-9057503D4501}"/>
+              </a:ext>
+            </a:extLst>
+          </p:cNvPr>
+          <p:cNvCxnSpPr>
+            <a:cxnSpLocks/>
+            <a:stCxn id="29" idx="6"/>
+            <a:endCxn id="6" idx="2"/>
+          </p:cNvCxnSpPr>
+          <p:nvPr/>
+        </p:nvCxnSpPr>
+        <p:spPr>
+          <a:xfrm flipV="1">
+            <a:off x="3100144" y="2953752"/>
+            <a:ext cx="1602718" cy="2620142"/>
+          </a:xfrm>
+          <a:prstGeom prst="straightConnector1">
+            <a:avLst/>
+          </a:prstGeom>
+          <a:ln>
+            <a:tailEnd type="triangle"/>
+          </a:ln>
+        </p:spPr>
+        <p:style>
+          <a:lnRef idx="1">
+            <a:schemeClr val="accent1"/>
+          </a:lnRef>
+          <a:fillRef idx="0">
+            <a:schemeClr val="accent1"/>
+          </a:fillRef>
+          <a:effectRef idx="0">
+            <a:schemeClr val="accent1"/>
+          </a:effectRef>
+          <a:fontRef idx="minor">
+            <a:schemeClr val="tx1"/>
+          </a:fontRef>
+        </p:style>
+      </p:cxnSp>
+      <p:cxnSp>
+        <p:nvCxnSpPr>
+          <p:cNvPr id="61" name="Straight Arrow Connector 60">
+            <a:extLst>
+              <a:ext uri="{FF2B5EF4-FFF2-40B4-BE49-F238E27FC236}">
+                <a16:creationId xmlns:a16="http://schemas.microsoft.com/office/drawing/2014/main" id="{8E3F962A-5E95-D9BC-DFF9-60CDF11B5F75}"/>
+              </a:ext>
+            </a:extLst>
+          </p:cNvPr>
+          <p:cNvCxnSpPr>
+            <a:stCxn id="29" idx="6"/>
+            <a:endCxn id="7" idx="2"/>
+          </p:cNvCxnSpPr>
+          <p:nvPr/>
+        </p:nvCxnSpPr>
+        <p:spPr>
+          <a:xfrm flipV="1">
+            <a:off x="3100144" y="4239041"/>
+            <a:ext cx="1609740" cy="1334853"/>
+          </a:xfrm>
+          <a:prstGeom prst="straightConnector1">
+            <a:avLst/>
+          </a:prstGeom>
+          <a:ln>
+            <a:tailEnd type="triangle"/>
+          </a:ln>
+        </p:spPr>
+        <p:style>
+          <a:lnRef idx="1">
+            <a:schemeClr val="accent1"/>
+          </a:lnRef>
+          <a:fillRef idx="0">
+            <a:schemeClr val="accent1"/>
+          </a:fillRef>
+          <a:effectRef idx="0">
+            <a:schemeClr val="accent1"/>
+          </a:effectRef>
+          <a:fontRef idx="minor">
+            <a:schemeClr val="tx1"/>
+          </a:fontRef>
+        </p:style>
+      </p:cxnSp>
+      <p:cxnSp>
+        <p:nvCxnSpPr>
+          <p:cNvPr id="63" name="Straight Arrow Connector 62">
+            <a:extLst>
+              <a:ext uri="{FF2B5EF4-FFF2-40B4-BE49-F238E27FC236}">
+                <a16:creationId xmlns:a16="http://schemas.microsoft.com/office/drawing/2014/main" id="{DE699506-CF49-BAA3-7F17-A965466F4830}"/>
+              </a:ext>
+            </a:extLst>
+          </p:cNvPr>
+          <p:cNvCxnSpPr>
+            <a:stCxn id="29" idx="6"/>
+            <a:endCxn id="19" idx="2"/>
+          </p:cNvCxnSpPr>
+          <p:nvPr/>
+        </p:nvCxnSpPr>
+        <p:spPr>
+          <a:xfrm flipV="1">
+            <a:off x="3100144" y="5519879"/>
+            <a:ext cx="1613880" cy="54015"/>
+          </a:xfrm>
+          <a:prstGeom prst="straightConnector1">
+            <a:avLst/>
+          </a:prstGeom>
+          <a:ln>
+            <a:tailEnd type="triangle"/>
+          </a:ln>
+        </p:spPr>
+        <p:style>
+          <a:lnRef idx="1">
+            <a:schemeClr val="accent1"/>
+          </a:lnRef>
+          <a:fillRef idx="0">
+            <a:schemeClr val="accent1"/>
+          </a:fillRef>
+          <a:effectRef idx="0">
+            <a:schemeClr val="accent1"/>
+          </a:effectRef>
+          <a:fontRef idx="minor">
+            <a:schemeClr val="tx1"/>
+          </a:fontRef>
+        </p:style>
+      </p:cxnSp>
+      <p:sp>
+        <p:nvSpPr>
+          <p:cNvPr id="64" name="Oval 63">
+            <a:extLst>
+              <a:ext uri="{FF2B5EF4-FFF2-40B4-BE49-F238E27FC236}">
+                <a16:creationId xmlns:a16="http://schemas.microsoft.com/office/drawing/2014/main" id="{3D3FF444-91AB-4C49-2C02-AC4FB512143F}"/>
+              </a:ext>
+            </a:extLst>
+          </p:cNvPr>
+          <p:cNvSpPr/>
+          <p:nvPr/>
+        </p:nvSpPr>
+        <p:spPr>
+          <a:xfrm>
+            <a:off x="8281816" y="4759287"/>
+            <a:ext cx="1620081" cy="745435"/>
+          </a:xfrm>
+          <a:prstGeom prst="ellipse">
+            <a:avLst/>
+          </a:prstGeom>
+        </p:spPr>
+        <p:style>
+          <a:lnRef idx="2">
+            <a:schemeClr val="accent1">
+              <a:shade val="15000"/>
+            </a:schemeClr>
+          </a:lnRef>
+          <a:fillRef idx="1">
+            <a:schemeClr val="accent1"/>
+          </a:fillRef>
+          <a:effectRef idx="0">
+            <a:schemeClr val="accent1"/>
+          </a:effectRef>
+          <a:fontRef idx="minor">
+            <a:schemeClr val="lt1"/>
+          </a:fontRef>
+        </p:style>
+        <p:txBody>
+          <a:bodyPr rtlCol="0" anchor="ctr"/>
+          <a:lstStyle/>
+          <a:p>
+            <a:pPr algn="ctr"/>
+            <a:r>
+              <a:rPr lang="en-US" dirty="0"/>
+              <a:t>Age Grp3</a:t>
+            </a:r>
+          </a:p>
+        </p:txBody>
+      </p:sp>
+      <p:sp>
+        <p:nvSpPr>
+          <p:cNvPr id="68" name="Oval 67">
+            <a:extLst>
+              <a:ext uri="{FF2B5EF4-FFF2-40B4-BE49-F238E27FC236}">
+                <a16:creationId xmlns:a16="http://schemas.microsoft.com/office/drawing/2014/main" id="{7749938B-F58E-80EF-E9B2-C24683EA4E2F}"/>
+              </a:ext>
+            </a:extLst>
+          </p:cNvPr>
+          <p:cNvSpPr/>
+          <p:nvPr/>
+        </p:nvSpPr>
+        <p:spPr>
+          <a:xfrm>
+            <a:off x="8281816" y="5773349"/>
+            <a:ext cx="1620081" cy="745435"/>
+          </a:xfrm>
+          <a:prstGeom prst="ellipse">
+            <a:avLst/>
+          </a:prstGeom>
+        </p:spPr>
+        <p:style>
+          <a:lnRef idx="2">
+            <a:schemeClr val="accent1">
+              <a:shade val="15000"/>
+            </a:schemeClr>
+          </a:lnRef>
+          <a:fillRef idx="1">
+            <a:schemeClr val="accent1"/>
+          </a:fillRef>
+          <a:effectRef idx="0">
+            <a:schemeClr val="accent1"/>
+          </a:effectRef>
+          <a:fontRef idx="minor">
+            <a:schemeClr val="lt1"/>
+          </a:fontRef>
+        </p:style>
+        <p:txBody>
+          <a:bodyPr rtlCol="0" anchor="ctr"/>
+          <a:lstStyle/>
+          <a:p>
+            <a:pPr algn="ctr"/>
+            <a:r>
+              <a:rPr lang="en-US" dirty="0"/>
+              <a:t>Age Grp4</a:t>
+            </a:r>
+          </a:p>
+        </p:txBody>
+      </p:sp>
+      <p:cxnSp>
+        <p:nvCxnSpPr>
+          <p:cNvPr id="73" name="Straight Arrow Connector 72">
+            <a:extLst>
+              <a:ext uri="{FF2B5EF4-FFF2-40B4-BE49-F238E27FC236}">
+                <a16:creationId xmlns:a16="http://schemas.microsoft.com/office/drawing/2014/main" id="{E83CC8DE-C404-CC14-CBEB-8DB744046AB3}"/>
+              </a:ext>
+            </a:extLst>
+          </p:cNvPr>
+          <p:cNvCxnSpPr>
+            <a:cxnSpLocks/>
+            <a:stCxn id="6" idx="6"/>
+            <a:endCxn id="64" idx="2"/>
+          </p:cNvCxnSpPr>
+          <p:nvPr/>
+        </p:nvCxnSpPr>
+        <p:spPr>
+          <a:xfrm>
+            <a:off x="5547689" y="2953752"/>
+            <a:ext cx="2734127" cy="2178253"/>
+          </a:xfrm>
+          <a:prstGeom prst="straightConnector1">
+            <a:avLst/>
+          </a:prstGeom>
+          <a:ln>
+            <a:tailEnd type="triangle"/>
+          </a:ln>
+        </p:spPr>
+        <p:style>
+          <a:lnRef idx="1">
+            <a:schemeClr val="accent1"/>
+          </a:lnRef>
+          <a:fillRef idx="0">
+            <a:schemeClr val="accent1"/>
+          </a:fillRef>
+          <a:effectRef idx="0">
+            <a:schemeClr val="accent1"/>
+          </a:effectRef>
+          <a:fontRef idx="minor">
+            <a:schemeClr val="tx1"/>
+          </a:fontRef>
+        </p:style>
+      </p:cxnSp>
+      <p:cxnSp>
+        <p:nvCxnSpPr>
+          <p:cNvPr id="76" name="Straight Arrow Connector 75">
+            <a:extLst>
+              <a:ext uri="{FF2B5EF4-FFF2-40B4-BE49-F238E27FC236}">
+                <a16:creationId xmlns:a16="http://schemas.microsoft.com/office/drawing/2014/main" id="{716B1740-0A3D-B93F-7B7C-0A30933447FF}"/>
+              </a:ext>
+            </a:extLst>
+          </p:cNvPr>
+          <p:cNvCxnSpPr>
+            <a:cxnSpLocks/>
+            <a:stCxn id="6" idx="6"/>
+            <a:endCxn id="68" idx="2"/>
+          </p:cNvCxnSpPr>
+          <p:nvPr/>
+        </p:nvCxnSpPr>
+        <p:spPr>
+          <a:xfrm>
+            <a:off x="5547689" y="2953752"/>
+            <a:ext cx="2734127" cy="3192315"/>
+          </a:xfrm>
+          <a:prstGeom prst="straightConnector1">
+            <a:avLst/>
+          </a:prstGeom>
+          <a:ln>
+            <a:tailEnd type="triangle"/>
+          </a:ln>
+        </p:spPr>
+        <p:style>
+          <a:lnRef idx="1">
+            <a:schemeClr val="accent1"/>
+          </a:lnRef>
+          <a:fillRef idx="0">
+            <a:schemeClr val="accent1"/>
+          </a:fillRef>
+          <a:effectRef idx="0">
+            <a:schemeClr val="accent1"/>
+          </a:effectRef>
+          <a:fontRef idx="minor">
+            <a:schemeClr val="tx1"/>
+          </a:fontRef>
+        </p:style>
+      </p:cxnSp>
+      <p:cxnSp>
+        <p:nvCxnSpPr>
+          <p:cNvPr id="79" name="Straight Arrow Connector 78">
+            <a:extLst>
+              <a:ext uri="{FF2B5EF4-FFF2-40B4-BE49-F238E27FC236}">
+                <a16:creationId xmlns:a16="http://schemas.microsoft.com/office/drawing/2014/main" id="{C3248468-26F1-45CF-7222-8879AFE418C9}"/>
+              </a:ext>
+            </a:extLst>
+          </p:cNvPr>
+          <p:cNvCxnSpPr>
+            <a:stCxn id="7" idx="6"/>
+            <a:endCxn id="64" idx="2"/>
+          </p:cNvCxnSpPr>
+          <p:nvPr/>
+        </p:nvCxnSpPr>
+        <p:spPr>
+          <a:xfrm>
+            <a:off x="5554711" y="4239041"/>
+            <a:ext cx="2727105" cy="892964"/>
+          </a:xfrm>
+          <a:prstGeom prst="straightConnector1">
+            <a:avLst/>
+          </a:prstGeom>
+          <a:ln>
+            <a:tailEnd type="triangle"/>
+          </a:ln>
+        </p:spPr>
+        <p:style>
+          <a:lnRef idx="1">
+            <a:schemeClr val="accent1"/>
+          </a:lnRef>
+          <a:fillRef idx="0">
+            <a:schemeClr val="accent1"/>
+          </a:fillRef>
+          <a:effectRef idx="0">
+            <a:schemeClr val="accent1"/>
+          </a:effectRef>
+          <a:fontRef idx="minor">
+            <a:schemeClr val="tx1"/>
+          </a:fontRef>
+        </p:style>
+      </p:cxnSp>
+      <p:cxnSp>
+        <p:nvCxnSpPr>
+          <p:cNvPr id="81" name="Straight Arrow Connector 80">
+            <a:extLst>
+              <a:ext uri="{FF2B5EF4-FFF2-40B4-BE49-F238E27FC236}">
+                <a16:creationId xmlns:a16="http://schemas.microsoft.com/office/drawing/2014/main" id="{F9A2F7A3-53F4-4DFA-A48B-5C99BB4A2139}"/>
+              </a:ext>
+            </a:extLst>
+          </p:cNvPr>
+          <p:cNvCxnSpPr>
+            <a:stCxn id="7" idx="6"/>
+            <a:endCxn id="68" idx="2"/>
+          </p:cNvCxnSpPr>
+          <p:nvPr/>
+        </p:nvCxnSpPr>
+        <p:spPr>
+          <a:xfrm>
+            <a:off x="5554711" y="4239041"/>
+            <a:ext cx="2727105" cy="1907026"/>
+          </a:xfrm>
+          <a:prstGeom prst="straightConnector1">
+            <a:avLst/>
+          </a:prstGeom>
+          <a:ln>
+            <a:tailEnd type="triangle"/>
+          </a:ln>
+        </p:spPr>
+        <p:style>
+          <a:lnRef idx="1">
+            <a:schemeClr val="accent1"/>
+          </a:lnRef>
+          <a:fillRef idx="0">
+            <a:schemeClr val="accent1"/>
+          </a:fillRef>
+          <a:effectRef idx="0">
+            <a:schemeClr val="accent1"/>
+          </a:effectRef>
+          <a:fontRef idx="minor">
+            <a:schemeClr val="tx1"/>
+          </a:fontRef>
+        </p:style>
+      </p:cxnSp>
+      <p:cxnSp>
+        <p:nvCxnSpPr>
+          <p:cNvPr id="83" name="Straight Arrow Connector 82">
+            <a:extLst>
+              <a:ext uri="{FF2B5EF4-FFF2-40B4-BE49-F238E27FC236}">
+                <a16:creationId xmlns:a16="http://schemas.microsoft.com/office/drawing/2014/main" id="{E178B251-0EE9-797F-B06A-336D84DC45D3}"/>
+              </a:ext>
+            </a:extLst>
+          </p:cNvPr>
+          <p:cNvCxnSpPr>
+            <a:stCxn id="19" idx="6"/>
+            <a:endCxn id="64" idx="2"/>
+          </p:cNvCxnSpPr>
+          <p:nvPr/>
+        </p:nvCxnSpPr>
+        <p:spPr>
+          <a:xfrm flipV="1">
+            <a:off x="5558851" y="5132005"/>
+            <a:ext cx="2722965" cy="387874"/>
+          </a:xfrm>
+          <a:prstGeom prst="straightConnector1">
+            <a:avLst/>
+          </a:prstGeom>
+          <a:ln>
+            <a:tailEnd type="triangle"/>
+          </a:ln>
+        </p:spPr>
+        <p:style>
+          <a:lnRef idx="1">
+            <a:schemeClr val="accent1"/>
+          </a:lnRef>
+          <a:fillRef idx="0">
+            <a:schemeClr val="accent1"/>
+          </a:fillRef>
+          <a:effectRef idx="0">
+            <a:schemeClr val="accent1"/>
+          </a:effectRef>
+          <a:fontRef idx="minor">
+            <a:schemeClr val="tx1"/>
+          </a:fontRef>
+        </p:style>
+      </p:cxnSp>
+      <p:cxnSp>
+        <p:nvCxnSpPr>
+          <p:cNvPr id="85" name="Straight Arrow Connector 84">
+            <a:extLst>
+              <a:ext uri="{FF2B5EF4-FFF2-40B4-BE49-F238E27FC236}">
+                <a16:creationId xmlns:a16="http://schemas.microsoft.com/office/drawing/2014/main" id="{F8A4DF1E-203C-8C23-9229-C8A30C7AEB7D}"/>
+              </a:ext>
+            </a:extLst>
+          </p:cNvPr>
+          <p:cNvCxnSpPr>
+            <a:stCxn id="19" idx="6"/>
+            <a:endCxn id="68" idx="2"/>
+          </p:cNvCxnSpPr>
+          <p:nvPr/>
+        </p:nvCxnSpPr>
+        <p:spPr>
+          <a:xfrm>
+            <a:off x="5558851" y="5519879"/>
+            <a:ext cx="2722965" cy="626188"/>
+          </a:xfrm>
+          <a:prstGeom prst="straightConnector1">
+            <a:avLst/>
+          </a:prstGeom>
+          <a:ln>
+            <a:tailEnd type="triangle"/>
+          </a:ln>
+        </p:spPr>
+        <p:style>
+          <a:lnRef idx="1">
+            <a:schemeClr val="accent1"/>
+          </a:lnRef>
+          <a:fillRef idx="0">
+            <a:schemeClr val="accent1"/>
+          </a:fillRef>
+          <a:effectRef idx="0">
+            <a:schemeClr val="accent1"/>
+          </a:effectRef>
+          <a:fontRef idx="minor">
+            <a:schemeClr val="tx1"/>
+          </a:fontRef>
+        </p:style>
+      </p:cxnSp>
+    </p:spTree>
+    <p:extLst>
+      <p:ext uri="{BB962C8B-B14F-4D97-AF65-F5344CB8AC3E}">
+        <p14:creationId xmlns:p14="http://schemas.microsoft.com/office/powerpoint/2010/main" val="4175192429"/>
       </p:ext>
     </p:extLst>
   </p:cSld>

</xml_diff>

<commit_message>
Adding the Max Pool Layer
</commit_message>
<xml_diff>
--- a/Introduction To Neural Networks and AI.pptx
+++ b/Introduction To Neural Networks and AI.pptx
@@ -5,7 +5,7 @@
     <p:sldMasterId id="2147483648" r:id="rId3"/>
   </p:sldMasterIdLst>
   <p:notesMasterIdLst>
-    <p:notesMasterId r:id="rId32"/>
+    <p:notesMasterId r:id="rId35"/>
   </p:notesMasterIdLst>
   <p:sldIdLst>
     <p:sldId id="256" r:id="rId4"/>
@@ -36,6 +36,9 @@
     <p:sldId id="278" r:id="rId29"/>
     <p:sldId id="279" r:id="rId30"/>
     <p:sldId id="280" r:id="rId31"/>
+    <p:sldId id="285" r:id="rId32"/>
+    <p:sldId id="286" r:id="rId33"/>
+    <p:sldId id="287" r:id="rId34"/>
   </p:sldIdLst>
   <p:sldSz cx="12192000" cy="6858000"/>
   <p:notesSz cx="6858000" cy="9144000"/>
@@ -145,7 +148,7 @@
 <file path=ppt/revisionInfo.xml><?xml version="1.0" encoding="utf-8"?>
 <p1510:revInfo xmlns:a="http://schemas.openxmlformats.org/drawingml/2006/main" xmlns:r="http://schemas.openxmlformats.org/officeDocument/2006/relationships" xmlns:p1510="http://schemas.microsoft.com/office/powerpoint/2015/10/main">
   <p1510:revLst>
-    <p1510:client id="{05AC3426-0FDA-4E5E-B41B-21C816E296BA}" v="25" dt="2024-02-02T17:05:49.411"/>
+    <p1510:client id="{C604B177-CA10-4EEE-AEB3-77DC8E66ABBC}" v="9" dt="2024-04-12T16:02:31.352"/>
   </p1510:revLst>
 </p1510:revInfo>
 </file>
@@ -232,7 +235,7 @@
           <a:p>
             <a:fld id="{5AB62516-B39C-4B83-B17D-6AC3DDBA5C2D}" type="datetimeFigureOut">
               <a:rPr lang="en-US" smtClean="0"/>
-              <a:t>2/23/2024</a:t>
+              <a:t>4/12/2024</a:t>
             </a:fld>
             <a:endParaRPr lang="en-US"/>
           </a:p>
@@ -648,7 +651,7 @@
           <a:p>
             <a:fld id="{28E627C4-8EBF-403B-AE19-F9A1CE4B216A}" type="datetimeFigureOut">
               <a:rPr lang="en-CA" smtClean="0"/>
-              <a:t>2024-02-23</a:t>
+              <a:t>2024-04-12</a:t>
             </a:fld>
             <a:endParaRPr lang="en-CA"/>
           </a:p>
@@ -848,7 +851,7 @@
           <a:p>
             <a:fld id="{28E627C4-8EBF-403B-AE19-F9A1CE4B216A}" type="datetimeFigureOut">
               <a:rPr lang="en-CA" smtClean="0"/>
-              <a:t>2024-02-23</a:t>
+              <a:t>2024-04-12</a:t>
             </a:fld>
             <a:endParaRPr lang="en-CA"/>
           </a:p>
@@ -1058,7 +1061,7 @@
           <a:p>
             <a:fld id="{28E627C4-8EBF-403B-AE19-F9A1CE4B216A}" type="datetimeFigureOut">
               <a:rPr lang="en-CA" smtClean="0"/>
-              <a:t>2024-02-23</a:t>
+              <a:t>2024-04-12</a:t>
             </a:fld>
             <a:endParaRPr lang="en-CA"/>
           </a:p>
@@ -1258,7 +1261,7 @@
           <a:p>
             <a:fld id="{28E627C4-8EBF-403B-AE19-F9A1CE4B216A}" type="datetimeFigureOut">
               <a:rPr lang="en-CA" smtClean="0"/>
-              <a:t>2024-02-23</a:t>
+              <a:t>2024-04-12</a:t>
             </a:fld>
             <a:endParaRPr lang="en-CA"/>
           </a:p>
@@ -1534,7 +1537,7 @@
           <a:p>
             <a:fld id="{28E627C4-8EBF-403B-AE19-F9A1CE4B216A}" type="datetimeFigureOut">
               <a:rPr lang="en-CA" smtClean="0"/>
-              <a:t>2024-02-23</a:t>
+              <a:t>2024-04-12</a:t>
             </a:fld>
             <a:endParaRPr lang="en-CA"/>
           </a:p>
@@ -1802,7 +1805,7 @@
           <a:p>
             <a:fld id="{28E627C4-8EBF-403B-AE19-F9A1CE4B216A}" type="datetimeFigureOut">
               <a:rPr lang="en-CA" smtClean="0"/>
-              <a:t>2024-02-23</a:t>
+              <a:t>2024-04-12</a:t>
             </a:fld>
             <a:endParaRPr lang="en-CA"/>
           </a:p>
@@ -2217,7 +2220,7 @@
           <a:p>
             <a:fld id="{28E627C4-8EBF-403B-AE19-F9A1CE4B216A}" type="datetimeFigureOut">
               <a:rPr lang="en-CA" smtClean="0"/>
-              <a:t>2024-02-23</a:t>
+              <a:t>2024-04-12</a:t>
             </a:fld>
             <a:endParaRPr lang="en-CA"/>
           </a:p>
@@ -2359,7 +2362,7 @@
           <a:p>
             <a:fld id="{28E627C4-8EBF-403B-AE19-F9A1CE4B216A}" type="datetimeFigureOut">
               <a:rPr lang="en-CA" smtClean="0"/>
-              <a:t>2024-02-23</a:t>
+              <a:t>2024-04-12</a:t>
             </a:fld>
             <a:endParaRPr lang="en-CA"/>
           </a:p>
@@ -2472,7 +2475,7 @@
           <a:p>
             <a:fld id="{28E627C4-8EBF-403B-AE19-F9A1CE4B216A}" type="datetimeFigureOut">
               <a:rPr lang="en-CA" smtClean="0"/>
-              <a:t>2024-02-23</a:t>
+              <a:t>2024-04-12</a:t>
             </a:fld>
             <a:endParaRPr lang="en-CA"/>
           </a:p>
@@ -2785,7 +2788,7 @@
           <a:p>
             <a:fld id="{28E627C4-8EBF-403B-AE19-F9A1CE4B216A}" type="datetimeFigureOut">
               <a:rPr lang="en-CA" smtClean="0"/>
-              <a:t>2024-02-23</a:t>
+              <a:t>2024-04-12</a:t>
             </a:fld>
             <a:endParaRPr lang="en-CA"/>
           </a:p>
@@ -3074,7 +3077,7 @@
           <a:p>
             <a:fld id="{28E627C4-8EBF-403B-AE19-F9A1CE4B216A}" type="datetimeFigureOut">
               <a:rPr lang="en-CA" smtClean="0"/>
-              <a:t>2024-02-23</a:t>
+              <a:t>2024-04-12</a:t>
             </a:fld>
             <a:endParaRPr lang="en-CA"/>
           </a:p>
@@ -3317,7 +3320,7 @@
           <a:p>
             <a:fld id="{28E627C4-8EBF-403B-AE19-F9A1CE4B216A}" type="datetimeFigureOut">
               <a:rPr lang="en-CA" smtClean="0"/>
-              <a:t>2024-02-23</a:t>
+              <a:t>2024-04-12</a:t>
             </a:fld>
             <a:endParaRPr lang="en-CA"/>
           </a:p>
@@ -12633,6 +12636,107 @@
 </p:sld>
 </file>
 
+<file path=ppt/slides/slide29.xml><?xml version="1.0" encoding="utf-8"?>
+<p:sld xmlns:a="http://schemas.openxmlformats.org/drawingml/2006/main" xmlns:r="http://schemas.openxmlformats.org/officeDocument/2006/relationships" xmlns:p="http://schemas.openxmlformats.org/presentationml/2006/main">
+  <p:cSld>
+    <p:spTree>
+      <p:nvGrpSpPr>
+        <p:cNvPr id="1" name=""/>
+        <p:cNvGrpSpPr/>
+        <p:nvPr/>
+      </p:nvGrpSpPr>
+      <p:grpSpPr>
+        <a:xfrm>
+          <a:off x="0" y="0"/>
+          <a:ext cx="0" cy="0"/>
+          <a:chOff x="0" y="0"/>
+          <a:chExt cx="0" cy="0"/>
+        </a:xfrm>
+      </p:grpSpPr>
+      <p:sp>
+        <p:nvSpPr>
+          <p:cNvPr id="2" name="Title 1">
+            <a:extLst>
+              <a:ext uri="{FF2B5EF4-FFF2-40B4-BE49-F238E27FC236}">
+                <a16:creationId xmlns:a16="http://schemas.microsoft.com/office/drawing/2014/main" id="{289AA22B-5900-746A-C4D4-F46F14C1B546}"/>
+              </a:ext>
+            </a:extLst>
+          </p:cNvPr>
+          <p:cNvSpPr>
+            <a:spLocks noGrp="1"/>
+          </p:cNvSpPr>
+          <p:nvPr>
+            <p:ph type="title"/>
+          </p:nvPr>
+        </p:nvSpPr>
+        <p:spPr/>
+        <p:txBody>
+          <a:bodyPr/>
+          <a:lstStyle/>
+          <a:p>
+            <a:r>
+              <a:rPr lang="en-US" dirty="0"/>
+              <a:t>Max Pool Layer</a:t>
+            </a:r>
+          </a:p>
+        </p:txBody>
+      </p:sp>
+      <p:sp>
+        <p:nvSpPr>
+          <p:cNvPr id="3" name="Content Placeholder 2">
+            <a:extLst>
+              <a:ext uri="{FF2B5EF4-FFF2-40B4-BE49-F238E27FC236}">
+                <a16:creationId xmlns:a16="http://schemas.microsoft.com/office/drawing/2014/main" id="{42816BB4-0471-2374-B799-BC38D2A1E376}"/>
+              </a:ext>
+            </a:extLst>
+          </p:cNvPr>
+          <p:cNvSpPr>
+            <a:spLocks noGrp="1"/>
+          </p:cNvSpPr>
+          <p:nvPr>
+            <p:ph idx="1"/>
+          </p:nvPr>
+        </p:nvSpPr>
+        <p:spPr/>
+        <p:txBody>
+          <a:bodyPr/>
+          <a:lstStyle/>
+          <a:p>
+            <a:r>
+              <a:rPr lang="en-US" dirty="0"/>
+              <a:t>A Pool layer will collapse the input according to the pooling algorithm.</a:t>
+            </a:r>
+          </a:p>
+          <a:p>
+            <a:r>
+              <a:rPr lang="en-US" dirty="0"/>
+              <a:t>This forces the neurons in the lower layers to only look at the inputs which are significant and the network will only look at those highlighted inputs while ignoring all other inputs.</a:t>
+            </a:r>
+          </a:p>
+          <a:p>
+            <a:r>
+              <a:rPr lang="en-US" dirty="0"/>
+              <a:t>We will use a MAX pool layer which will highlight the maximum input in a pool. The rest of the inputs will be set to 0 so that the neural network will try to ignore them.</a:t>
+            </a:r>
+          </a:p>
+          <a:p>
+            <a:endParaRPr lang="en-US" dirty="0"/>
+          </a:p>
+        </p:txBody>
+      </p:sp>
+    </p:spTree>
+    <p:extLst>
+      <p:ext uri="{BB962C8B-B14F-4D97-AF65-F5344CB8AC3E}">
+        <p14:creationId xmlns:p14="http://schemas.microsoft.com/office/powerpoint/2010/main" val="3733284459"/>
+      </p:ext>
+    </p:extLst>
+  </p:cSld>
+  <p:clrMapOvr>
+    <a:masterClrMapping/>
+  </p:clrMapOvr>
+</p:sld>
+</file>
+
 <file path=ppt/slides/slide3.xml><?xml version="1.0" encoding="utf-8"?>
 <p:sld xmlns:a="http://schemas.openxmlformats.org/drawingml/2006/main" xmlns:r="http://schemas.openxmlformats.org/officeDocument/2006/relationships" xmlns:p="http://schemas.openxmlformats.org/presentationml/2006/main">
   <p:cSld>
@@ -13245,6 +13349,1570 @@
     <p:extLst>
       <p:ext uri="{BB962C8B-B14F-4D97-AF65-F5344CB8AC3E}">
         <p14:creationId xmlns:p14="http://schemas.microsoft.com/office/powerpoint/2010/main" val="4104985636"/>
+      </p:ext>
+    </p:extLst>
+  </p:cSld>
+  <p:clrMapOvr>
+    <a:masterClrMapping/>
+  </p:clrMapOvr>
+</p:sld>
+</file>
+
+<file path=ppt/slides/slide30.xml><?xml version="1.0" encoding="utf-8"?>
+<p:sld xmlns:a="http://schemas.openxmlformats.org/drawingml/2006/main" xmlns:r="http://schemas.openxmlformats.org/officeDocument/2006/relationships" xmlns:p="http://schemas.openxmlformats.org/presentationml/2006/main">
+  <p:cSld>
+    <p:spTree>
+      <p:nvGrpSpPr>
+        <p:cNvPr id="1" name=""/>
+        <p:cNvGrpSpPr/>
+        <p:nvPr/>
+      </p:nvGrpSpPr>
+      <p:grpSpPr>
+        <a:xfrm>
+          <a:off x="0" y="0"/>
+          <a:ext cx="0" cy="0"/>
+          <a:chOff x="0" y="0"/>
+          <a:chExt cx="0" cy="0"/>
+        </a:xfrm>
+      </p:grpSpPr>
+      <p:sp>
+        <p:nvSpPr>
+          <p:cNvPr id="2" name="Title 1">
+            <a:extLst>
+              <a:ext uri="{FF2B5EF4-FFF2-40B4-BE49-F238E27FC236}">
+                <a16:creationId xmlns:a16="http://schemas.microsoft.com/office/drawing/2014/main" id="{3D8BFB76-38D3-E361-D35C-FDCEA807A9C4}"/>
+              </a:ext>
+            </a:extLst>
+          </p:cNvPr>
+          <p:cNvSpPr>
+            <a:spLocks noGrp="1"/>
+          </p:cNvSpPr>
+          <p:nvPr>
+            <p:ph type="title"/>
+          </p:nvPr>
+        </p:nvSpPr>
+        <p:spPr/>
+        <p:txBody>
+          <a:bodyPr/>
+          <a:lstStyle/>
+          <a:p>
+            <a:r>
+              <a:rPr lang="en-US" dirty="0"/>
+              <a:t>How does the Max Pool layer work?</a:t>
+            </a:r>
+          </a:p>
+        </p:txBody>
+      </p:sp>
+      <p:sp>
+        <p:nvSpPr>
+          <p:cNvPr id="3" name="Content Placeholder 2">
+            <a:extLst>
+              <a:ext uri="{FF2B5EF4-FFF2-40B4-BE49-F238E27FC236}">
+                <a16:creationId xmlns:a16="http://schemas.microsoft.com/office/drawing/2014/main" id="{C83BC957-82A6-96A1-C25C-822FDF736304}"/>
+              </a:ext>
+            </a:extLst>
+          </p:cNvPr>
+          <p:cNvSpPr>
+            <a:spLocks noGrp="1"/>
+          </p:cNvSpPr>
+          <p:nvPr>
+            <p:ph idx="1"/>
+          </p:nvPr>
+        </p:nvSpPr>
+        <p:spPr/>
+        <p:txBody>
+          <a:bodyPr/>
+          <a:lstStyle/>
+          <a:p>
+            <a:r>
+              <a:rPr lang="en-US" dirty="0"/>
+              <a:t>We set a window which will slide over the input and save the maximum value in this window while setting the other values to 0.</a:t>
+            </a:r>
+          </a:p>
+          <a:p>
+            <a:endParaRPr lang="en-US" dirty="0"/>
+          </a:p>
+          <a:p>
+            <a:pPr marL="0" indent="0">
+              <a:buNone/>
+            </a:pPr>
+            <a:r>
+              <a:rPr lang="en-US" sz="2400" dirty="0"/>
+              <a:t>Let us look at a sample vector and a pool window of 2 and a step size of 2.</a:t>
+            </a:r>
+          </a:p>
+          <a:p>
+            <a:pPr marL="0" indent="0">
+              <a:buNone/>
+            </a:pPr>
+            <a:endParaRPr lang="en-US" dirty="0"/>
+          </a:p>
+          <a:p>
+            <a:pPr marL="0" indent="0">
+              <a:buNone/>
+            </a:pPr>
+            <a:endParaRPr lang="en-US" dirty="0"/>
+          </a:p>
+          <a:p>
+            <a:pPr marL="0" indent="0">
+              <a:buNone/>
+            </a:pPr>
+            <a:endParaRPr lang="en-US" dirty="0"/>
+          </a:p>
+          <a:p>
+            <a:pPr marL="0" indent="0">
+              <a:buNone/>
+            </a:pPr>
+            <a:endParaRPr lang="en-US" dirty="0"/>
+          </a:p>
+        </p:txBody>
+      </p:sp>
+      <p:graphicFrame>
+        <p:nvGraphicFramePr>
+          <p:cNvPr id="4" name="Table 3">
+            <a:extLst>
+              <a:ext uri="{FF2B5EF4-FFF2-40B4-BE49-F238E27FC236}">
+                <a16:creationId xmlns:a16="http://schemas.microsoft.com/office/drawing/2014/main" id="{5C929C81-CFFE-FFC3-21DA-46FC5570F7D5}"/>
+              </a:ext>
+            </a:extLst>
+          </p:cNvPr>
+          <p:cNvGraphicFramePr>
+            <a:graphicFrameLocks noGrp="1"/>
+          </p:cNvGraphicFramePr>
+          <p:nvPr>
+            <p:extLst>
+              <p:ext uri="{D42A27DB-BD31-4B8C-83A1-F6EECF244321}">
+                <p14:modId xmlns:p14="http://schemas.microsoft.com/office/powerpoint/2010/main" val="1842877827"/>
+              </p:ext>
+            </p:extLst>
+          </p:nvPr>
+        </p:nvGraphicFramePr>
+        <p:xfrm>
+          <a:off x="918820" y="3630454"/>
+          <a:ext cx="8128000" cy="370840"/>
+        </p:xfrm>
+        <a:graphic>
+          <a:graphicData uri="http://schemas.openxmlformats.org/drawingml/2006/table">
+            <a:tbl>
+              <a:tblPr firstRow="1" bandRow="1">
+                <a:tableStyleId>{5C22544A-7EE6-4342-B048-85BDC9FD1C3A}</a:tableStyleId>
+              </a:tblPr>
+              <a:tblGrid>
+                <a:gridCol w="812800">
+                  <a:extLst>
+                    <a:ext uri="{9D8B030D-6E8A-4147-A177-3AD203B41FA5}">
+                      <a16:colId xmlns:a16="http://schemas.microsoft.com/office/drawing/2014/main" val="1895991030"/>
+                    </a:ext>
+                  </a:extLst>
+                </a:gridCol>
+                <a:gridCol w="812800">
+                  <a:extLst>
+                    <a:ext uri="{9D8B030D-6E8A-4147-A177-3AD203B41FA5}">
+                      <a16:colId xmlns:a16="http://schemas.microsoft.com/office/drawing/2014/main" val="1891825036"/>
+                    </a:ext>
+                  </a:extLst>
+                </a:gridCol>
+                <a:gridCol w="812800">
+                  <a:extLst>
+                    <a:ext uri="{9D8B030D-6E8A-4147-A177-3AD203B41FA5}">
+                      <a16:colId xmlns:a16="http://schemas.microsoft.com/office/drawing/2014/main" val="575181040"/>
+                    </a:ext>
+                  </a:extLst>
+                </a:gridCol>
+                <a:gridCol w="812800">
+                  <a:extLst>
+                    <a:ext uri="{9D8B030D-6E8A-4147-A177-3AD203B41FA5}">
+                      <a16:colId xmlns:a16="http://schemas.microsoft.com/office/drawing/2014/main" val="656511493"/>
+                    </a:ext>
+                  </a:extLst>
+                </a:gridCol>
+                <a:gridCol w="812800">
+                  <a:extLst>
+                    <a:ext uri="{9D8B030D-6E8A-4147-A177-3AD203B41FA5}">
+                      <a16:colId xmlns:a16="http://schemas.microsoft.com/office/drawing/2014/main" val="2940575715"/>
+                    </a:ext>
+                  </a:extLst>
+                </a:gridCol>
+                <a:gridCol w="812800">
+                  <a:extLst>
+                    <a:ext uri="{9D8B030D-6E8A-4147-A177-3AD203B41FA5}">
+                      <a16:colId xmlns:a16="http://schemas.microsoft.com/office/drawing/2014/main" val="2682389017"/>
+                    </a:ext>
+                  </a:extLst>
+                </a:gridCol>
+                <a:gridCol w="812800">
+                  <a:extLst>
+                    <a:ext uri="{9D8B030D-6E8A-4147-A177-3AD203B41FA5}">
+                      <a16:colId xmlns:a16="http://schemas.microsoft.com/office/drawing/2014/main" val="1231640149"/>
+                    </a:ext>
+                  </a:extLst>
+                </a:gridCol>
+                <a:gridCol w="812800">
+                  <a:extLst>
+                    <a:ext uri="{9D8B030D-6E8A-4147-A177-3AD203B41FA5}">
+                      <a16:colId xmlns:a16="http://schemas.microsoft.com/office/drawing/2014/main" val="2499746039"/>
+                    </a:ext>
+                  </a:extLst>
+                </a:gridCol>
+                <a:gridCol w="812800">
+                  <a:extLst>
+                    <a:ext uri="{9D8B030D-6E8A-4147-A177-3AD203B41FA5}">
+                      <a16:colId xmlns:a16="http://schemas.microsoft.com/office/drawing/2014/main" val="1680736024"/>
+                    </a:ext>
+                  </a:extLst>
+                </a:gridCol>
+                <a:gridCol w="812800">
+                  <a:extLst>
+                    <a:ext uri="{9D8B030D-6E8A-4147-A177-3AD203B41FA5}">
+                      <a16:colId xmlns:a16="http://schemas.microsoft.com/office/drawing/2014/main" val="3329176257"/>
+                    </a:ext>
+                  </a:extLst>
+                </a:gridCol>
+              </a:tblGrid>
+              <a:tr h="370840">
+                <a:tc>
+                  <a:txBody>
+                    <a:bodyPr/>
+                    <a:lstStyle/>
+                    <a:p>
+                      <a:r>
+                        <a:rPr lang="en-US" dirty="0"/>
+                        <a:t>1</a:t>
+                      </a:r>
+                    </a:p>
+                  </a:txBody>
+                  <a:tcPr/>
+                </a:tc>
+                <a:tc>
+                  <a:txBody>
+                    <a:bodyPr/>
+                    <a:lstStyle/>
+                    <a:p>
+                      <a:r>
+                        <a:rPr lang="en-US" dirty="0"/>
+                        <a:t>2</a:t>
+                      </a:r>
+                    </a:p>
+                  </a:txBody>
+                  <a:tcPr/>
+                </a:tc>
+                <a:tc>
+                  <a:txBody>
+                    <a:bodyPr/>
+                    <a:lstStyle/>
+                    <a:p>
+                      <a:r>
+                        <a:rPr lang="en-US" dirty="0"/>
+                        <a:t>6</a:t>
+                      </a:r>
+                    </a:p>
+                  </a:txBody>
+                  <a:tcPr/>
+                </a:tc>
+                <a:tc>
+                  <a:txBody>
+                    <a:bodyPr/>
+                    <a:lstStyle/>
+                    <a:p>
+                      <a:r>
+                        <a:rPr lang="en-US" dirty="0"/>
+                        <a:t>4</a:t>
+                      </a:r>
+                    </a:p>
+                  </a:txBody>
+                  <a:tcPr/>
+                </a:tc>
+                <a:tc>
+                  <a:txBody>
+                    <a:bodyPr/>
+                    <a:lstStyle/>
+                    <a:p>
+                      <a:r>
+                        <a:rPr lang="en-US" dirty="0"/>
+                        <a:t>3</a:t>
+                      </a:r>
+                    </a:p>
+                  </a:txBody>
+                  <a:tcPr/>
+                </a:tc>
+                <a:tc>
+                  <a:txBody>
+                    <a:bodyPr/>
+                    <a:lstStyle/>
+                    <a:p>
+                      <a:r>
+                        <a:rPr lang="en-US" dirty="0"/>
+                        <a:t>5</a:t>
+                      </a:r>
+                    </a:p>
+                  </a:txBody>
+                  <a:tcPr/>
+                </a:tc>
+                <a:tc>
+                  <a:txBody>
+                    <a:bodyPr/>
+                    <a:lstStyle/>
+                    <a:p>
+                      <a:r>
+                        <a:rPr lang="en-US" dirty="0"/>
+                        <a:t>9</a:t>
+                      </a:r>
+                    </a:p>
+                  </a:txBody>
+                  <a:tcPr/>
+                </a:tc>
+                <a:tc>
+                  <a:txBody>
+                    <a:bodyPr/>
+                    <a:lstStyle/>
+                    <a:p>
+                      <a:r>
+                        <a:rPr lang="en-US" dirty="0"/>
+                        <a:t>8</a:t>
+                      </a:r>
+                    </a:p>
+                  </a:txBody>
+                  <a:tcPr/>
+                </a:tc>
+                <a:tc>
+                  <a:txBody>
+                    <a:bodyPr/>
+                    <a:lstStyle/>
+                    <a:p>
+                      <a:r>
+                        <a:rPr lang="en-US" dirty="0"/>
+                        <a:t>7</a:t>
+                      </a:r>
+                    </a:p>
+                  </a:txBody>
+                  <a:tcPr/>
+                </a:tc>
+                <a:tc>
+                  <a:txBody>
+                    <a:bodyPr/>
+                    <a:lstStyle/>
+                    <a:p>
+                      <a:r>
+                        <a:rPr lang="en-US" dirty="0"/>
+                        <a:t>10</a:t>
+                      </a:r>
+                    </a:p>
+                  </a:txBody>
+                  <a:tcPr/>
+                </a:tc>
+                <a:extLst>
+                  <a:ext uri="{0D108BD9-81ED-4DB2-BD59-A6C34878D82A}">
+                    <a16:rowId xmlns:a16="http://schemas.microsoft.com/office/drawing/2014/main" val="1251546311"/>
+                  </a:ext>
+                </a:extLst>
+              </a:tr>
+            </a:tbl>
+          </a:graphicData>
+        </a:graphic>
+      </p:graphicFrame>
+      <p:graphicFrame>
+        <p:nvGraphicFramePr>
+          <p:cNvPr id="5" name="Table 4">
+            <a:extLst>
+              <a:ext uri="{FF2B5EF4-FFF2-40B4-BE49-F238E27FC236}">
+                <a16:creationId xmlns:a16="http://schemas.microsoft.com/office/drawing/2014/main" id="{1E56E44B-F5FF-A41B-4946-EFCDFDA61350}"/>
+              </a:ext>
+            </a:extLst>
+          </p:cNvPr>
+          <p:cNvGraphicFramePr>
+            <a:graphicFrameLocks noGrp="1"/>
+          </p:cNvGraphicFramePr>
+          <p:nvPr>
+            <p:extLst>
+              <p:ext uri="{D42A27DB-BD31-4B8C-83A1-F6EECF244321}">
+                <p14:modId xmlns:p14="http://schemas.microsoft.com/office/powerpoint/2010/main" val="423866632"/>
+              </p:ext>
+            </p:extLst>
+          </p:nvPr>
+        </p:nvGraphicFramePr>
+        <p:xfrm>
+          <a:off x="918819" y="4874515"/>
+          <a:ext cx="8127997" cy="370840"/>
+        </p:xfrm>
+        <a:graphic>
+          <a:graphicData uri="http://schemas.openxmlformats.org/drawingml/2006/table">
+            <a:tbl>
+              <a:tblPr firstRow="1" bandRow="1">
+                <a:tableStyleId>{5C22544A-7EE6-4342-B048-85BDC9FD1C3A}</a:tableStyleId>
+              </a:tblPr>
+              <a:tblGrid>
+                <a:gridCol w="1583346">
+                  <a:extLst>
+                    <a:ext uri="{9D8B030D-6E8A-4147-A177-3AD203B41FA5}">
+                      <a16:colId xmlns:a16="http://schemas.microsoft.com/office/drawing/2014/main" val="3851505609"/>
+                    </a:ext>
+                  </a:extLst>
+                </a:gridCol>
+                <a:gridCol w="1861113">
+                  <a:extLst>
+                    <a:ext uri="{9D8B030D-6E8A-4147-A177-3AD203B41FA5}">
+                      <a16:colId xmlns:a16="http://schemas.microsoft.com/office/drawing/2014/main" val="204091885"/>
+                    </a:ext>
+                  </a:extLst>
+                </a:gridCol>
+                <a:gridCol w="1689652">
+                  <a:extLst>
+                    <a:ext uri="{9D8B030D-6E8A-4147-A177-3AD203B41FA5}">
+                      <a16:colId xmlns:a16="http://schemas.microsoft.com/office/drawing/2014/main" val="1281568391"/>
+                    </a:ext>
+                  </a:extLst>
+                </a:gridCol>
+                <a:gridCol w="1769166">
+                  <a:extLst>
+                    <a:ext uri="{9D8B030D-6E8A-4147-A177-3AD203B41FA5}">
+                      <a16:colId xmlns:a16="http://schemas.microsoft.com/office/drawing/2014/main" val="907102928"/>
+                    </a:ext>
+                  </a:extLst>
+                </a:gridCol>
+                <a:gridCol w="1224720">
+                  <a:extLst>
+                    <a:ext uri="{9D8B030D-6E8A-4147-A177-3AD203B41FA5}">
+                      <a16:colId xmlns:a16="http://schemas.microsoft.com/office/drawing/2014/main" val="2705865604"/>
+                    </a:ext>
+                  </a:extLst>
+                </a:gridCol>
+              </a:tblGrid>
+              <a:tr h="370840">
+                <a:tc>
+                  <a:txBody>
+                    <a:bodyPr/>
+                    <a:lstStyle/>
+                    <a:p>
+                      <a:r>
+                        <a:rPr lang="en-US" dirty="0"/>
+                        <a:t>2</a:t>
+                      </a:r>
+                    </a:p>
+                  </a:txBody>
+                  <a:tcPr/>
+                </a:tc>
+                <a:tc>
+                  <a:txBody>
+                    <a:bodyPr/>
+                    <a:lstStyle/>
+                    <a:p>
+                      <a:r>
+                        <a:rPr lang="en-US" dirty="0"/>
+                        <a:t>6</a:t>
+                      </a:r>
+                    </a:p>
+                  </a:txBody>
+                  <a:tcPr/>
+                </a:tc>
+                <a:tc>
+                  <a:txBody>
+                    <a:bodyPr/>
+                    <a:lstStyle/>
+                    <a:p>
+                      <a:r>
+                        <a:rPr lang="en-US" dirty="0"/>
+                        <a:t>5</a:t>
+                      </a:r>
+                    </a:p>
+                  </a:txBody>
+                  <a:tcPr/>
+                </a:tc>
+                <a:tc>
+                  <a:txBody>
+                    <a:bodyPr/>
+                    <a:lstStyle/>
+                    <a:p>
+                      <a:r>
+                        <a:rPr lang="en-US" dirty="0"/>
+                        <a:t>9</a:t>
+                      </a:r>
+                    </a:p>
+                  </a:txBody>
+                  <a:tcPr/>
+                </a:tc>
+                <a:tc>
+                  <a:txBody>
+                    <a:bodyPr/>
+                    <a:lstStyle/>
+                    <a:p>
+                      <a:r>
+                        <a:rPr lang="en-US" dirty="0"/>
+                        <a:t>10</a:t>
+                      </a:r>
+                    </a:p>
+                  </a:txBody>
+                  <a:tcPr>
+                    <a:lnR w="12700" cmpd="sng">
+                      <a:noFill/>
+                    </a:lnR>
+                  </a:tcPr>
+                </a:tc>
+                <a:extLst>
+                  <a:ext uri="{0D108BD9-81ED-4DB2-BD59-A6C34878D82A}">
+                    <a16:rowId xmlns:a16="http://schemas.microsoft.com/office/drawing/2014/main" val="181709392"/>
+                  </a:ext>
+                </a:extLst>
+              </a:tr>
+            </a:tbl>
+          </a:graphicData>
+        </a:graphic>
+      </p:graphicFrame>
+      <p:graphicFrame>
+        <p:nvGraphicFramePr>
+          <p:cNvPr id="6" name="Table 5">
+            <a:extLst>
+              <a:ext uri="{FF2B5EF4-FFF2-40B4-BE49-F238E27FC236}">
+                <a16:creationId xmlns:a16="http://schemas.microsoft.com/office/drawing/2014/main" id="{B9E73E46-DF7D-4231-F24D-ACE768D6B67A}"/>
+              </a:ext>
+            </a:extLst>
+          </p:cNvPr>
+          <p:cNvGraphicFramePr>
+            <a:graphicFrameLocks noGrp="1"/>
+          </p:cNvGraphicFramePr>
+          <p:nvPr>
+            <p:extLst>
+              <p:ext uri="{D42A27DB-BD31-4B8C-83A1-F6EECF244321}">
+                <p14:modId xmlns:p14="http://schemas.microsoft.com/office/powerpoint/2010/main" val="1858539368"/>
+              </p:ext>
+            </p:extLst>
+          </p:nvPr>
+        </p:nvGraphicFramePr>
+        <p:xfrm>
+          <a:off x="918820" y="4093895"/>
+          <a:ext cx="1625598" cy="370840"/>
+        </p:xfrm>
+        <a:graphic>
+          <a:graphicData uri="http://schemas.openxmlformats.org/drawingml/2006/table">
+            <a:tbl>
+              <a:tblPr firstRow="1" bandRow="1">
+                <a:tableStyleId>{5C22544A-7EE6-4342-B048-85BDC9FD1C3A}</a:tableStyleId>
+              </a:tblPr>
+              <a:tblGrid>
+                <a:gridCol w="812799">
+                  <a:extLst>
+                    <a:ext uri="{9D8B030D-6E8A-4147-A177-3AD203B41FA5}">
+                      <a16:colId xmlns:a16="http://schemas.microsoft.com/office/drawing/2014/main" val="2347441255"/>
+                    </a:ext>
+                  </a:extLst>
+                </a:gridCol>
+                <a:gridCol w="812799">
+                  <a:extLst>
+                    <a:ext uri="{9D8B030D-6E8A-4147-A177-3AD203B41FA5}">
+                      <a16:colId xmlns:a16="http://schemas.microsoft.com/office/drawing/2014/main" val="4213661148"/>
+                    </a:ext>
+                  </a:extLst>
+                </a:gridCol>
+              </a:tblGrid>
+              <a:tr h="370840">
+                <a:tc>
+                  <a:txBody>
+                    <a:bodyPr/>
+                    <a:lstStyle/>
+                    <a:p>
+                      <a:r>
+                        <a:rPr lang="en-US" dirty="0"/>
+                        <a:t>1</a:t>
+                      </a:r>
+                    </a:p>
+                  </a:txBody>
+                  <a:tcPr/>
+                </a:tc>
+                <a:tc>
+                  <a:txBody>
+                    <a:bodyPr/>
+                    <a:lstStyle/>
+                    <a:p>
+                      <a:r>
+                        <a:rPr lang="en-US" dirty="0"/>
+                        <a:t>2</a:t>
+                      </a:r>
+                    </a:p>
+                  </a:txBody>
+                  <a:tcPr/>
+                </a:tc>
+                <a:extLst>
+                  <a:ext uri="{0D108BD9-81ED-4DB2-BD59-A6C34878D82A}">
+                    <a16:rowId xmlns:a16="http://schemas.microsoft.com/office/drawing/2014/main" val="3278668397"/>
+                  </a:ext>
+                </a:extLst>
+              </a:tr>
+            </a:tbl>
+          </a:graphicData>
+        </a:graphic>
+      </p:graphicFrame>
+      <p:graphicFrame>
+        <p:nvGraphicFramePr>
+          <p:cNvPr id="7" name="Table 6">
+            <a:extLst>
+              <a:ext uri="{FF2B5EF4-FFF2-40B4-BE49-F238E27FC236}">
+                <a16:creationId xmlns:a16="http://schemas.microsoft.com/office/drawing/2014/main" id="{28AE373B-DBAC-0506-1148-CD8E99DDE3C0}"/>
+              </a:ext>
+            </a:extLst>
+          </p:cNvPr>
+          <p:cNvGraphicFramePr>
+            <a:graphicFrameLocks noGrp="1"/>
+          </p:cNvGraphicFramePr>
+          <p:nvPr>
+            <p:extLst>
+              <p:ext uri="{D42A27DB-BD31-4B8C-83A1-F6EECF244321}">
+                <p14:modId xmlns:p14="http://schemas.microsoft.com/office/powerpoint/2010/main" val="956191741"/>
+              </p:ext>
+            </p:extLst>
+          </p:nvPr>
+        </p:nvGraphicFramePr>
+        <p:xfrm>
+          <a:off x="2625038" y="4108915"/>
+          <a:ext cx="1625598" cy="370840"/>
+        </p:xfrm>
+        <a:graphic>
+          <a:graphicData uri="http://schemas.openxmlformats.org/drawingml/2006/table">
+            <a:tbl>
+              <a:tblPr firstRow="1" bandRow="1">
+                <a:tableStyleId>{5C22544A-7EE6-4342-B048-85BDC9FD1C3A}</a:tableStyleId>
+              </a:tblPr>
+              <a:tblGrid>
+                <a:gridCol w="812799">
+                  <a:extLst>
+                    <a:ext uri="{9D8B030D-6E8A-4147-A177-3AD203B41FA5}">
+                      <a16:colId xmlns:a16="http://schemas.microsoft.com/office/drawing/2014/main" val="2347441255"/>
+                    </a:ext>
+                  </a:extLst>
+                </a:gridCol>
+                <a:gridCol w="812799">
+                  <a:extLst>
+                    <a:ext uri="{9D8B030D-6E8A-4147-A177-3AD203B41FA5}">
+                      <a16:colId xmlns:a16="http://schemas.microsoft.com/office/drawing/2014/main" val="4213661148"/>
+                    </a:ext>
+                  </a:extLst>
+                </a:gridCol>
+              </a:tblGrid>
+              <a:tr h="370840">
+                <a:tc>
+                  <a:txBody>
+                    <a:bodyPr/>
+                    <a:lstStyle/>
+                    <a:p>
+                      <a:r>
+                        <a:rPr lang="en-US" dirty="0"/>
+                        <a:t>6</a:t>
+                      </a:r>
+                    </a:p>
+                  </a:txBody>
+                  <a:tcPr/>
+                </a:tc>
+                <a:tc>
+                  <a:txBody>
+                    <a:bodyPr/>
+                    <a:lstStyle/>
+                    <a:p>
+                      <a:r>
+                        <a:rPr lang="en-US" dirty="0"/>
+                        <a:t>4</a:t>
+                      </a:r>
+                    </a:p>
+                  </a:txBody>
+                  <a:tcPr/>
+                </a:tc>
+                <a:extLst>
+                  <a:ext uri="{0D108BD9-81ED-4DB2-BD59-A6C34878D82A}">
+                    <a16:rowId xmlns:a16="http://schemas.microsoft.com/office/drawing/2014/main" val="3278668397"/>
+                  </a:ext>
+                </a:extLst>
+              </a:tr>
+            </a:tbl>
+          </a:graphicData>
+        </a:graphic>
+      </p:graphicFrame>
+      <p:graphicFrame>
+        <p:nvGraphicFramePr>
+          <p:cNvPr id="10" name="Table 9">
+            <a:extLst>
+              <a:ext uri="{FF2B5EF4-FFF2-40B4-BE49-F238E27FC236}">
+                <a16:creationId xmlns:a16="http://schemas.microsoft.com/office/drawing/2014/main" id="{7DC387F4-0C8B-8633-1912-EB867907F9C2}"/>
+              </a:ext>
+            </a:extLst>
+          </p:cNvPr>
+          <p:cNvGraphicFramePr>
+            <a:graphicFrameLocks noGrp="1"/>
+          </p:cNvGraphicFramePr>
+          <p:nvPr>
+            <p:extLst>
+              <p:ext uri="{D42A27DB-BD31-4B8C-83A1-F6EECF244321}">
+                <p14:modId xmlns:p14="http://schemas.microsoft.com/office/powerpoint/2010/main" val="2844183580"/>
+              </p:ext>
+            </p:extLst>
+          </p:nvPr>
+        </p:nvGraphicFramePr>
+        <p:xfrm>
+          <a:off x="4331256" y="4093895"/>
+          <a:ext cx="1625598" cy="370840"/>
+        </p:xfrm>
+        <a:graphic>
+          <a:graphicData uri="http://schemas.openxmlformats.org/drawingml/2006/table">
+            <a:tbl>
+              <a:tblPr firstRow="1" bandRow="1">
+                <a:tableStyleId>{5C22544A-7EE6-4342-B048-85BDC9FD1C3A}</a:tableStyleId>
+              </a:tblPr>
+              <a:tblGrid>
+                <a:gridCol w="812799">
+                  <a:extLst>
+                    <a:ext uri="{9D8B030D-6E8A-4147-A177-3AD203B41FA5}">
+                      <a16:colId xmlns:a16="http://schemas.microsoft.com/office/drawing/2014/main" val="2347441255"/>
+                    </a:ext>
+                  </a:extLst>
+                </a:gridCol>
+                <a:gridCol w="812799">
+                  <a:extLst>
+                    <a:ext uri="{9D8B030D-6E8A-4147-A177-3AD203B41FA5}">
+                      <a16:colId xmlns:a16="http://schemas.microsoft.com/office/drawing/2014/main" val="4213661148"/>
+                    </a:ext>
+                  </a:extLst>
+                </a:gridCol>
+              </a:tblGrid>
+              <a:tr h="370840">
+                <a:tc>
+                  <a:txBody>
+                    <a:bodyPr/>
+                    <a:lstStyle/>
+                    <a:p>
+                      <a:r>
+                        <a:rPr lang="en-US" dirty="0"/>
+                        <a:t>3</a:t>
+                      </a:r>
+                    </a:p>
+                  </a:txBody>
+                  <a:tcPr/>
+                </a:tc>
+                <a:tc>
+                  <a:txBody>
+                    <a:bodyPr/>
+                    <a:lstStyle/>
+                    <a:p>
+                      <a:r>
+                        <a:rPr lang="en-US" dirty="0"/>
+                        <a:t>5</a:t>
+                      </a:r>
+                    </a:p>
+                  </a:txBody>
+                  <a:tcPr/>
+                </a:tc>
+                <a:extLst>
+                  <a:ext uri="{0D108BD9-81ED-4DB2-BD59-A6C34878D82A}">
+                    <a16:rowId xmlns:a16="http://schemas.microsoft.com/office/drawing/2014/main" val="3278668397"/>
+                  </a:ext>
+                </a:extLst>
+              </a:tr>
+            </a:tbl>
+          </a:graphicData>
+        </a:graphic>
+      </p:graphicFrame>
+      <p:graphicFrame>
+        <p:nvGraphicFramePr>
+          <p:cNvPr id="11" name="Table 10">
+            <a:extLst>
+              <a:ext uri="{FF2B5EF4-FFF2-40B4-BE49-F238E27FC236}">
+                <a16:creationId xmlns:a16="http://schemas.microsoft.com/office/drawing/2014/main" id="{6640AA2E-55D2-7224-595B-1BC8E1EC7838}"/>
+              </a:ext>
+            </a:extLst>
+          </p:cNvPr>
+          <p:cNvGraphicFramePr>
+            <a:graphicFrameLocks noGrp="1"/>
+          </p:cNvGraphicFramePr>
+          <p:nvPr>
+            <p:extLst>
+              <p:ext uri="{D42A27DB-BD31-4B8C-83A1-F6EECF244321}">
+                <p14:modId xmlns:p14="http://schemas.microsoft.com/office/powerpoint/2010/main" val="1290808966"/>
+              </p:ext>
+            </p:extLst>
+          </p:nvPr>
+        </p:nvGraphicFramePr>
+        <p:xfrm>
+          <a:off x="6037474" y="4104465"/>
+          <a:ext cx="1625598" cy="370840"/>
+        </p:xfrm>
+        <a:graphic>
+          <a:graphicData uri="http://schemas.openxmlformats.org/drawingml/2006/table">
+            <a:tbl>
+              <a:tblPr firstRow="1" bandRow="1">
+                <a:tableStyleId>{5C22544A-7EE6-4342-B048-85BDC9FD1C3A}</a:tableStyleId>
+              </a:tblPr>
+              <a:tblGrid>
+                <a:gridCol w="812799">
+                  <a:extLst>
+                    <a:ext uri="{9D8B030D-6E8A-4147-A177-3AD203B41FA5}">
+                      <a16:colId xmlns:a16="http://schemas.microsoft.com/office/drawing/2014/main" val="2347441255"/>
+                    </a:ext>
+                  </a:extLst>
+                </a:gridCol>
+                <a:gridCol w="812799">
+                  <a:extLst>
+                    <a:ext uri="{9D8B030D-6E8A-4147-A177-3AD203B41FA5}">
+                      <a16:colId xmlns:a16="http://schemas.microsoft.com/office/drawing/2014/main" val="4213661148"/>
+                    </a:ext>
+                  </a:extLst>
+                </a:gridCol>
+              </a:tblGrid>
+              <a:tr h="370840">
+                <a:tc>
+                  <a:txBody>
+                    <a:bodyPr/>
+                    <a:lstStyle/>
+                    <a:p>
+                      <a:r>
+                        <a:rPr lang="en-US" dirty="0"/>
+                        <a:t>9</a:t>
+                      </a:r>
+                    </a:p>
+                  </a:txBody>
+                  <a:tcPr/>
+                </a:tc>
+                <a:tc>
+                  <a:txBody>
+                    <a:bodyPr/>
+                    <a:lstStyle/>
+                    <a:p>
+                      <a:r>
+                        <a:rPr lang="en-US" dirty="0"/>
+                        <a:t>8</a:t>
+                      </a:r>
+                    </a:p>
+                  </a:txBody>
+                  <a:tcPr/>
+                </a:tc>
+                <a:extLst>
+                  <a:ext uri="{0D108BD9-81ED-4DB2-BD59-A6C34878D82A}">
+                    <a16:rowId xmlns:a16="http://schemas.microsoft.com/office/drawing/2014/main" val="3278668397"/>
+                  </a:ext>
+                </a:extLst>
+              </a:tr>
+            </a:tbl>
+          </a:graphicData>
+        </a:graphic>
+      </p:graphicFrame>
+      <p:graphicFrame>
+        <p:nvGraphicFramePr>
+          <p:cNvPr id="12" name="Table 11">
+            <a:extLst>
+              <a:ext uri="{FF2B5EF4-FFF2-40B4-BE49-F238E27FC236}">
+                <a16:creationId xmlns:a16="http://schemas.microsoft.com/office/drawing/2014/main" id="{B02F2E97-55FE-DBAC-1F6B-1171E7C4D8B9}"/>
+              </a:ext>
+            </a:extLst>
+          </p:cNvPr>
+          <p:cNvGraphicFramePr>
+            <a:graphicFrameLocks noGrp="1"/>
+          </p:cNvGraphicFramePr>
+          <p:nvPr>
+            <p:extLst>
+              <p:ext uri="{D42A27DB-BD31-4B8C-83A1-F6EECF244321}">
+                <p14:modId xmlns:p14="http://schemas.microsoft.com/office/powerpoint/2010/main" val="1804333282"/>
+              </p:ext>
+            </p:extLst>
+          </p:nvPr>
+        </p:nvGraphicFramePr>
+        <p:xfrm>
+          <a:off x="7743692" y="4093895"/>
+          <a:ext cx="1625598" cy="370840"/>
+        </p:xfrm>
+        <a:graphic>
+          <a:graphicData uri="http://schemas.openxmlformats.org/drawingml/2006/table">
+            <a:tbl>
+              <a:tblPr firstRow="1" bandRow="1">
+                <a:tableStyleId>{5C22544A-7EE6-4342-B048-85BDC9FD1C3A}</a:tableStyleId>
+              </a:tblPr>
+              <a:tblGrid>
+                <a:gridCol w="812799">
+                  <a:extLst>
+                    <a:ext uri="{9D8B030D-6E8A-4147-A177-3AD203B41FA5}">
+                      <a16:colId xmlns:a16="http://schemas.microsoft.com/office/drawing/2014/main" val="2347441255"/>
+                    </a:ext>
+                  </a:extLst>
+                </a:gridCol>
+                <a:gridCol w="812799">
+                  <a:extLst>
+                    <a:ext uri="{9D8B030D-6E8A-4147-A177-3AD203B41FA5}">
+                      <a16:colId xmlns:a16="http://schemas.microsoft.com/office/drawing/2014/main" val="4213661148"/>
+                    </a:ext>
+                  </a:extLst>
+                </a:gridCol>
+              </a:tblGrid>
+              <a:tr h="370840">
+                <a:tc>
+                  <a:txBody>
+                    <a:bodyPr/>
+                    <a:lstStyle/>
+                    <a:p>
+                      <a:r>
+                        <a:rPr lang="en-US" dirty="0"/>
+                        <a:t>7</a:t>
+                      </a:r>
+                    </a:p>
+                  </a:txBody>
+                  <a:tcPr/>
+                </a:tc>
+                <a:tc>
+                  <a:txBody>
+                    <a:bodyPr/>
+                    <a:lstStyle/>
+                    <a:p>
+                      <a:r>
+                        <a:rPr lang="en-US" dirty="0"/>
+                        <a:t>10</a:t>
+                      </a:r>
+                    </a:p>
+                  </a:txBody>
+                  <a:tcPr/>
+                </a:tc>
+                <a:extLst>
+                  <a:ext uri="{0D108BD9-81ED-4DB2-BD59-A6C34878D82A}">
+                    <a16:rowId xmlns:a16="http://schemas.microsoft.com/office/drawing/2014/main" val="3278668397"/>
+                  </a:ext>
+                </a:extLst>
+              </a:tr>
+            </a:tbl>
+          </a:graphicData>
+        </a:graphic>
+      </p:graphicFrame>
+    </p:spTree>
+    <p:extLst>
+      <p:ext uri="{BB962C8B-B14F-4D97-AF65-F5344CB8AC3E}">
+        <p14:creationId xmlns:p14="http://schemas.microsoft.com/office/powerpoint/2010/main" val="4234779486"/>
+      </p:ext>
+    </p:extLst>
+  </p:cSld>
+  <p:clrMapOvr>
+    <a:masterClrMapping/>
+  </p:clrMapOvr>
+</p:sld>
+</file>
+
+<file path=ppt/slides/slide31.xml><?xml version="1.0" encoding="utf-8"?>
+<p:sld xmlns:a="http://schemas.openxmlformats.org/drawingml/2006/main" xmlns:r="http://schemas.openxmlformats.org/officeDocument/2006/relationships" xmlns:p="http://schemas.openxmlformats.org/presentationml/2006/main">
+  <p:cSld>
+    <p:spTree>
+      <p:nvGrpSpPr>
+        <p:cNvPr id="1" name=""/>
+        <p:cNvGrpSpPr/>
+        <p:nvPr/>
+      </p:nvGrpSpPr>
+      <p:grpSpPr>
+        <a:xfrm>
+          <a:off x="0" y="0"/>
+          <a:ext cx="0" cy="0"/>
+          <a:chOff x="0" y="0"/>
+          <a:chExt cx="0" cy="0"/>
+        </a:xfrm>
+      </p:grpSpPr>
+      <p:sp>
+        <p:nvSpPr>
+          <p:cNvPr id="2" name="Title 1">
+            <a:extLst>
+              <a:ext uri="{FF2B5EF4-FFF2-40B4-BE49-F238E27FC236}">
+                <a16:creationId xmlns:a16="http://schemas.microsoft.com/office/drawing/2014/main" id="{35336B72-1007-2647-5EA1-59EFB8867879}"/>
+              </a:ext>
+            </a:extLst>
+          </p:cNvPr>
+          <p:cNvSpPr>
+            <a:spLocks noGrp="1"/>
+          </p:cNvSpPr>
+          <p:nvPr>
+            <p:ph type="title"/>
+          </p:nvPr>
+        </p:nvSpPr>
+        <p:spPr>
+          <a:xfrm>
+            <a:off x="838198" y="135181"/>
+            <a:ext cx="10515600" cy="1325563"/>
+          </a:xfrm>
+        </p:spPr>
+        <p:txBody>
+          <a:bodyPr/>
+          <a:lstStyle/>
+          <a:p>
+            <a:r>
+              <a:rPr lang="en-US" dirty="0"/>
+              <a:t>What our network looks like?</a:t>
+            </a:r>
+          </a:p>
+        </p:txBody>
+      </p:sp>
+      <p:graphicFrame>
+        <p:nvGraphicFramePr>
+          <p:cNvPr id="4" name="Content Placeholder 3">
+            <a:extLst>
+              <a:ext uri="{FF2B5EF4-FFF2-40B4-BE49-F238E27FC236}">
+                <a16:creationId xmlns:a16="http://schemas.microsoft.com/office/drawing/2014/main" id="{FF5C18A2-9EDB-463D-2BD0-4A4928C934B6}"/>
+              </a:ext>
+            </a:extLst>
+          </p:cNvPr>
+          <p:cNvGraphicFramePr>
+            <a:graphicFrameLocks noGrp="1"/>
+          </p:cNvGraphicFramePr>
+          <p:nvPr>
+            <p:ph idx="1"/>
+            <p:extLst>
+              <p:ext uri="{D42A27DB-BD31-4B8C-83A1-F6EECF244321}">
+                <p14:modId xmlns:p14="http://schemas.microsoft.com/office/powerpoint/2010/main" val="4084454575"/>
+              </p:ext>
+            </p:extLst>
+          </p:nvPr>
+        </p:nvGraphicFramePr>
+        <p:xfrm>
+          <a:off x="838200" y="1396564"/>
+          <a:ext cx="10515600" cy="370840"/>
+        </p:xfrm>
+        <a:graphic>
+          <a:graphicData uri="http://schemas.openxmlformats.org/drawingml/2006/table">
+            <a:tbl>
+              <a:tblPr firstRow="1" bandRow="1">
+                <a:tableStyleId>{5C22544A-7EE6-4342-B048-85BDC9FD1C3A}</a:tableStyleId>
+              </a:tblPr>
+              <a:tblGrid>
+                <a:gridCol w="10515600">
+                  <a:extLst>
+                    <a:ext uri="{9D8B030D-6E8A-4147-A177-3AD203B41FA5}">
+                      <a16:colId xmlns:a16="http://schemas.microsoft.com/office/drawing/2014/main" val="3974089026"/>
+                    </a:ext>
+                  </a:extLst>
+                </a:gridCol>
+              </a:tblGrid>
+              <a:tr h="370840">
+                <a:tc>
+                  <a:txBody>
+                    <a:bodyPr/>
+                    <a:lstStyle/>
+                    <a:p>
+                      <a:pPr algn="ctr"/>
+                      <a:r>
+                        <a:rPr lang="en-US" dirty="0"/>
+                        <a:t>Max Pool Layer</a:t>
+                      </a:r>
+                    </a:p>
+                  </a:txBody>
+                  <a:tcPr/>
+                </a:tc>
+                <a:extLst>
+                  <a:ext uri="{0D108BD9-81ED-4DB2-BD59-A6C34878D82A}">
+                    <a16:rowId xmlns:a16="http://schemas.microsoft.com/office/drawing/2014/main" val="1794039430"/>
+                  </a:ext>
+                </a:extLst>
+              </a:tr>
+            </a:tbl>
+          </a:graphicData>
+        </a:graphic>
+      </p:graphicFrame>
+      <p:graphicFrame>
+        <p:nvGraphicFramePr>
+          <p:cNvPr id="5" name="Table 4">
+            <a:extLst>
+              <a:ext uri="{FF2B5EF4-FFF2-40B4-BE49-F238E27FC236}">
+                <a16:creationId xmlns:a16="http://schemas.microsoft.com/office/drawing/2014/main" id="{6308576E-813A-6EE2-B7BD-1D8BAF993170}"/>
+              </a:ext>
+            </a:extLst>
+          </p:cNvPr>
+          <p:cNvGraphicFramePr>
+            <a:graphicFrameLocks noGrp="1"/>
+          </p:cNvGraphicFramePr>
+          <p:nvPr>
+            <p:extLst>
+              <p:ext uri="{D42A27DB-BD31-4B8C-83A1-F6EECF244321}">
+                <p14:modId xmlns:p14="http://schemas.microsoft.com/office/powerpoint/2010/main" val="404614475"/>
+              </p:ext>
+            </p:extLst>
+          </p:nvPr>
+        </p:nvGraphicFramePr>
+        <p:xfrm>
+          <a:off x="838199" y="3204537"/>
+          <a:ext cx="10515599" cy="370840"/>
+        </p:xfrm>
+        <a:graphic>
+          <a:graphicData uri="http://schemas.openxmlformats.org/drawingml/2006/table">
+            <a:tbl>
+              <a:tblPr firstRow="1" bandRow="1">
+                <a:tableStyleId>{5C22544A-7EE6-4342-B048-85BDC9FD1C3A}</a:tableStyleId>
+              </a:tblPr>
+              <a:tblGrid>
+                <a:gridCol w="10515599">
+                  <a:extLst>
+                    <a:ext uri="{9D8B030D-6E8A-4147-A177-3AD203B41FA5}">
+                      <a16:colId xmlns:a16="http://schemas.microsoft.com/office/drawing/2014/main" val="3127348772"/>
+                    </a:ext>
+                  </a:extLst>
+                </a:gridCol>
+              </a:tblGrid>
+              <a:tr h="370840">
+                <a:tc>
+                  <a:txBody>
+                    <a:bodyPr/>
+                    <a:lstStyle/>
+                    <a:p>
+                      <a:pPr algn="ctr"/>
+                      <a:r>
+                        <a:rPr lang="en-US" dirty="0"/>
+                        <a:t>Connected Layer (Learning happens here) Output size = output of max layer/2</a:t>
+                      </a:r>
+                    </a:p>
+                  </a:txBody>
+                  <a:tcPr/>
+                </a:tc>
+                <a:extLst>
+                  <a:ext uri="{0D108BD9-81ED-4DB2-BD59-A6C34878D82A}">
+                    <a16:rowId xmlns:a16="http://schemas.microsoft.com/office/drawing/2014/main" val="1149183532"/>
+                  </a:ext>
+                </a:extLst>
+              </a:tr>
+            </a:tbl>
+          </a:graphicData>
+        </a:graphic>
+      </p:graphicFrame>
+      <p:sp>
+        <p:nvSpPr>
+          <p:cNvPr id="6" name="Arrow: Up-Down 5">
+            <a:extLst>
+              <a:ext uri="{FF2B5EF4-FFF2-40B4-BE49-F238E27FC236}">
+                <a16:creationId xmlns:a16="http://schemas.microsoft.com/office/drawing/2014/main" id="{69AD258E-EE84-F052-8BE7-AF10F6BC91EE}"/>
+              </a:ext>
+            </a:extLst>
+          </p:cNvPr>
+          <p:cNvSpPr/>
+          <p:nvPr/>
+        </p:nvSpPr>
+        <p:spPr>
+          <a:xfrm>
+            <a:off x="5596070" y="1753499"/>
+            <a:ext cx="591085" cy="1451039"/>
+          </a:xfrm>
+          <a:prstGeom prst="upDownArrow">
+            <a:avLst/>
+          </a:prstGeom>
+        </p:spPr>
+        <p:style>
+          <a:lnRef idx="2">
+            <a:schemeClr val="accent1">
+              <a:shade val="15000"/>
+            </a:schemeClr>
+          </a:lnRef>
+          <a:fillRef idx="1">
+            <a:schemeClr val="accent1"/>
+          </a:fillRef>
+          <a:effectRef idx="0">
+            <a:schemeClr val="accent1"/>
+          </a:effectRef>
+          <a:fontRef idx="minor">
+            <a:schemeClr val="lt1"/>
+          </a:fontRef>
+        </p:style>
+        <p:txBody>
+          <a:bodyPr rtlCol="0" anchor="ctr"/>
+          <a:lstStyle/>
+          <a:p>
+            <a:pPr algn="ctr"/>
+            <a:endParaRPr lang="en-US"/>
+          </a:p>
+        </p:txBody>
+      </p:sp>
+      <p:graphicFrame>
+        <p:nvGraphicFramePr>
+          <p:cNvPr id="7" name="Table 6">
+            <a:extLst>
+              <a:ext uri="{FF2B5EF4-FFF2-40B4-BE49-F238E27FC236}">
+                <a16:creationId xmlns:a16="http://schemas.microsoft.com/office/drawing/2014/main" id="{8D6C4821-7900-D824-295A-9C8FE773DFE4}"/>
+              </a:ext>
+            </a:extLst>
+          </p:cNvPr>
+          <p:cNvGraphicFramePr>
+            <a:graphicFrameLocks noGrp="1"/>
+          </p:cNvGraphicFramePr>
+          <p:nvPr>
+            <p:extLst>
+              <p:ext uri="{D42A27DB-BD31-4B8C-83A1-F6EECF244321}">
+                <p14:modId xmlns:p14="http://schemas.microsoft.com/office/powerpoint/2010/main" val="2877986831"/>
+              </p:ext>
+            </p:extLst>
+          </p:nvPr>
+        </p:nvGraphicFramePr>
+        <p:xfrm>
+          <a:off x="838199" y="5026416"/>
+          <a:ext cx="10515599" cy="370840"/>
+        </p:xfrm>
+        <a:graphic>
+          <a:graphicData uri="http://schemas.openxmlformats.org/drawingml/2006/table">
+            <a:tbl>
+              <a:tblPr firstRow="1" bandRow="1">
+                <a:tableStyleId>{5C22544A-7EE6-4342-B048-85BDC9FD1C3A}</a:tableStyleId>
+              </a:tblPr>
+              <a:tblGrid>
+                <a:gridCol w="10515599">
+                  <a:extLst>
+                    <a:ext uri="{9D8B030D-6E8A-4147-A177-3AD203B41FA5}">
+                      <a16:colId xmlns:a16="http://schemas.microsoft.com/office/drawing/2014/main" val="3127348772"/>
+                    </a:ext>
+                  </a:extLst>
+                </a:gridCol>
+              </a:tblGrid>
+              <a:tr h="370840">
+                <a:tc>
+                  <a:txBody>
+                    <a:bodyPr/>
+                    <a:lstStyle/>
+                    <a:p>
+                      <a:pPr algn="ctr"/>
+                      <a:r>
+                        <a:rPr lang="en-US" dirty="0"/>
+                        <a:t>Connected Layer (Learning happens here) Output size = 10 (1-2-3-4-5-6-7-8-9-0)</a:t>
+                      </a:r>
+                    </a:p>
+                  </a:txBody>
+                  <a:tcPr/>
+                </a:tc>
+                <a:extLst>
+                  <a:ext uri="{0D108BD9-81ED-4DB2-BD59-A6C34878D82A}">
+                    <a16:rowId xmlns:a16="http://schemas.microsoft.com/office/drawing/2014/main" val="1149183532"/>
+                  </a:ext>
+                </a:extLst>
+              </a:tr>
+            </a:tbl>
+          </a:graphicData>
+        </a:graphic>
+      </p:graphicFrame>
+      <p:sp>
+        <p:nvSpPr>
+          <p:cNvPr id="9" name="Arrow: Up-Down 8">
+            <a:extLst>
+              <a:ext uri="{FF2B5EF4-FFF2-40B4-BE49-F238E27FC236}">
+                <a16:creationId xmlns:a16="http://schemas.microsoft.com/office/drawing/2014/main" id="{A4E2F66F-DA22-6D9C-BB55-BDAF1BFE71C7}"/>
+              </a:ext>
+            </a:extLst>
+          </p:cNvPr>
+          <p:cNvSpPr/>
+          <p:nvPr/>
+        </p:nvSpPr>
+        <p:spPr>
+          <a:xfrm>
+            <a:off x="5587524" y="3575377"/>
+            <a:ext cx="599631" cy="1451039"/>
+          </a:xfrm>
+          <a:prstGeom prst="upDownArrow">
+            <a:avLst/>
+          </a:prstGeom>
+        </p:spPr>
+        <p:style>
+          <a:lnRef idx="2">
+            <a:schemeClr val="accent1">
+              <a:shade val="15000"/>
+            </a:schemeClr>
+          </a:lnRef>
+          <a:fillRef idx="1">
+            <a:schemeClr val="accent1"/>
+          </a:fillRef>
+          <a:effectRef idx="0">
+            <a:schemeClr val="accent1"/>
+          </a:effectRef>
+          <a:fontRef idx="minor">
+            <a:schemeClr val="lt1"/>
+          </a:fontRef>
+        </p:style>
+        <p:txBody>
+          <a:bodyPr rtlCol="0" anchor="ctr"/>
+          <a:lstStyle/>
+          <a:p>
+            <a:pPr algn="ctr"/>
+            <a:endParaRPr lang="en-US"/>
+          </a:p>
+        </p:txBody>
+      </p:sp>
+      <p:sp>
+        <p:nvSpPr>
+          <p:cNvPr id="12" name="Arrow: Up-Down 11">
+            <a:extLst>
+              <a:ext uri="{FF2B5EF4-FFF2-40B4-BE49-F238E27FC236}">
+                <a16:creationId xmlns:a16="http://schemas.microsoft.com/office/drawing/2014/main" id="{8B088C81-C65C-52F5-24C5-97BB34BECECC}"/>
+              </a:ext>
+            </a:extLst>
+          </p:cNvPr>
+          <p:cNvSpPr/>
+          <p:nvPr/>
+        </p:nvSpPr>
+        <p:spPr>
+          <a:xfrm>
+            <a:off x="5860989" y="5397255"/>
+            <a:ext cx="172342" cy="687351"/>
+          </a:xfrm>
+          <a:prstGeom prst="upDownArrow">
+            <a:avLst/>
+          </a:prstGeom>
+        </p:spPr>
+        <p:style>
+          <a:lnRef idx="2">
+            <a:schemeClr val="accent1">
+              <a:shade val="15000"/>
+            </a:schemeClr>
+          </a:lnRef>
+          <a:fillRef idx="1">
+            <a:schemeClr val="accent1"/>
+          </a:fillRef>
+          <a:effectRef idx="0">
+            <a:schemeClr val="accent1"/>
+          </a:effectRef>
+          <a:fontRef idx="minor">
+            <a:schemeClr val="lt1"/>
+          </a:fontRef>
+        </p:style>
+        <p:txBody>
+          <a:bodyPr rtlCol="0" anchor="ctr"/>
+          <a:lstStyle/>
+          <a:p>
+            <a:pPr algn="ctr"/>
+            <a:endParaRPr lang="en-US"/>
+          </a:p>
+        </p:txBody>
+      </p:sp>
+      <p:graphicFrame>
+        <p:nvGraphicFramePr>
+          <p:cNvPr id="13" name="Table 12">
+            <a:extLst>
+              <a:ext uri="{FF2B5EF4-FFF2-40B4-BE49-F238E27FC236}">
+                <a16:creationId xmlns:a16="http://schemas.microsoft.com/office/drawing/2014/main" id="{4FBBFBD0-3338-411B-F530-39F010FD8442}"/>
+              </a:ext>
+            </a:extLst>
+          </p:cNvPr>
+          <p:cNvGraphicFramePr>
+            <a:graphicFrameLocks noGrp="1"/>
+          </p:cNvGraphicFramePr>
+          <p:nvPr>
+            <p:extLst>
+              <p:ext uri="{D42A27DB-BD31-4B8C-83A1-F6EECF244321}">
+                <p14:modId xmlns:p14="http://schemas.microsoft.com/office/powerpoint/2010/main" val="1899544484"/>
+              </p:ext>
+            </p:extLst>
+          </p:nvPr>
+        </p:nvGraphicFramePr>
+        <p:xfrm>
+          <a:off x="1883160" y="6116980"/>
+          <a:ext cx="8128000" cy="370840"/>
+        </p:xfrm>
+        <a:graphic>
+          <a:graphicData uri="http://schemas.openxmlformats.org/drawingml/2006/table">
+            <a:tbl>
+              <a:tblPr firstRow="1" bandRow="1">
+                <a:tableStyleId>{5C22544A-7EE6-4342-B048-85BDC9FD1C3A}</a:tableStyleId>
+              </a:tblPr>
+              <a:tblGrid>
+                <a:gridCol w="812800">
+                  <a:extLst>
+                    <a:ext uri="{9D8B030D-6E8A-4147-A177-3AD203B41FA5}">
+                      <a16:colId xmlns:a16="http://schemas.microsoft.com/office/drawing/2014/main" val="1357361425"/>
+                    </a:ext>
+                  </a:extLst>
+                </a:gridCol>
+                <a:gridCol w="812800">
+                  <a:extLst>
+                    <a:ext uri="{9D8B030D-6E8A-4147-A177-3AD203B41FA5}">
+                      <a16:colId xmlns:a16="http://schemas.microsoft.com/office/drawing/2014/main" val="3629873916"/>
+                    </a:ext>
+                  </a:extLst>
+                </a:gridCol>
+                <a:gridCol w="812800">
+                  <a:extLst>
+                    <a:ext uri="{9D8B030D-6E8A-4147-A177-3AD203B41FA5}">
+                      <a16:colId xmlns:a16="http://schemas.microsoft.com/office/drawing/2014/main" val="1213997483"/>
+                    </a:ext>
+                  </a:extLst>
+                </a:gridCol>
+                <a:gridCol w="812800">
+                  <a:extLst>
+                    <a:ext uri="{9D8B030D-6E8A-4147-A177-3AD203B41FA5}">
+                      <a16:colId xmlns:a16="http://schemas.microsoft.com/office/drawing/2014/main" val="93007149"/>
+                    </a:ext>
+                  </a:extLst>
+                </a:gridCol>
+                <a:gridCol w="812800">
+                  <a:extLst>
+                    <a:ext uri="{9D8B030D-6E8A-4147-A177-3AD203B41FA5}">
+                      <a16:colId xmlns:a16="http://schemas.microsoft.com/office/drawing/2014/main" val="3032791399"/>
+                    </a:ext>
+                  </a:extLst>
+                </a:gridCol>
+                <a:gridCol w="812800">
+                  <a:extLst>
+                    <a:ext uri="{9D8B030D-6E8A-4147-A177-3AD203B41FA5}">
+                      <a16:colId xmlns:a16="http://schemas.microsoft.com/office/drawing/2014/main" val="3448773195"/>
+                    </a:ext>
+                  </a:extLst>
+                </a:gridCol>
+                <a:gridCol w="812800">
+                  <a:extLst>
+                    <a:ext uri="{9D8B030D-6E8A-4147-A177-3AD203B41FA5}">
+                      <a16:colId xmlns:a16="http://schemas.microsoft.com/office/drawing/2014/main" val="1895080698"/>
+                    </a:ext>
+                  </a:extLst>
+                </a:gridCol>
+                <a:gridCol w="812800">
+                  <a:extLst>
+                    <a:ext uri="{9D8B030D-6E8A-4147-A177-3AD203B41FA5}">
+                      <a16:colId xmlns:a16="http://schemas.microsoft.com/office/drawing/2014/main" val="198441536"/>
+                    </a:ext>
+                  </a:extLst>
+                </a:gridCol>
+                <a:gridCol w="812800">
+                  <a:extLst>
+                    <a:ext uri="{9D8B030D-6E8A-4147-A177-3AD203B41FA5}">
+                      <a16:colId xmlns:a16="http://schemas.microsoft.com/office/drawing/2014/main" val="3477193819"/>
+                    </a:ext>
+                  </a:extLst>
+                </a:gridCol>
+                <a:gridCol w="812800">
+                  <a:extLst>
+                    <a:ext uri="{9D8B030D-6E8A-4147-A177-3AD203B41FA5}">
+                      <a16:colId xmlns:a16="http://schemas.microsoft.com/office/drawing/2014/main" val="1473507911"/>
+                    </a:ext>
+                  </a:extLst>
+                </a:gridCol>
+              </a:tblGrid>
+              <a:tr h="370840">
+                <a:tc>
+                  <a:txBody>
+                    <a:bodyPr/>
+                    <a:lstStyle/>
+                    <a:p>
+                      <a:r>
+                        <a:rPr lang="en-US" dirty="0"/>
+                        <a:t>1</a:t>
+                      </a:r>
+                    </a:p>
+                  </a:txBody>
+                  <a:tcPr/>
+                </a:tc>
+                <a:tc>
+                  <a:txBody>
+                    <a:bodyPr/>
+                    <a:lstStyle/>
+                    <a:p>
+                      <a:r>
+                        <a:rPr lang="en-US" dirty="0"/>
+                        <a:t>2</a:t>
+                      </a:r>
+                    </a:p>
+                  </a:txBody>
+                  <a:tcPr/>
+                </a:tc>
+                <a:tc>
+                  <a:txBody>
+                    <a:bodyPr/>
+                    <a:lstStyle/>
+                    <a:p>
+                      <a:r>
+                        <a:rPr lang="en-US" dirty="0"/>
+                        <a:t>3</a:t>
+                      </a:r>
+                    </a:p>
+                  </a:txBody>
+                  <a:tcPr/>
+                </a:tc>
+                <a:tc>
+                  <a:txBody>
+                    <a:bodyPr/>
+                    <a:lstStyle/>
+                    <a:p>
+                      <a:r>
+                        <a:rPr lang="en-US" dirty="0"/>
+                        <a:t>4</a:t>
+                      </a:r>
+                    </a:p>
+                  </a:txBody>
+                  <a:tcPr/>
+                </a:tc>
+                <a:tc>
+                  <a:txBody>
+                    <a:bodyPr/>
+                    <a:lstStyle/>
+                    <a:p>
+                      <a:r>
+                        <a:rPr lang="en-US" dirty="0"/>
+                        <a:t>5</a:t>
+                      </a:r>
+                    </a:p>
+                  </a:txBody>
+                  <a:tcPr/>
+                </a:tc>
+                <a:tc>
+                  <a:txBody>
+                    <a:bodyPr/>
+                    <a:lstStyle/>
+                    <a:p>
+                      <a:r>
+                        <a:rPr lang="en-US" dirty="0"/>
+                        <a:t>6</a:t>
+                      </a:r>
+                    </a:p>
+                  </a:txBody>
+                  <a:tcPr/>
+                </a:tc>
+                <a:tc>
+                  <a:txBody>
+                    <a:bodyPr/>
+                    <a:lstStyle/>
+                    <a:p>
+                      <a:r>
+                        <a:rPr lang="en-US" dirty="0"/>
+                        <a:t>7</a:t>
+                      </a:r>
+                    </a:p>
+                  </a:txBody>
+                  <a:tcPr/>
+                </a:tc>
+                <a:tc>
+                  <a:txBody>
+                    <a:bodyPr/>
+                    <a:lstStyle/>
+                    <a:p>
+                      <a:r>
+                        <a:rPr lang="en-US" dirty="0"/>
+                        <a:t>8</a:t>
+                      </a:r>
+                    </a:p>
+                  </a:txBody>
+                  <a:tcPr/>
+                </a:tc>
+                <a:tc>
+                  <a:txBody>
+                    <a:bodyPr/>
+                    <a:lstStyle/>
+                    <a:p>
+                      <a:r>
+                        <a:rPr lang="en-US" dirty="0"/>
+                        <a:t>9</a:t>
+                      </a:r>
+                    </a:p>
+                  </a:txBody>
+                  <a:tcPr/>
+                </a:tc>
+                <a:tc>
+                  <a:txBody>
+                    <a:bodyPr/>
+                    <a:lstStyle/>
+                    <a:p>
+                      <a:r>
+                        <a:rPr lang="en-US" dirty="0"/>
+                        <a:t>0</a:t>
+                      </a:r>
+                    </a:p>
+                  </a:txBody>
+                  <a:tcPr/>
+                </a:tc>
+                <a:extLst>
+                  <a:ext uri="{0D108BD9-81ED-4DB2-BD59-A6C34878D82A}">
+                    <a16:rowId xmlns:a16="http://schemas.microsoft.com/office/drawing/2014/main" val="894860689"/>
+                  </a:ext>
+                </a:extLst>
+              </a:tr>
+            </a:tbl>
+          </a:graphicData>
+        </a:graphic>
+      </p:graphicFrame>
+    </p:spTree>
+    <p:extLst>
+      <p:ext uri="{BB962C8B-B14F-4D97-AF65-F5344CB8AC3E}">
+        <p14:creationId xmlns:p14="http://schemas.microsoft.com/office/powerpoint/2010/main" val="4240990416"/>
       </p:ext>
     </p:extLst>
   </p:cSld>
@@ -15009,21 +16677,21 @@
 </file>
 
 <file path=customXml/item1.xml><?xml version="1.0" encoding="utf-8"?>
+<TemplafySlideTemplateConfiguration><![CDATA[{"slideVersion":1,"isValidatorEnabled":false,"isLocked":false,"elementsMetadata":[],"slideId":"637946225388777972","enableDocumentContentUpdater":false,"version":"2.0"}]]></TemplafySlideTemplateConfiguration>
+</file>
+
+<file path=customXml/item2.xml><?xml version="1.0" encoding="utf-8"?>
 <TemplafySlideFormConfiguration><![CDATA[{"formFields":[],"formDataEntries":[]}]]></TemplafySlideFormConfiguration>
 </file>
 
-<file path=customXml/item2.xml><?xml version="1.0" encoding="utf-8"?>
-<TemplafySlideTemplateConfiguration><![CDATA[{"slideVersion":1,"isValidatorEnabled":false,"isLocked":false,"elementsMetadata":[],"slideId":"637946225388777972","enableDocumentContentUpdater":false,"version":"2.0"}]]></TemplafySlideTemplateConfiguration>
-</file>
-
 <file path=customXml/itemProps1.xml><?xml version="1.0" encoding="utf-8"?>
-<ds:datastoreItem xmlns:ds="http://schemas.openxmlformats.org/officeDocument/2006/customXml" ds:itemID="{0AA0F557-FA2B-44AC-90C2-5D80DCD5378C}">
+<ds:datastoreItem xmlns:ds="http://schemas.openxmlformats.org/officeDocument/2006/customXml" ds:itemID="{703BD7A7-430B-409C-983F-B8D2199CCABD}">
   <ds:schemaRefs/>
 </ds:datastoreItem>
 </file>
 
 <file path=customXml/itemProps2.xml><?xml version="1.0" encoding="utf-8"?>
-<ds:datastoreItem xmlns:ds="http://schemas.openxmlformats.org/officeDocument/2006/customXml" ds:itemID="{703BD7A7-430B-409C-983F-B8D2199CCABD}">
+<ds:datastoreItem xmlns:ds="http://schemas.openxmlformats.org/officeDocument/2006/customXml" ds:itemID="{0AA0F557-FA2B-44AC-90C2-5D80DCD5378C}">
   <ds:schemaRefs/>
 </ds:datastoreItem>
 </file>
</xml_diff>